<commit_message>
Nov 14 Setting up tileset and waveblocks
</commit_message>
<xml_diff>
--- a/misc/state possibilities for figures.pptx
+++ b/misc/state possibilities for figures.pptx
@@ -297,146 +297,6 @@
 </inkml:ink>
 </file>
 
-<file path=ppt/ink/ink15.xml><?xml version="1.0" encoding="utf-8"?>
-<inkml:ink xmlns:inkml="http://www.w3.org/2003/InkML">
-  <inkml:definitions>
-    <inkml:context xml:id="ctx0">
-      <inkml:inkSource xml:id="inkSrc0">
-        <inkml:traceFormat>
-          <inkml:channel name="X" type="integer" min="-2.14748E9" max="2.14748E9" units="cm"/>
-          <inkml:channel name="Y" type="integer" min="-2.14748E9" max="2.14748E9" units="cm"/>
-          <inkml:channel name="F" type="integer" max="32767" units="dev"/>
-        </inkml:traceFormat>
-        <inkml:channelProperties>
-          <inkml:channelProperty channel="X" name="resolution" value="1000" units="1/cm"/>
-          <inkml:channelProperty channel="Y" name="resolution" value="1000" units="1/cm"/>
-          <inkml:channelProperty channel="F" name="resolution" value="0" units="1/dev"/>
-        </inkml:channelProperties>
-      </inkml:inkSource>
-      <inkml:timestamp xml:id="ts0" timeString="2025-11-14T20:51:03.881"/>
-    </inkml:context>
-    <inkml:brush xml:id="br0">
-      <inkml:brushProperty name="width" value="0.1" units="cm"/>
-      <inkml:brushProperty name="height" value="0.1" units="cm"/>
-      <inkml:brushProperty name="color" value="#0FB5B1"/>
-    </inkml:brush>
-  </inkml:definitions>
-  <inkml:trace contextRef="#ctx0" brushRef="#br0">1 172 24575,'0'1'0,"1"0"0,0 1 0,0-1 0,-1 0 0,1 0 0,0 1 0,0-1 0,0 0 0,0 0 0,0 0 0,0 0 0,1-1 0,-1 1 0,0 0 0,0 0 0,1-1 0,-1 1 0,0-1 0,1 1 0,-1-1 0,1 1 0,-1-1 0,1 0 0,-1 0 0,0 0 0,1 0 0,-1 0 0,1 0 0,-1 0 0,2-1 0,53 0 0,-53 0 0,2 0 0,0-1 0,0 0 0,0 0 0,0-1 0,-1 1 0,1-1 0,-1 0 0,0-1 0,0 1 0,0-1 0,5-5 0,22-17 0,-18 19 0,0 0 0,1 0 0,0 2 0,0 0 0,15-4 0,140-25 0,-108 12 0,-48 17 0,0-1 0,1 2 0,16-4 0,-16 5 0,1 2 0,-1 0 0,1 0 0,-1 2 0,1 0 0,-1 0 0,16 4 0,0 17 0,-11-7 0,5 2-1365</inkml:trace>
-</inkml:ink>
-</file>
-
-<file path=ppt/ink/ink16.xml><?xml version="1.0" encoding="utf-8"?>
-<inkml:ink xmlns:inkml="http://www.w3.org/2003/InkML">
-  <inkml:definitions>
-    <inkml:context xml:id="ctx0">
-      <inkml:inkSource xml:id="inkSrc0">
-        <inkml:traceFormat>
-          <inkml:channel name="X" type="integer" min="-2.14748E9" max="2.14748E9" units="cm"/>
-          <inkml:channel name="Y" type="integer" min="-2.14748E9" max="2.14748E9" units="cm"/>
-          <inkml:channel name="F" type="integer" max="32767" units="dev"/>
-        </inkml:traceFormat>
-        <inkml:channelProperties>
-          <inkml:channelProperty channel="X" name="resolution" value="1000" units="1/cm"/>
-          <inkml:channelProperty channel="Y" name="resolution" value="1000" units="1/cm"/>
-          <inkml:channelProperty channel="F" name="resolution" value="0" units="1/dev"/>
-        </inkml:channelProperties>
-      </inkml:inkSource>
-      <inkml:timestamp xml:id="ts0" timeString="2025-11-14T20:51:10.197"/>
-    </inkml:context>
-    <inkml:brush xml:id="br0">
-      <inkml:brushProperty name="width" value="0.1" units="cm"/>
-      <inkml:brushProperty name="height" value="0.1" units="cm"/>
-      <inkml:brushProperty name="color" value="#0FB5B1"/>
-    </inkml:brush>
-  </inkml:definitions>
-  <inkml:trace contextRef="#ctx0" brushRef="#br0">0 124 24575,'37'0'0,"-24"2"0,1-1 0,-1-1 0,0 0 0,0-1 0,0-1 0,0 0 0,0 0 0,0-2 0,-1 1 0,1-1 0,17-10 0,-19 8 0,0 0 0,1 0 0,-1 1 0,1 1 0,0 0 0,0 0 0,0 1 0,20-2 0,-19 3 0,0 0 0,0-1 0,19-8 0,-19 7 0,-1 0 0,1 1 0,19-3 0,48-11-1365</inkml:trace>
-</inkml:ink>
-</file>
-
-<file path=ppt/ink/ink17.xml><?xml version="1.0" encoding="utf-8"?>
-<inkml:ink xmlns:inkml="http://www.w3.org/2003/InkML">
-  <inkml:definitions>
-    <inkml:context xml:id="ctx0">
-      <inkml:inkSource xml:id="inkSrc0">
-        <inkml:traceFormat>
-          <inkml:channel name="X" type="integer" min="-2.14748E9" max="2.14748E9" units="cm"/>
-          <inkml:channel name="Y" type="integer" min="-2.14748E9" max="2.14748E9" units="cm"/>
-          <inkml:channel name="F" type="integer" max="32767" units="dev"/>
-        </inkml:traceFormat>
-        <inkml:channelProperties>
-          <inkml:channelProperty channel="X" name="resolution" value="1000" units="1/cm"/>
-          <inkml:channelProperty channel="Y" name="resolution" value="1000" units="1/cm"/>
-          <inkml:channelProperty channel="F" name="resolution" value="0" units="1/dev"/>
-        </inkml:channelProperties>
-      </inkml:inkSource>
-      <inkml:timestamp xml:id="ts0" timeString="2025-11-14T20:51:25.463"/>
-    </inkml:context>
-    <inkml:brush xml:id="br0">
-      <inkml:brushProperty name="width" value="0.1" units="cm"/>
-      <inkml:brushProperty name="height" value="0.1" units="cm"/>
-      <inkml:brushProperty name="color" value="#0FB5B1"/>
-    </inkml:brush>
-  </inkml:definitions>
-  <inkml:trace contextRef="#ctx0" brushRef="#br0">0 0 24575,'6'0'0,"-1"1"0,1-1 0,-1 1 0,0 0 0,1 1 0,-1-1 0,0 1 0,0 0 0,0 0 0,0 1 0,0 0 0,-1-1 0,1 1 0,-1 1 0,0-1 0,1 1 0,-2 0 0,1 0 0,4 6 0,-6-8 0,0 0 0,0 1 0,0-1 0,0 0 0,0 0 0,1 0 0,-1 0 0,1-1 0,-1 1 0,1-1 0,0 1 0,-1-1 0,5 1 0,-4-1 0,0 1 0,0-1 0,0 0 0,0 1 0,-1-1 0,1 1 0,0 0 0,-1 0 0,0 0 0,1 0 0,2 4 0,-3-4 3,0 0 0,-1 0 0,1 0 0,0-1 0,0 1 0,0-1 0,1 1 0,-1-1 0,0 0 0,1 0 0,-1 1 0,0-2-1,1 1 1,-1 0 0,1-1 0,5 2 0,45-2-285,-29-2-851</inkml:trace>
-</inkml:ink>
-</file>
-
-<file path=ppt/ink/ink18.xml><?xml version="1.0" encoding="utf-8"?>
-<inkml:ink xmlns:inkml="http://www.w3.org/2003/InkML">
-  <inkml:definitions>
-    <inkml:context xml:id="ctx0">
-      <inkml:inkSource xml:id="inkSrc0">
-        <inkml:traceFormat>
-          <inkml:channel name="X" type="integer" min="-2.14748E9" max="2.14748E9" units="cm"/>
-          <inkml:channel name="Y" type="integer" min="-2.14748E9" max="2.14748E9" units="cm"/>
-          <inkml:channel name="F" type="integer" max="32767" units="dev"/>
-        </inkml:traceFormat>
-        <inkml:channelProperties>
-          <inkml:channelProperty channel="X" name="resolution" value="1000" units="1/cm"/>
-          <inkml:channelProperty channel="Y" name="resolution" value="1000" units="1/cm"/>
-          <inkml:channelProperty channel="F" name="resolution" value="0" units="1/dev"/>
-        </inkml:channelProperties>
-      </inkml:inkSource>
-      <inkml:timestamp xml:id="ts0" timeString="2025-11-14T20:51:30.281"/>
-    </inkml:context>
-    <inkml:brush xml:id="br0">
-      <inkml:brushProperty name="width" value="0.1" units="cm"/>
-      <inkml:brushProperty name="height" value="0.1" units="cm"/>
-      <inkml:brushProperty name="color" value="#0FB5B1"/>
-    </inkml:brush>
-  </inkml:definitions>
-  <inkml:trace contextRef="#ctx0" brushRef="#br0">0 126 24575,'6'0'0,"-1"-1"0,1-1 0,-1 1 0,0-1 0,0 0 0,0 0 0,0 0 0,0-1 0,5-3 0,34-14 0,-39 18 0,-1 1 0,1-1 0,0-1 0,-1 1 0,0 0 0,1-1 0,4-4 0,-6 4 0,1 0 0,0 1 0,0-1 0,0 1 0,0 0 0,0 0 0,0 0 0,0 1 0,1-1 0,-1 1 0,5-1 0,-3 1 0,0 0 0,0-1 0,-1 0 0,1 0 0,-1 0 0,1-1 0,5-3 0,-8 4 0,0 0 0,1 0 0,-1 0 0,1 0 0,-1 0 0,1 1 0,-1 0 0,1 0 0,0 0 0,0 0 0,0 0 0,-1 1 0,1 0 0,0 0 0,0 0 0,0 0 0,0 0 0,0 1 0,5 1 0,36 34-1365</inkml:trace>
-</inkml:ink>
-</file>
-
-<file path=ppt/ink/ink19.xml><?xml version="1.0" encoding="utf-8"?>
-<inkml:ink xmlns:inkml="http://www.w3.org/2003/InkML">
-  <inkml:definitions>
-    <inkml:context xml:id="ctx0">
-      <inkml:inkSource xml:id="inkSrc0">
-        <inkml:traceFormat>
-          <inkml:channel name="X" type="integer" min="-2.14748E9" max="2.14748E9" units="cm"/>
-          <inkml:channel name="Y" type="integer" min="-2.14748E9" max="2.14748E9" units="cm"/>
-          <inkml:channel name="F" type="integer" max="32767" units="dev"/>
-        </inkml:traceFormat>
-        <inkml:channelProperties>
-          <inkml:channelProperty channel="X" name="resolution" value="1000" units="1/cm"/>
-          <inkml:channelProperty channel="Y" name="resolution" value="1000" units="1/cm"/>
-          <inkml:channelProperty channel="F" name="resolution" value="0" units="1/dev"/>
-        </inkml:channelProperties>
-      </inkml:inkSource>
-      <inkml:timestamp xml:id="ts0" timeString="2025-11-14T20:52:09.340"/>
-    </inkml:context>
-    <inkml:brush xml:id="br0">
-      <inkml:brushProperty name="width" value="0.1" units="cm"/>
-      <inkml:brushProperty name="height" value="0.1" units="cm"/>
-      <inkml:brushProperty name="color" value="#0FB5B1"/>
-    </inkml:brush>
-  </inkml:definitions>
-  <inkml:trace contextRef="#ctx0" brushRef="#br0">0 1 24575,'0'2'5,"1"1"0,-1-1-1,1 1 1,-1-1 0,1 1-1,0-1 1,0 1-1,0-1 1,0 0 0,1 1-1,-1-1 1,1 0 0,-1 0-1,1 0 1,0 0 0,-1 0-1,1-1 1,0 1 0,0 0-1,0-1 1,1 0 0,-1 1-1,0-1 1,0 0 0,1 0-1,-1 0 1,5 1 0,-4-1-77,0 0 1,0 0 0,0 0 0,0 0-1,-1 1 1,1-1 0,0 1 0,-1 0 0,0 0-1,1 0 1,-1 0 0,0 0 0,0 0-1,0 1 1,0-1 0,0 0 0,-1 1 0,1 0-1,-1-1 1,2 5 0</inkml:trace>
-</inkml:ink>
-</file>
-
 <file path=ppt/ink/ink2.xml><?xml version="1.0" encoding="utf-8"?>
 <inkml:ink xmlns:inkml="http://www.w3.org/2003/InkML">
   <inkml:definitions>
@@ -465,286 +325,6 @@
 </inkml:ink>
 </file>
 
-<file path=ppt/ink/ink20.xml><?xml version="1.0" encoding="utf-8"?>
-<inkml:ink xmlns:inkml="http://www.w3.org/2003/InkML">
-  <inkml:definitions>
-    <inkml:context xml:id="ctx0">
-      <inkml:inkSource xml:id="inkSrc0">
-        <inkml:traceFormat>
-          <inkml:channel name="X" type="integer" min="-2.14748E9" max="2.14748E9" units="cm"/>
-          <inkml:channel name="Y" type="integer" min="-2.14748E9" max="2.14748E9" units="cm"/>
-          <inkml:channel name="F" type="integer" max="32767" units="dev"/>
-        </inkml:traceFormat>
-        <inkml:channelProperties>
-          <inkml:channelProperty channel="X" name="resolution" value="1000" units="1/cm"/>
-          <inkml:channelProperty channel="Y" name="resolution" value="1000" units="1/cm"/>
-          <inkml:channelProperty channel="F" name="resolution" value="0" units="1/dev"/>
-        </inkml:channelProperties>
-      </inkml:inkSource>
-      <inkml:timestamp xml:id="ts0" timeString="2025-11-14T20:52:19.240"/>
-    </inkml:context>
-    <inkml:brush xml:id="br0">
-      <inkml:brushProperty name="width" value="0.35" units="cm"/>
-      <inkml:brushProperty name="height" value="0.35" units="cm"/>
-      <inkml:brushProperty name="color" value="#0FB5B1"/>
-    </inkml:brush>
-  </inkml:definitions>
-  <inkml:trace contextRef="#ctx0" brushRef="#br0">1 1 24575,'0'0'-8191</inkml:trace>
-</inkml:ink>
-</file>
-
-<file path=ppt/ink/ink21.xml><?xml version="1.0" encoding="utf-8"?>
-<inkml:ink xmlns:inkml="http://www.w3.org/2003/InkML">
-  <inkml:definitions>
-    <inkml:context xml:id="ctx0">
-      <inkml:inkSource xml:id="inkSrc0">
-        <inkml:traceFormat>
-          <inkml:channel name="X" type="integer" min="-2.14748E9" max="2.14748E9" units="cm"/>
-          <inkml:channel name="Y" type="integer" min="-2.14748E9" max="2.14748E9" units="cm"/>
-          <inkml:channel name="F" type="integer" max="32767" units="dev"/>
-        </inkml:traceFormat>
-        <inkml:channelProperties>
-          <inkml:channelProperty channel="X" name="resolution" value="1000" units="1/cm"/>
-          <inkml:channelProperty channel="Y" name="resolution" value="1000" units="1/cm"/>
-          <inkml:channelProperty channel="F" name="resolution" value="0" units="1/dev"/>
-        </inkml:channelProperties>
-      </inkml:inkSource>
-      <inkml:timestamp xml:id="ts0" timeString="2025-11-14T20:52:23.008"/>
-    </inkml:context>
-    <inkml:brush xml:id="br0">
-      <inkml:brushProperty name="width" value="0.35" units="cm"/>
-      <inkml:brushProperty name="height" value="0.35" units="cm"/>
-      <inkml:brushProperty name="color" value="#0FB5B1"/>
-    </inkml:brush>
-  </inkml:definitions>
-  <inkml:trace contextRef="#ctx0" brushRef="#br0">1 0 24575,'0'0'-8191</inkml:trace>
-</inkml:ink>
-</file>
-
-<file path=ppt/ink/ink22.xml><?xml version="1.0" encoding="utf-8"?>
-<inkml:ink xmlns:inkml="http://www.w3.org/2003/InkML">
-  <inkml:definitions>
-    <inkml:context xml:id="ctx0">
-      <inkml:inkSource xml:id="inkSrc0">
-        <inkml:traceFormat>
-          <inkml:channel name="X" type="integer" min="-2.14748E9" max="2.14748E9" units="cm"/>
-          <inkml:channel name="Y" type="integer" min="-2.14748E9" max="2.14748E9" units="cm"/>
-          <inkml:channel name="F" type="integer" max="32767" units="dev"/>
-        </inkml:traceFormat>
-        <inkml:channelProperties>
-          <inkml:channelProperty channel="X" name="resolution" value="1000" units="1/cm"/>
-          <inkml:channelProperty channel="Y" name="resolution" value="1000" units="1/cm"/>
-          <inkml:channelProperty channel="F" name="resolution" value="0" units="1/dev"/>
-        </inkml:channelProperties>
-      </inkml:inkSource>
-      <inkml:timestamp xml:id="ts0" timeString="2025-11-14T20:52:23.874"/>
-    </inkml:context>
-    <inkml:brush xml:id="br0">
-      <inkml:brushProperty name="width" value="0.35" units="cm"/>
-      <inkml:brushProperty name="height" value="0.35" units="cm"/>
-      <inkml:brushProperty name="color" value="#0FB5B1"/>
-    </inkml:brush>
-  </inkml:definitions>
-  <inkml:trace contextRef="#ctx0" brushRef="#br0">1 1 24575,'0'0'-8191</inkml:trace>
-</inkml:ink>
-</file>
-
-<file path=ppt/ink/ink23.xml><?xml version="1.0" encoding="utf-8"?>
-<inkml:ink xmlns:inkml="http://www.w3.org/2003/InkML">
-  <inkml:definitions>
-    <inkml:context xml:id="ctx0">
-      <inkml:inkSource xml:id="inkSrc0">
-        <inkml:traceFormat>
-          <inkml:channel name="X" type="integer" min="-2.14748E9" max="2.14748E9" units="cm"/>
-          <inkml:channel name="Y" type="integer" min="-2.14748E9" max="2.14748E9" units="cm"/>
-          <inkml:channel name="F" type="integer" max="32767" units="dev"/>
-        </inkml:traceFormat>
-        <inkml:channelProperties>
-          <inkml:channelProperty channel="X" name="resolution" value="1000" units="1/cm"/>
-          <inkml:channelProperty channel="Y" name="resolution" value="1000" units="1/cm"/>
-          <inkml:channelProperty channel="F" name="resolution" value="0" units="1/dev"/>
-        </inkml:channelProperties>
-      </inkml:inkSource>
-      <inkml:timestamp xml:id="ts0" timeString="2025-11-14T20:52:24.532"/>
-    </inkml:context>
-    <inkml:brush xml:id="br0">
-      <inkml:brushProperty name="width" value="0.35" units="cm"/>
-      <inkml:brushProperty name="height" value="0.35" units="cm"/>
-      <inkml:brushProperty name="color" value="#0FB5B1"/>
-    </inkml:brush>
-  </inkml:definitions>
-  <inkml:trace contextRef="#ctx0" brushRef="#br0">1 0 24575,'0'0'-8191</inkml:trace>
-</inkml:ink>
-</file>
-
-<file path=ppt/ink/ink24.xml><?xml version="1.0" encoding="utf-8"?>
-<inkml:ink xmlns:inkml="http://www.w3.org/2003/InkML">
-  <inkml:definitions>
-    <inkml:context xml:id="ctx0">
-      <inkml:inkSource xml:id="inkSrc0">
-        <inkml:traceFormat>
-          <inkml:channel name="X" type="integer" min="-2.14748E9" max="2.14748E9" units="cm"/>
-          <inkml:channel name="Y" type="integer" min="-2.14748E9" max="2.14748E9" units="cm"/>
-          <inkml:channel name="F" type="integer" max="32767" units="dev"/>
-        </inkml:traceFormat>
-        <inkml:channelProperties>
-          <inkml:channelProperty channel="X" name="resolution" value="1000" units="1/cm"/>
-          <inkml:channelProperty channel="Y" name="resolution" value="1000" units="1/cm"/>
-          <inkml:channelProperty channel="F" name="resolution" value="0" units="1/dev"/>
-        </inkml:channelProperties>
-      </inkml:inkSource>
-      <inkml:timestamp xml:id="ts0" timeString="2025-11-14T20:52:27.894"/>
-    </inkml:context>
-    <inkml:brush xml:id="br0">
-      <inkml:brushProperty name="width" value="0.2" units="cm"/>
-      <inkml:brushProperty name="height" value="0.2" units="cm"/>
-      <inkml:brushProperty name="color" value="#0FB5B1"/>
-    </inkml:brush>
-  </inkml:definitions>
-  <inkml:trace contextRef="#ctx0" brushRef="#br0">0 0 24575,'0'2'0</inkml:trace>
-</inkml:ink>
-</file>
-
-<file path=ppt/ink/ink25.xml><?xml version="1.0" encoding="utf-8"?>
-<inkml:ink xmlns:inkml="http://www.w3.org/2003/InkML">
-  <inkml:definitions>
-    <inkml:context xml:id="ctx0">
-      <inkml:inkSource xml:id="inkSrc0">
-        <inkml:traceFormat>
-          <inkml:channel name="X" type="integer" min="-2.14748E9" max="2.14748E9" units="cm"/>
-          <inkml:channel name="Y" type="integer" min="-2.14748E9" max="2.14748E9" units="cm"/>
-          <inkml:channel name="F" type="integer" max="32767" units="dev"/>
-        </inkml:traceFormat>
-        <inkml:channelProperties>
-          <inkml:channelProperty channel="X" name="resolution" value="1000" units="1/cm"/>
-          <inkml:channelProperty channel="Y" name="resolution" value="1000" units="1/cm"/>
-          <inkml:channelProperty channel="F" name="resolution" value="0" units="1/dev"/>
-        </inkml:channelProperties>
-      </inkml:inkSource>
-      <inkml:timestamp xml:id="ts0" timeString="2025-11-14T20:52:28.870"/>
-    </inkml:context>
-    <inkml:brush xml:id="br0">
-      <inkml:brushProperty name="width" value="0.2" units="cm"/>
-      <inkml:brushProperty name="height" value="0.2" units="cm"/>
-      <inkml:brushProperty name="color" value="#0FB5B1"/>
-    </inkml:brush>
-  </inkml:definitions>
-  <inkml:trace contextRef="#ctx0" brushRef="#br0">1 2 24575,'1'0'0,"3"0"0,1 0 0,2 0 0,-1-1 0</inkml:trace>
-</inkml:ink>
-</file>
-
-<file path=ppt/ink/ink26.xml><?xml version="1.0" encoding="utf-8"?>
-<inkml:ink xmlns:inkml="http://www.w3.org/2003/InkML">
-  <inkml:definitions>
-    <inkml:context xml:id="ctx0">
-      <inkml:inkSource xml:id="inkSrc0">
-        <inkml:traceFormat>
-          <inkml:channel name="X" type="integer" min="-2.14748E9" max="2.14748E9" units="cm"/>
-          <inkml:channel name="Y" type="integer" min="-2.14748E9" max="2.14748E9" units="cm"/>
-          <inkml:channel name="F" type="integer" max="32767" units="dev"/>
-        </inkml:traceFormat>
-        <inkml:channelProperties>
-          <inkml:channelProperty channel="X" name="resolution" value="1000" units="1/cm"/>
-          <inkml:channelProperty channel="Y" name="resolution" value="1000" units="1/cm"/>
-          <inkml:channelProperty channel="F" name="resolution" value="0" units="1/dev"/>
-        </inkml:channelProperties>
-      </inkml:inkSource>
-      <inkml:timestamp xml:id="ts0" timeString="2025-11-14T20:52:38.346"/>
-    </inkml:context>
-    <inkml:brush xml:id="br0">
-      <inkml:brushProperty name="width" value="0.2" units="cm"/>
-      <inkml:brushProperty name="height" value="0.2" units="cm"/>
-      <inkml:brushProperty name="color" value="#0FB5B1"/>
-    </inkml:brush>
-  </inkml:definitions>
-  <inkml:trace contextRef="#ctx0" brushRef="#br0">357 138 24575,'1'-1'0,"1"0"0,-1 0 0,0 0 0,1 1 0,-1-1 0,1 0 0,-1 1 0,1-1 0,0 1 0,-1-1 0,1 1 0,0 0 0,-1 0 0,1 0 0,0 0 0,-1 0 0,1 0 0,2 0 0,0 0 0,576-10 0,-624 8 0,1-3 0,0-1 0,-65-18 0,7 1 0,89 19 0,13 2 0,30-1 0,56 2 0,-82 1 0,73 1 0,91 14 0,-120-7 0,44 4 0,-43-7 0,-50-5 0,0 0 0,-1 0 0,1 0 0,0 0 0,0 0 0,0 0 0,0 0 0,0 0 0,0 0 0,0 0 0,0 1 0,0-1 0,0 0 0,0 0 0,0 0 0,0 0 0,0 0 0,0 0 0,0 0 0,0 0 0,0 0 0,0 0 0,0 0 0,0 1 0,0-1 0,0 0 0,0 0 0,0 0 0,0 0 0,0 0 0,0 0 0,0 0 0,0 0 0,0 0 0,-31 1 0,-66-1 0,-160-21 0,252 19 0,1 1 0,0-1 0,-1 1 0,1-1 0,0-1 0,0 1 0,0 0 0,-5-5 0,8 6 0,0 1 0,0-1 0,0 1 0,0-1 0,0 0 0,1 1 0,-1-1 0,0 0 0,0 0 0,1 0 0,-1 0 0,0 1 0,1-1 0,-1 0 0,1 0 0,0 0 0,-1 0 0,1 0 0,0 0 0,-1 0 0,1 0 0,0-1 0,0 1 0,0 0 0,0 0 0,0 0 0,0 0 0,0 0 0,0 0 0,1 0 0,-1 0 0,0 0 0,0 0 0,1 0 0,-1 0 0,1 0 0,-1 0 0,1 0 0,0 0 0,-1 0 0,2-1 0,3 0 0,1 0 0,-1 1 0,1-1 0,-1 1 0,1 0 0,0 0 0,-1 1 0,1 0 0,0 0 0,-1 0 0,1 0 0,9 3 0,8-1 0,-16-3 0,-1 1 0,1 0 0,0 0 0,-1 1 0,1-1 0,-1 2 0,1-1 0,-1 1 0,1 0 0,-1 0 0,0 0 0,0 1 0,0 0 0,0 1 0,0-1 0,-1 1 0,10 9 0,-11-11 0,0 1 0,0 0 0,0-1 0,0 1 0,0-1 0,0 0 0,0-1 0,1 1 0,-1-1 0,1 0 0,-1 0 0,9 1 0,64 2 0,-53-4 0,205-4 0,-45-1 0,-83-4 0,-108 8 0,1 0 0,-1-1 0,1 0 0,0 0 0,0-1 0,0 1 0,-6-5 0,3 2 0,-1 0 0,0 0 0,0 1 0,0 1 0,-1 0 0,1 0 0,-1 1 0,-12-1 0,-60 15 0,46-5 0,67-14 0,-17 3 0,1 2 0,-1-1 0,23 0 0,14 3 0,70 3 0,-107-1 0,1 0 0,-1 1 0,0 0 0,0 1 0,-1 1 0,25 11 0,-27-13 0,1 0 0,0 0 0,0-1 0,0-1 0,0 0 0,0-1 0,1 0 0,-1 0 0,16-3 0,18 0 0,-2 5 0,-31 0 0,0-1 0,1-1 0,-1 0 0,0 0 0,1-1 0,-1-1 0,14-4 0,-21 5 0,3-3 0,0 0 0,1 1 0,0 0 0,0 1 0,-1 0 0,1 0 0,1 1 0,-1 0 0,9 1 0,-12 0 0,1 0 0,-1 0 0,1 0 0,-1 1 0,1 0 0,11 3 0,-16-3 0,0 0 0,-1 0 0,1 0 0,0 0 0,0 0 0,-1 1 0,1-1 0,-1 0 0,1 1 0,-1 0 0,1-1 0,-1 1 0,0 0 0,0-1 0,0 1 0,0 0 0,0 0 0,0 0 0,0 0 0,-1 0 0,1 0 0,0 3 0,19 81 0,12 63 0,-29-135 0,1 0 0,0 0 0,11 24 0,-10-27 0,0 0 0,-1 0 0,0 1 0,-1 0 0,0 0 0,1 16 0,-4-21 0,1 0 0,-2 0 0,1 0 0,-1 0 0,-1 9 0,2-15 0,0-1 0,0 0 0,-1 1 0,1-1 0,0 0 0,0 0 0,0 1 0,0-1 0,0 0 0,0 0 0,0 1 0,-1-1 0,1 0 0,0 0 0,0 1 0,0-1 0,-1 0 0,1 0 0,0 0 0,0 0 0,-1 1 0,1-1 0,0 0 0,0 0 0,-1 0 0,1 0 0,0 0 0,0 0 0,-1 0 0,1 1 0,0-1 0,-1 0 0,1 0 0,0 0 0,0 0 0,-1 0 0,1 0 0,0-1 0,-1 1 0,1 0 0,0 0 0,-1 0 0,-17-23 0,2-17 0,-5-6 0,20 44 0,-1 0 0,0 0 0,0 0 0,0 0 0,0 0 0,0 0 0,0 1 0,0-1 0,-1 1 0,1-1 0,-1 1 0,1 0 0,-1 0 0,1 0 0,-1 0 0,-5 0 0,-7-1 0,-1 0 0,0 2 0,1 0 0,-1 1 0,0 0 0,1 2 0,-22 5 0,-106 38 0,118-37 0,-310 118 0,-405 131 0,584-220 0,-164 20 0,304-55 0,12-2 0,0 0 0,0 0 0,0 0 0,0-1 0,0 1 0,0-1 0,-1 0 0,1 0 0,0-1 0,0 1 0,0-1 0,0 0 0,0 0 0,-6-2 0,10 2 0,-1 0 0,1 0 0,0 1 0,0-1 0,0 0 0,0 0 0,0 1 0,0-1 0,0 0 0,1 0 0,-1 1 0,0-1 0,0 0 0,1 1 0,-1-1 0,0 0 0,1 1 0,-1-1 0,0 0 0,1 1 0,-1-1 0,1 1 0,-1-1 0,1 0 0,-1 1 0,1 0 0,0-1 0,-1 1 0,1-1 0,0 1 0,-1 0 0,2-1 0,27-18 0,-27 18 0,86-42 0,3 3 0,173-50 0,-159 57 0,275-89 0,-357 111 0,-22 11 0,-1 0 0,0-1 0,0 1 0,0 0 0,0 0 0,0 0 0,0 0 0,1 0 0,-1 0 0,0 0 0,0 0 0,0-1 0,0 1 0,0 0 0,0 0 0,0 0 0,0 0 0,0 0 0,0 0 0,0-1 0,0 1 0,0 0 0,0 0 0,0 0 0,0 0 0,0-1 0,0 1 0,0 0 0,0 0 0,0 0 0,0 0 0,0 0 0,0-1 0,0 1 0,0 0 0,0 0 0,0 0 0,0 0 0,0 0 0,0 0 0,0-1 0,0 1 0,-1 0 0,1 0 0,0 0 0,0 0 0,0 0 0,0 0 0,0 0 0,0 0 0,-1 0 0,1-1 0,0 1 0,0 0 0,0 0 0,0 0 0,0 0 0,-1 0 0,-41-3 0,-260 25 0,195-9 0,-1-6 0,-109-6 0,213-1 0,0-1 0,0 1 0,0-1 0,0 0 0,0 0 0,0 0 0,1-1 0,-1 1 0,0-1 0,1 0 0,-1 0 0,1 0 0,-1 0 0,1-1 0,0 1 0,-4-6 0,6 7 0,0 0 0,0 0 0,0-1 0,1 1 0,-1 0 0,1-1 0,-1 1 0,1-1 0,-1 1 0,1-1 0,0 1 0,0 0 0,-1-1 0,1 1 0,0-1 0,1 1 0,-1-1 0,0-2 0,1 1 0,0 1 0,1-1 0,-1 0 0,1 0 0,-1 1 0,1-1 0,0 1 0,-1 0 0,1-1 0,1 1 0,-1 0 0,4-3 0,2-1 0,0 0 0,1 1 0,0 0 0,0 0 0,1 1 0,-1 0 0,18-5 0,76-10 0,-91 17 0,244-23 0,286 9 0,-338 14 0,71-3 0,-310 10 0,0 2 0,-34 10 0,-74 15 0,124-29 0,-145 17 0,142-19 0,0 0 0,0-2 0,0 0 0,0-1 0,-28-7 0,36 0 0,23 2 0,31-5 0,-35 11 0,36-7 0,-23 5 0,0-1 0,0 0 0,0-1 0,-1-1 0,31-15 0,-48 21 0,1 0 0,-1-1 0,1 1 0,-1 0 0,1 0 0,-1 0 0,0 0 0,1-1 0,-1 1 0,1 0 0,-1-1 0,1 1 0,-1 0 0,0-1 0,1 1 0,-1 0 0,0-1 0,1 1 0,-1-1 0,0 1 0,0-1 0,1 1 0,-1 0 0,0-1 0,0 1 0,0-1 0,0 1 0,0-1 0,1 1 0,-1-1 0,0 1 0,0-1 0,0 1 0,0-1 0,-1 0 0,1 1 0,0-1 0,0 1 0,0-1 0,-22-9 0,-33 2 0,-217-1 0,-71-5 0,302 11 0,25 2 0,-1 0 0,1-1 0,-1-1 0,-29-8 0,46 11 0,0 0 0,0 0 0,0 0 0,0 0 0,-1 0 0,1 0 0,0 0 0,0 0 0,0 0 0,0 0 0,0 0 0,0 0 0,0-1 0,-1 1 0,1 0 0,0 0 0,0 0 0,0 0 0,0 0 0,0 0 0,0 0 0,0 0 0,0 0 0,0 0 0,-1-1 0,1 1 0,0 0 0,0 0 0,0 0 0,0 0 0,0 0 0,0 0 0,0-1 0,0 1 0,0 0 0,0 0 0,0 0 0,0 0 0,0 0 0,0 0 0,0-1 0,0 1 0,0 0 0,0 0 0,0 0 0,0 0 0,0 0 0,0 0 0,0 0 0,1-1 0,-1 1 0,0 0 0,0 0 0,0 0 0,0 0 0,0 0 0,0 0 0,11-6 0,15-3 0,-4 3 0,-6 1 0,1 1 0,0 0 0,0 1 0,0 1 0,27-1 0,-43 3 0,0 0 0,0 0 0,-1 0 0,1 0 0,0 0 0,0 0 0,0 0 0,-1 1 0,1-1 0,0 0 0,0 0 0,0 1 0,-1-1 0,1 1 0,0-1 0,-1 0 0,1 1 0,0-1 0,-1 1 0,1 0 0,-1-1 0,1 1 0,-1-1 0,1 1 0,-1 0 0,1-1 0,-1 1 0,1 1 0,-1 0 0,0-1 0,0 1 0,0-1 0,0 1 0,0 0 0,-1-1 0,1 1 0,-1-1 0,1 0 0,-1 1 0,1-1 0,-1 1 0,0-1 0,-1 2 0,-3 5 0,-1-1 0,-1 1 0,1-1 0,-9 7 0,-22 13 0,-2-1 0,0-1 0,-82 35 0,54-27 0,46-19 0,21-14 0,0 0 0,0 0 0,0 1 0,-1-1 0,1 0 0,0 0 0,0 0 0,0 1 0,0-1 0,0 0 0,0 0 0,0 1 0,0-1 0,0 0 0,0 0 0,0 0 0,0 1 0,0-1 0,0 0 0,0 0 0,0 1 0,0-1 0,0 0 0,0 0 0,0 1 0,0-1 0,0 0 0,0 0 0,0 0 0,1 1 0,-1-1 0,0 0 0,0 0 0,0 0 0,0 0 0,0 1 0,1-1 0,-1 0 0,0 0 0,0 0 0,0 0 0,1 0 0,-1 1 0,5 0 0,1 1 0,-1-1 0,0 0 0,0 0 0,1-1 0,7 0 0,98 4 0,446 23 0,-5 47 0,-536-70 0,-6-3 0,-1 1 0,0 0 0,1 0 0,-1 1 0,0 1 0,-1-1 0,13 8 0,-20-11 0,-1 1 0,1-1 0,0 1 0,-1-1 0,1 1 0,-1-1 0,1 1 0,-1 0 0,1-1 0,-1 1 0,1 0 0,-1-1 0,0 1 0,1 0 0,-1 0 0,0-1 0,1 1 0,-1 0 0,0 0 0,0 0 0,0-1 0,0 1 0,0 0 0,0 0 0,0 0 0,0-1 0,0 1 0,0 0 0,-1 0 0,1 0 0,0-1 0,0 1 0,-1 0 0,1 0 0,0-1 0,-1 1 0,1 0 0,-1-1 0,1 1 0,-1 0 0,1-1 0,-1 1 0,0-1 0,1 1 0,-1-1 0,0 1 0,1-1 0,-1 1 0,0-1 0,-1 1 0,-41 21 0,-16-1 0,-1-2 0,-91 15 0,71-18 0,-532 105 0,53-12 0,549-106 0,19-2 0,31-2 0,982-35 0,-996 36 0,9-1 0,0 2 0,52 7 0,-86-8 0,0 0 0,0 0 0,0 0 0,0 0 0,0 0 0,0 1 0,0-1 0,0 0 0,0 0 0,0 1 0,0-1 0,-1 1 0,1-1 0,0 1 0,0-1 0,0 1 0,0 0 0,-1-1 0,1 1 0,0 0 0,0-1 0,-1 1 0,1 1 0,-1-1 0,-1 0 0,0 0 0,0 0 0,0 0 0,0 0 0,1 0 0,-1 0 0,-1 0 0,1-1 0,0 1 0,0 0 0,0-1 0,0 1 0,0-1 0,-1 1 0,1-1 0,0 1 0,-3-1 0,-45 14 0,-1-3 0,0-2 0,-98 5 0,72-8 0,-367 25 0,-248 27 0,601-42 0,75-9 0,19-1 0,12-2 0,0 0 0,1-2 0,-1 1 0,1-2 0,0 0 0,23-2 0,13 1 0,348 5 0,362 16 0,-733-19 0,-15-1 0,0 0 0,0 0 0,0 1 0,-1 1 0,21 7 0,-35-10 0,0 0 0,0 0 0,-1 0 0,1 0 0,0 0 0,0 0 0,0 0 0,-1 1 0,1-1 0,0 0 0,0 0 0,0 0 0,0 0 0,-1 1 0,1-1 0,0 0 0,0 0 0,0 0 0,0 1 0,0-1 0,0 0 0,-1 0 0,1 1 0,0-1 0,0 0 0,0 0 0,0 1 0,0-1 0,0 0 0,0 0 0,0 1 0,0-1 0,0 0 0,0 0 0,0 1 0,0-1 0,1 0 0,-1 0 0,0 0 0,0 1 0,0-1 0,0 0 0,0 0 0,0 1 0,1-1 0,-1 0 0,0 0 0,0 0 0,0 0 0,0 1 0,1-1 0,-1 0 0,0 0 0,0 0 0,0 0 0,1 0 0,-1 0 0,0 0 0,0 1 0,1-1 0,-1 0 0,0 0 0,0 0 0,1 0 0,-1 0 0,0 0 0,0 0 0,1 0 0,-1 0 0,-11 4 0,-1 0 0,1-1 0,-1 0 0,0-1 0,-22 1 0,2 1 0,-303 45 0,-316 41 0,621-85 0,62-2 0,-15-2 0,254 20 0,-268-20 0,1610 154-1218,-1510-141 1218,-69-5 0,-34-8 0,0-1 0,0 0 0,0 0 0,0 1 0,0-1 0,0 0 0,0 1 0,0-1 0,0 0 0,0 0 0,0 1 0,0-1 0,-1 0 0,1 0 0,0 1 0,0-1 0,0 0 0,0 0 0,0 1 0,-1-1 0,1 0 0,0 0 0,0 0 0,0 1 0,-1-1 0,1 0 0,0 0 0,0 0 0,0 0 0,-1 0 0,1 1 0,0-1 0,0 0 0,-1 0 0,1 0 0,0 0 0,-1 0 0,1 0 0,0 0 0,0 0 0,-1 0 0,1 0 0,0 0 0,0 0 0,-1 0 0,1 0 0,0 0 0,0 0 0,-1-1 0,-64 10 0,-785 48 450,-352 34 318,1097-78-768,79-6 0,25-7 0,1 0 0,0 0 0,0 0 0,0 0 0,0 0 0,0 1 0,0-1 0,0 0 0,0 0 0,0 0 0,0 0 0,0 0 0,0 1 0,0-1 0,0 0 0,0 0 0,0 0 0,0 0 0,0 0 0,0 1 0,0-1 0,0 0 0,0 0 0,0 0 0,0 0 0,0 0 0,0 0 0,0 1 0,0-1 0,0 0 0,0 0 0,0 0 0,1 0 0,-1 0 0,0 0 0,0 1 0,0-1 0,0 0 0,0 0 0,0 0 0,0 0 0,1 0 0,-1 0 0,0 0 0,0 0 0,0 0 0,0 0 0,0 0 0,1 0 0,-1 0 0,0 0 0,0 0 0,0 0 0,0 0 0,0 0 0,1 0 0,-1 0 0,0 0 0,0 0 0,0 0 0,0 0 0,0 0 0,0 0 0,1 0 0,-1 0 0,0 0 0,53 5 0,606 12-338,-287-12-681,34 4 756,926 30 254,-1222-33 9,-91-3 0,-24 0 0,-34 0 0,37-2 0,-367 33 815,-668 151-1,982-169-814,41-9 0,16-2 0,26 0 0,299 10 0,-197-13 0,-27 0 0,-37-3 0,0 3 0,98 17 0,-163-19 0,0 0 0,0 0 0,-1 0 0,1 0 0,0 0 0,0 0 0,-1 0 0,1 0 0,0 0 0,0 1 0,-1-1 0,1 0 0,0 0 0,-1 1 0,1-1 0,0 1 0,-1-1 0,1 1 0,-1-1 0,1 1 0,-1-1 0,1 1 0,-1-1 0,1 1 0,-1-1 0,1 1 0,-1 1 0,-15 8 0,-35 3 0,50-13 0,-158 23-8,96-16-1349</inkml:trace>
-</inkml:ink>
-</file>
-
-<file path=ppt/ink/ink27.xml><?xml version="1.0" encoding="utf-8"?>
-<inkml:ink xmlns:inkml="http://www.w3.org/2003/InkML">
-  <inkml:definitions>
-    <inkml:context xml:id="ctx0">
-      <inkml:inkSource xml:id="inkSrc0">
-        <inkml:traceFormat>
-          <inkml:channel name="X" type="integer" min="-2.14748E9" max="2.14748E9" units="cm"/>
-          <inkml:channel name="Y" type="integer" min="-2.14748E9" max="2.14748E9" units="cm"/>
-          <inkml:channel name="F" type="integer" max="32767" units="dev"/>
-        </inkml:traceFormat>
-        <inkml:channelProperties>
-          <inkml:channelProperty channel="X" name="resolution" value="1000" units="1/cm"/>
-          <inkml:channelProperty channel="Y" name="resolution" value="1000" units="1/cm"/>
-          <inkml:channelProperty channel="F" name="resolution" value="0" units="1/dev"/>
-        </inkml:channelProperties>
-      </inkml:inkSource>
-      <inkml:timestamp xml:id="ts0" timeString="2025-11-14T20:52:44.687"/>
-    </inkml:context>
-    <inkml:brush xml:id="br0">
-      <inkml:brushProperty name="width" value="0.2" units="cm"/>
-      <inkml:brushProperty name="height" value="0.2" units="cm"/>
-      <inkml:brushProperty name="color" value="#0FB5B1"/>
-    </inkml:brush>
-  </inkml:definitions>
-  <inkml:trace contextRef="#ctx0" brushRef="#br0">901 0 24575,'55'2'0,"-1"2"0,0 3 0,0 1 0,-1 4 0,88 29 0,-119-33 0,-1 0 0,0 2 0,0 0 0,-1 2 0,21 14 0,-36-21 0,1-1 0,-1 1 0,0 0 0,0 0 0,-1 1 0,1-1 0,-1 1 0,-1 0 0,5 8 0,-6-10 0,-1 0 0,0 0 0,0 0 0,0 1 0,0-1 0,-1 0 0,1 0 0,-1 1 0,0-1 0,0 0 0,-1 1 0,1-1 0,-1 0 0,0 0 0,0 0 0,-3 6 0,-1 2 0,-2-1 0,1-1 0,-1 1 0,-1-1 0,0 0 0,0-1 0,-1 0 0,0 0 0,-1-1 0,0 0 0,0-1 0,-1 0 0,1-1 0,-14 7 0,-21 7 0,0-1 0,-58 16 0,-251 42 0,142-36 0,198-38 0,9-3 0,1 0 0,-1 1 0,0 0 0,1 0 0,-1 0 0,1 1 0,-1-1 0,1 1 0,0 0 0,-1 1 0,1-1 0,-6 5 0,10-6 0,1 0 0,-1-1 0,1 1 0,-1 0 0,0-1 0,1 1 0,0-1 0,-1 1 0,1-1 0,-1 1 0,1-1 0,0 1 0,-1-1 0,1 0 0,0 1 0,-1-1 0,1 0 0,0 0 0,-1 0 0,1 1 0,0-1 0,0 0 0,-1 0 0,1 0 0,0 0 0,0 0 0,-1 0 0,2-1 0,64 9 0,0-4 0,69-4 0,-40-1 0,75 2 0,412 8 0,-494-3 0,-67-2 0,-24 0 0,-37 4 0,36-8 0,-588 74 0,8-1 0,577-72 0,-448 76 0,399-62 0,49-10 0,12-2 0,14 1 0,-1 0 0,1-2 0,0 0 0,31-2 0,13 0 0,38 4-9,769 33-553,-2 41 77,-815-72 485,-27-4 0,0 1 0,0 1 0,-1 2 0,39 13 0,-64-19 0,0 0 0,-1 0 0,1 0 0,-1 0 0,1 0 0,0 0 0,-1 0 0,1 1 0,-1-1 0,1 0 0,0 0 0,-1 1 0,1-1 0,0 0 0,-1 0 0,1 1 0,0-1 0,0 0 0,-1 1 0,1-1 0,0 0 0,0 1 0,0-1 0,-1 0 0,1 1 0,0-1 0,0 1 0,0-1 0,0 0 0,0 1 0,0-1 0,0 1 0,0-1 0,0 1 0,0-1 0,0 0 0,0 1 0,0-1 0,0 1 0,0-1 0,0 0 0,0 1 0,0-1 0,1 1 0,-1-1 0,0 0 0,0 1 0,0-1 0,1 0 0,-1 1 0,0-1 0,1 0 0,-1 1 0,0-1 0,1 0 0,-1 0 0,0 1 0,1-1 0,-1 0 0,0 0 0,1 0 0,-1 0 0,1 1 0,-1-1 0,0 0 0,1 0 0,-1 0 0,1 0 0,-22 8 0,-1 0 0,0-2 0,0 0 0,-1-2 0,1 0 0,-26 0 0,-15 3 0,-287 39-46,-431 63-227,13 54 92,733-154 181,25-7 0,0 0 0,0 1 0,0 0 0,0 1 0,1 0 0,0 0 0,-1 1 0,-8 6 0,18-11 0,-1 0 0,1 0 0,0 1 0,0-1 0,0 0 0,-1 0 0,1 0 0,0 1 0,0-1 0,0 0 0,0 0 0,0 1 0,-1-1 0,1 0 0,0 0 0,0 1 0,0-1 0,0 0 0,0 1 0,0-1 0,0 0 0,0 0 0,0 1 0,0-1 0,0 0 0,0 1 0,0-1 0,0 0 0,0 0 0,0 1 0,1-1 0,-1 0 0,0 0 0,0 1 0,0-1 0,0 0 0,1 0 0,-1 1 0,0-1 0,0 0 0,0 0 0,1 0 0,-1 0 0,0 1 0,0-1 0,0 0 0,1 0 0,-1 0 0,0 0 0,1 0 0,-1 0 0,0 0 0,0 1 0,1-1 0,-1 0 0,0 0 0,0 0 0,1 0 0,-1 0 0,0 0 0,1-1 0,12 5 145,0-2 1,0 0-1,0-1 1,0 0-1,18-1 0,1 0 163,-28 0-302,1346 61 364,-1304-57-370,-21-2 0,0 0 0,-1 1 0,1 2 0,28 8 0,-43-6 0,-15 0 0,-8-1 0,-1-1 0,1 0 0,-1-1 0,0-1 0,-1 0 0,-17 1 0,-16 4 0,-1218 270 0,1183-251 0,81-27 0,1 1 0,-1-1 0,0 1 0,1-1 0,-1 1 0,1 0 0,-1 0 0,1-1 0,-1 1 0,1 0 0,-1 0 0,1 0 0,0 1 0,0-1 0,-1 0 0,1 0 0,-1 2 0,3-2 0,0 0 0,0 0 0,0 0 0,0 0 0,1 0 0,-1-1 0,0 1 0,0 0 0,0-1 0,1 1 0,-1-1 0,0 0 0,1 1 0,-1-1 0,0 0 0,1 0 0,-1 0 0,0 1 0,1-2 0,1 1 0,267 17 0,-105-10 0,1461 143-1187,-1514-135 1187,-111-14 0,38 6 0,-34-3 0,-25-1 0,-527 19 1187,331-5-1187,-391 82 0,548-82 0,59-17 0,-1 0 0,1 0 0,-1 0 0,1 0 0,-1 0 0,1 1 0,-1-1 0,0 0 0,1 0 0,-1 0 0,1 1 0,0-1 0,-1 0 0,1 1 0,-1-1 0,1 0 0,-1 1 0,1-1 0,0 0 0,-1 1 0,1-1 0,0 1 0,-1-1 0,1 1 0,0-1 0,-1 1 0,1-1 0,0 1 0,0 0 0,14 6 0,38-1 0,-48-6 0,769 90 0,-751-87 0,-17-3 0,0 1 0,0-1 0,-1 1 0,1 0 0,0 0 0,-1 1 0,1-1 0,-1 1 0,1 0 0,-1 0 0,7 5 0,-11-7 0,0 1 0,-1-1 0,1 1 0,0-1 0,0 1 0,0-1 0,-1 1 0,1-1 0,0 0 0,0 1 0,-1-1 0,1 1 0,0-1 0,-1 0 0,1 1 0,0-1 0,-1 0 0,1 1 0,-1-1 0,1 0 0,0 0 0,-1 1 0,1-1 0,-1 0 0,1 0 0,-1 0 0,1 0 0,-1 0 0,1 0 0,-1 0 0,1 0 0,-2 0 0,-20 7 0,-751 155 0,732-153 0,-138 36 0,262-41 0,-72-4 0,7-1 0,0 1 0,-1 0 0,1 1 0,0 2 0,0 0 0,-1 0 0,20 8 0,-36-11 0,0 1 0,0-1 0,-1 1 0,1-1 0,0 1 0,0-1 0,-1 1 0,1-1 0,-1 1 0,1 0 0,0-1 0,-1 1 0,1 0 0,-1 0 0,0-1 0,1 1 0,-1 0 0,0 0 0,1 0 0,-1 0 0,0 0 0,0-1 0,0 1 0,1 0 0,-1 0 0,0 0 0,0 0 0,-1 0 0,1 0 0,0-1 0,0 1 0,0 0 0,0 0 0,-1 0 0,1 0 0,0 0 0,-1-1 0,1 1 0,-1 0 0,1 0 0,-1-1 0,1 1 0,-1 0 0,0-1 0,1 1 0,-1-1 0,0 1 0,1-1 0,-3 2 0,-35 27 0,26-24 0,-1 0 0,1-1 0,0 0 0,-1-1 0,0-1 0,-16 2 0,14-2 0,0 0 0,1 1 0,-1 1 0,-16 6 0,29-9 0,-1 0 0,1 0 0,-1 0 0,1 1 0,-1-1 0,1 1 0,0-1 0,0 1 0,0 0 0,0 0 0,0 0 0,0 0 0,1 0 0,-1 1 0,1-1 0,-1 0 0,1 1 0,0-1 0,0 1 0,0-1 0,0 1 0,0 0 0,1-1 0,-1 1 0,1 0 0,0 0 0,0-1 0,0 1 0,0 0 0,0 0 0,1 3 0,0-2 0,0 0 0,1 0 0,-1 0 0,1 0 0,0 0 0,0 0 0,0 0 0,1-1 0,-1 1 0,1-1 0,0 0 0,0 0 0,0 0 0,0 0 0,0 0 0,1-1 0,-1 1 0,1-1 0,7 3 0,10 1 0,0-1 0,0-1 0,1-1 0,0 0 0,35-2 0,22-2-1365</inkml:trace>
-</inkml:ink>
-</file>
-
-<file path=ppt/ink/ink28.xml><?xml version="1.0" encoding="utf-8"?>
-<inkml:ink xmlns:inkml="http://www.w3.org/2003/InkML">
-  <inkml:definitions>
-    <inkml:context xml:id="ctx0">
-      <inkml:inkSource xml:id="inkSrc0">
-        <inkml:traceFormat>
-          <inkml:channel name="X" type="integer" min="-2.14748E9" max="2.14748E9" units="cm"/>
-          <inkml:channel name="Y" type="integer" min="-2.14748E9" max="2.14748E9" units="cm"/>
-          <inkml:channel name="F" type="integer" max="32767" units="dev"/>
-        </inkml:traceFormat>
-        <inkml:channelProperties>
-          <inkml:channelProperty channel="X" name="resolution" value="1000" units="1/cm"/>
-          <inkml:channelProperty channel="Y" name="resolution" value="1000" units="1/cm"/>
-          <inkml:channelProperty channel="F" name="resolution" value="0" units="1/dev"/>
-        </inkml:channelProperties>
-      </inkml:inkSource>
-      <inkml:timestamp xml:id="ts0" timeString="2025-11-14T20:52:48.016"/>
-    </inkml:context>
-    <inkml:brush xml:id="br0">
-      <inkml:brushProperty name="width" value="0.2" units="cm"/>
-      <inkml:brushProperty name="height" value="0.2" units="cm"/>
-      <inkml:brushProperty name="color" value="#0FB5B1"/>
-    </inkml:brush>
-  </inkml:definitions>
-  <inkml:trace contextRef="#ctx0" brushRef="#br0">911 2245 24575,'218'2'0,"402"-12"0,-601 9 0,-1-2 0,0 0 0,0-2 0,0 0 0,0 0 0,-1-2 0,0 0 0,0-1 0,25-16 0,-41 23 0,0 0 0,0 1 0,-1-1 0,1 0 0,0 1 0,-1-1 0,1 0 0,0 0 0,-1 1 0,1-1 0,-1 0 0,1 0 0,-1 0 0,0 0 0,1 0 0,-1 0 0,0 0 0,1 0 0,-1 0 0,0 0 0,0 0 0,0 0 0,0 0 0,0 0 0,0 0 0,0 0 0,-1 1 0,1-1 0,0 0 0,0 0 0,-1 0 0,1 0 0,-1 0 0,1 0 0,0 0 0,-1 0 0,0 1 0,1-1 0,-1 0 0,0 0 0,1 1 0,-1-1 0,0 0 0,0 1 0,1-1 0,-1 1 0,-2-2 0,-3-2 0,0 0 0,-1 0 0,1 0 0,-1 1 0,-10-4 0,-38-9 0,0 3 0,-1 2 0,-65-4 0,71 9 0,-934-50 0,949 57 0,63-4 0,243-26 0,254-20 0,338 25 0,-830 24 0,-42 0 0,-52 1 0,-246 7 0,-135 0 0,315-12 0,-182-28 0,286 28 0,6 3 0,1-2 0,-1 0 0,1-1 0,0 0 0,1-2 0,-1 0 0,-25-13 0,41 19 0,0 0 0,-1 0 0,1-1 0,-1 1 0,1 0 0,-1 0 0,1 0 0,0-1 0,-1 1 0,1 0 0,-1 0 0,1-1 0,0 1 0,-1 0 0,1-1 0,0 1 0,0 0 0,-1-1 0,1 1 0,0-1 0,0 1 0,-1 0 0,1-1 0,0 1 0,0-1 0,0 1 0,0-1 0,0 1 0,0-1 0,0 1 0,0-1 0,0 1 0,0 0 0,0-1 0,0 1 0,0-1 0,0 1 0,0-1 0,0 1 0,0-1 0,1 1 0,-1 0 0,0-1 0,0 1 0,1-1 0,-1 1 0,0 0 0,0-1 0,1 1 0,-1 0 0,0-1 0,1 1 0,-1 0 0,1-1 0,-1 1 0,0 0 0,1 0 0,-1 0 0,1-1 0,-1 1 0,1 0 0,-1 0 0,0 0 0,1 0 0,-1 0 0,1 0 0,0 0 0,35-8 0,53 2 0,94 4 0,-101 4 0,120-14 0,-193 10 0,-9 0 0,-18-3 0,-34-2 0,-477-25 0,473 23 0,42 1 0,16 0 0,23-6 0,49-13 0,1 3 0,126-22 0,27-7 0,-207 45 0,-21 8 0,0-1 0,0 1 0,0 0 0,0 0 0,1 0 0,-1 0 0,0 0 0,0 0 0,0 0 0,0 0 0,0 0 0,1 0 0,-1-1 0,0 1 0,0 0 0,0 0 0,0 0 0,0 0 0,0 0 0,0 0 0,0-1 0,0 1 0,1 0 0,-1 0 0,0 0 0,0 0 0,0-1 0,0 1 0,0 0 0,0 0 0,0 0 0,0 0 0,0-1 0,0 1 0,0 0 0,0 0 0,0 0 0,-1 0 0,1 0 0,0-1 0,0 1 0,0 0 0,0 0 0,0 0 0,0 0 0,0 0 0,0-1 0,-1 1 0,-35-9 0,-1225-195 0,1179 184 0,68 13 0,20 2 0,22 0 0,0 2 0,1 1 0,50 2 0,-15 1 0,246-1 0,753-20 0,-1031 17 0,-28 2 0,-6 0 0,-48-2 0,-830 3 0,810-2 0,179-13 0,412-44 0,-512 56 0,-19 1 0,-33 0 0,30 1 0,-364-28 0,292 17 0,0-4 0,-116-36 0,195 50 0,-3 0 0,0-1 0,0-1 0,0 1 0,0-1 0,0-1 0,-15-10 0,24 15 0,-1 0 0,1-1 0,0 1 0,-1 0 0,1 0 0,0-1 0,-1 1 0,1 0 0,0-1 0,-1 1 0,1 0 0,0-1 0,0 1 0,-1 0 0,1-1 0,0 1 0,0-1 0,0 1 0,-1 0 0,1-1 0,0 1 0,0-1 0,0 1 0,0-1 0,0 1 0,0 0 0,0-1 0,0 1 0,0-1 0,0 1 0,0-1 0,0 1 0,1 0 0,-1-1 0,0 1 0,0-1 0,0 1 0,0 0 0,1-1 0,-1 1 0,0-1 0,0 1 0,1-1 0,22-9 0,39-2 0,0 3 0,0 3 0,108 1 0,-70 4 0,321-3 0,213-9 0,-608 10 0,-34 0 0,-43-1 0,-196-9 0,-441-34 0,680 46 0,-15-1 0,0-1 0,0-1 0,-36-10 0,58 13 0,0 1 0,0-1 0,-1 1 0,1 0 0,0-1 0,0 0 0,0 1 0,0-1 0,0 0 0,0 0 0,0 1 0,0-1 0,0 0 0,0 0 0,0 0 0,1 0 0,-2-2 0,2 3 0,0-1 0,0 1 0,0-1 0,0 0 0,0 1 0,0-1 0,0 0 0,0 1 0,0-1 0,0 1 0,1-1 0,-1 0 0,0 1 0,0-1 0,1 1 0,-1-1 0,0 1 0,1-1 0,-1 1 0,0-1 0,1 1 0,-1-1 0,1 1 0,0-1 0,40-21 0,57-13 0,120-24 0,72-25 0,-262 69 0,-28 15 0,0 0 0,1 0 0,-1 0 0,0-1 0,0 1 0,0 0 0,0 0 0,0 0 0,1-1 0,-1 1 0,0 0 0,0 0 0,0-1 0,0 1 0,0 0 0,0-1 0,0 1 0,0 0 0,0 0 0,0-1 0,0 1 0,0 0 0,0 0 0,0-1 0,0 1 0,0 0 0,0 0 0,0-1 0,0 1 0,-1 0 0,1 0 0,0-1 0,0 1 0,0 0 0,0 0 0,0-1 0,-1 1 0,1 0 0,0 0 0,0 0 0,0 0 0,-1-1 0,1 1 0,0 0 0,0 0 0,-1 0 0,-6-3 0,1 1 0,-1 0 0,0 0 0,0 1 0,-14-1 0,-639-52 0,476 35 0,-266-64 0,442 81 0,-5-1 0,1-1 0,-1 1 0,0-2 0,1 0 0,0-1 0,-16-9 0,27 14 0,1 1 0,-1 0 0,0-1 0,1 1 0,-1 0 0,1-1 0,-1 1 0,1-1 0,0 1 0,-1-1 0,1 1 0,-1-1 0,1 1 0,0-1 0,0 0 0,-1 1 0,1-1 0,0 1 0,0-1 0,0 0 0,-1 1 0,1-1 0,0 0 0,0 1 0,0-1 0,0 0 0,0 1 0,0-1 0,1 0 0,14-13 0,35-3 0,-47 16 0,510-97 0,-162 37 0,-330 57 0,-8 3 0,-1-2 0,1 0 0,-1 0 0,1-1 0,-1 0 0,0-1 0,0-1 0,13-8 0,-25 14 0,1 0 0,-1 0 0,1-1 0,-1 1 0,1 0 0,-1 0 0,1-1 0,-1 1 0,1 0 0,-1-1 0,1 1 0,-1-1 0,1 1 0,-1-1 0,1 1 0,-1-1 0,0 1 0,1-1 0,-1 1 0,0-1 0,0 1 0,1-1 0,-1 1 0,0-1 0,0 1 0,0-1 0,0 0 0,0 1 0,0-1 0,0 1 0,0-1 0,0 0 0,0 1 0,0-1 0,0 0 0,0 1 0,0-1 0,0 1 0,-1-1 0,1 1 0,0-1 0,0 1 0,-1-1 0,1 1 0,0-1 0,-1 1 0,1-1 0,-1 1 0,1-1 0,-1 1 0,1-1 0,-1 1 0,1 0 0,-1-1 0,1 1 0,-1 0 0,1 0 0,-1-1 0,1 1 0,-1 0 0,0 0 0,1 0 0,-1 0 0,0 0 0,-43-10 0,43 10 0,-29-2 0,-1 0 0,1 3 0,-1 0 0,-56 11 0,21 2 0,-70 25 0,118-31 0,17-2 0,34-2 0,345-37 0,-251 18 0,-94 11 0,544-75 0,-552 75 0,-20 4 0,0-1 0,0 0 0,1 0 0,-1 0 0,0-1 0,0 1 0,0-1 0,0-1 0,5-3 0,-10 6-21,1 0 0,-1 0-1,0 0 1,0 0 0,0 0-22</inkml:trace>
-</inkml:ink>
-</file>
-
-<file path=ppt/ink/ink29.xml><?xml version="1.0" encoding="utf-8"?>
-<inkml:ink xmlns:inkml="http://www.w3.org/2003/InkML">
-  <inkml:definitions>
-    <inkml:context xml:id="ctx0">
-      <inkml:inkSource xml:id="inkSrc0">
-        <inkml:traceFormat>
-          <inkml:channel name="X" type="integer" min="-2.14748E9" max="2.14748E9" units="cm"/>
-          <inkml:channel name="Y" type="integer" min="-2.14748E9" max="2.14748E9" units="cm"/>
-          <inkml:channel name="F" type="integer" max="32767" units="dev"/>
-        </inkml:traceFormat>
-        <inkml:channelProperties>
-          <inkml:channelProperty channel="X" name="resolution" value="1000" units="1/cm"/>
-          <inkml:channelProperty channel="Y" name="resolution" value="1000" units="1/cm"/>
-          <inkml:channelProperty channel="F" name="resolution" value="0" units="1/dev"/>
-        </inkml:channelProperties>
-      </inkml:inkSource>
-      <inkml:timestamp xml:id="ts0" timeString="2025-11-14T20:52:55.342"/>
-    </inkml:context>
-    <inkml:brush xml:id="br0">
-      <inkml:brushProperty name="width" value="0.05" units="cm"/>
-      <inkml:brushProperty name="height" value="0.05" units="cm"/>
-      <inkml:brushProperty name="color" value="#0FB5B1"/>
-    </inkml:brush>
-  </inkml:definitions>
-  <inkml:trace contextRef="#ctx0" brushRef="#br0">1 0 24575,'1'0'0,"1"0"0,2 0 0,2 0 0,0 0 0,0 0 0,1 0 0,-1 2 0,-1-1 0,1 0 0</inkml:trace>
-</inkml:ink>
-</file>
-
 <file path=ppt/ink/ink3.xml><?xml version="1.0" encoding="utf-8"?>
 <inkml:ink xmlns:inkml="http://www.w3.org/2003/InkML">
   <inkml:definitions>
@@ -770,202 +350,6 @@
     </inkml:brush>
   </inkml:definitions>
   <inkml:trace contextRef="#ctx0" brushRef="#br0">0 112 24461,'734'-112'0</inkml:trace>
-</inkml:ink>
-</file>
-
-<file path=ppt/ink/ink30.xml><?xml version="1.0" encoding="utf-8"?>
-<inkml:ink xmlns:inkml="http://www.w3.org/2003/InkML">
-  <inkml:definitions>
-    <inkml:context xml:id="ctx0">
-      <inkml:inkSource xml:id="inkSrc0">
-        <inkml:traceFormat>
-          <inkml:channel name="X" type="integer" min="-2.14748E9" max="2.14748E9" units="cm"/>
-          <inkml:channel name="Y" type="integer" min="-2.14748E9" max="2.14748E9" units="cm"/>
-          <inkml:channel name="F" type="integer" max="32767" units="dev"/>
-        </inkml:traceFormat>
-        <inkml:channelProperties>
-          <inkml:channelProperty channel="X" name="resolution" value="1000" units="1/cm"/>
-          <inkml:channelProperty channel="Y" name="resolution" value="1000" units="1/cm"/>
-          <inkml:channelProperty channel="F" name="resolution" value="0" units="1/dev"/>
-        </inkml:channelProperties>
-      </inkml:inkSource>
-      <inkml:timestamp xml:id="ts0" timeString="2025-11-14T20:53:03.875"/>
-    </inkml:context>
-    <inkml:brush xml:id="br0">
-      <inkml:brushProperty name="width" value="0.05" units="cm"/>
-      <inkml:brushProperty name="height" value="0.05" units="cm"/>
-      <inkml:brushProperty name="color" value="#0FB5B1"/>
-    </inkml:brush>
-  </inkml:definitions>
-  <inkml:trace contextRef="#ctx0" brushRef="#br0">0 0 24347,'1390'0'0</inkml:trace>
-</inkml:ink>
-</file>
-
-<file path=ppt/ink/ink31.xml><?xml version="1.0" encoding="utf-8"?>
-<inkml:ink xmlns:inkml="http://www.w3.org/2003/InkML">
-  <inkml:definitions>
-    <inkml:context xml:id="ctx0">
-      <inkml:inkSource xml:id="inkSrc0">
-        <inkml:traceFormat>
-          <inkml:channel name="X" type="integer" min="-2.14748E9" max="2.14748E9" units="cm"/>
-          <inkml:channel name="Y" type="integer" min="-2.14748E9" max="2.14748E9" units="cm"/>
-          <inkml:channel name="F" type="integer" max="32767" units="dev"/>
-        </inkml:traceFormat>
-        <inkml:channelProperties>
-          <inkml:channelProperty channel="X" name="resolution" value="1000" units="1/cm"/>
-          <inkml:channelProperty channel="Y" name="resolution" value="1000" units="1/cm"/>
-          <inkml:channelProperty channel="F" name="resolution" value="0" units="1/dev"/>
-        </inkml:channelProperties>
-      </inkml:inkSource>
-      <inkml:timestamp xml:id="ts0" timeString="2025-11-14T20:53:08.957"/>
-    </inkml:context>
-    <inkml:brush xml:id="br0">
-      <inkml:brushProperty name="width" value="0.05" units="cm"/>
-      <inkml:brushProperty name="height" value="0.05" units="cm"/>
-      <inkml:brushProperty name="color" value="#0FB5B1"/>
-    </inkml:brush>
-  </inkml:definitions>
-  <inkml:trace contextRef="#ctx0" brushRef="#br0">0 0 24233,'933'0'0</inkml:trace>
-</inkml:ink>
-</file>
-
-<file path=ppt/ink/ink32.xml><?xml version="1.0" encoding="utf-8"?>
-<inkml:ink xmlns:inkml="http://www.w3.org/2003/InkML">
-  <inkml:definitions>
-    <inkml:context xml:id="ctx0">
-      <inkml:inkSource xml:id="inkSrc0">
-        <inkml:traceFormat>
-          <inkml:channel name="X" type="integer" min="-2.14748E9" max="2.14748E9" units="cm"/>
-          <inkml:channel name="Y" type="integer" min="-2.14748E9" max="2.14748E9" units="cm"/>
-          <inkml:channel name="F" type="integer" max="32767" units="dev"/>
-        </inkml:traceFormat>
-        <inkml:channelProperties>
-          <inkml:channelProperty channel="X" name="resolution" value="1000" units="1/cm"/>
-          <inkml:channelProperty channel="Y" name="resolution" value="1000" units="1/cm"/>
-          <inkml:channelProperty channel="F" name="resolution" value="0" units="1/dev"/>
-        </inkml:channelProperties>
-      </inkml:inkSource>
-      <inkml:timestamp xml:id="ts0" timeString="2025-11-14T20:54:15.350"/>
-    </inkml:context>
-    <inkml:brush xml:id="br0">
-      <inkml:brushProperty name="width" value="0.05" units="cm"/>
-      <inkml:brushProperty name="height" value="0.05" units="cm"/>
-      <inkml:brushProperty name="color" value="#B9F9F7"/>
-    </inkml:brush>
-  </inkml:definitions>
-  <inkml:trace contextRef="#ctx0" brushRef="#br0">0 26 24233,'1105'-26'0</inkml:trace>
-</inkml:ink>
-</file>
-
-<file path=ppt/ink/ink33.xml><?xml version="1.0" encoding="utf-8"?>
-<inkml:ink xmlns:inkml="http://www.w3.org/2003/InkML">
-  <inkml:definitions>
-    <inkml:context xml:id="ctx0">
-      <inkml:inkSource xml:id="inkSrc0">
-        <inkml:traceFormat>
-          <inkml:channel name="X" type="integer" min="-2.14748E9" max="2.14748E9" units="cm"/>
-          <inkml:channel name="Y" type="integer" min="-2.14748E9" max="2.14748E9" units="cm"/>
-          <inkml:channel name="F" type="integer" max="32767" units="dev"/>
-        </inkml:traceFormat>
-        <inkml:channelProperties>
-          <inkml:channelProperty channel="X" name="resolution" value="1000" units="1/cm"/>
-          <inkml:channelProperty channel="Y" name="resolution" value="1000" units="1/cm"/>
-          <inkml:channelProperty channel="F" name="resolution" value="0" units="1/dev"/>
-        </inkml:channelProperties>
-      </inkml:inkSource>
-      <inkml:timestamp xml:id="ts0" timeString="2025-11-14T20:54:07.396"/>
-    </inkml:context>
-    <inkml:brush xml:id="br0">
-      <inkml:brushProperty name="width" value="0.05" units="cm"/>
-      <inkml:brushProperty name="height" value="0.05" units="cm"/>
-      <inkml:brushProperty name="color" value="#B9F9F7"/>
-    </inkml:brush>
-  </inkml:definitions>
-  <inkml:trace contextRef="#ctx0" brushRef="#br0">0 7 24575,'671'-6'-1365,"-662"6"-5461</inkml:trace>
-</inkml:ink>
-</file>
-
-<file path=ppt/ink/ink34.xml><?xml version="1.0" encoding="utf-8"?>
-<inkml:ink xmlns:inkml="http://www.w3.org/2003/InkML">
-  <inkml:definitions>
-    <inkml:context xml:id="ctx0">
-      <inkml:inkSource xml:id="inkSrc0">
-        <inkml:traceFormat>
-          <inkml:channel name="X" type="integer" min="-2.14748E9" max="2.14748E9" units="cm"/>
-          <inkml:channel name="Y" type="integer" min="-2.14748E9" max="2.14748E9" units="cm"/>
-          <inkml:channel name="F" type="integer" max="32767" units="dev"/>
-        </inkml:traceFormat>
-        <inkml:channelProperties>
-          <inkml:channelProperty channel="X" name="resolution" value="1000" units="1/cm"/>
-          <inkml:channelProperty channel="Y" name="resolution" value="1000" units="1/cm"/>
-          <inkml:channelProperty channel="F" name="resolution" value="0" units="1/dev"/>
-        </inkml:channelProperties>
-      </inkml:inkSource>
-      <inkml:timestamp xml:id="ts0" timeString="2025-11-14T20:54:09.268"/>
-    </inkml:context>
-    <inkml:brush xml:id="br0">
-      <inkml:brushProperty name="width" value="0.05" units="cm"/>
-      <inkml:brushProperty name="height" value="0.05" units="cm"/>
-      <inkml:brushProperty name="color" value="#B9F9F7"/>
-    </inkml:brush>
-  </inkml:definitions>
-  <inkml:trace contextRef="#ctx0" brushRef="#br0">1 7 24575,'213'2'0,"221"-4"0,74-5-330,-402 7-705,-95 0-5791</inkml:trace>
-</inkml:ink>
-</file>
-
-<file path=ppt/ink/ink35.xml><?xml version="1.0" encoding="utf-8"?>
-<inkml:ink xmlns:inkml="http://www.w3.org/2003/InkML">
-  <inkml:definitions>
-    <inkml:context xml:id="ctx0">
-      <inkml:inkSource xml:id="inkSrc0">
-        <inkml:traceFormat>
-          <inkml:channel name="X" type="integer" min="-2.14748E9" max="2.14748E9" units="cm"/>
-          <inkml:channel name="Y" type="integer" min="-2.14748E9" max="2.14748E9" units="cm"/>
-          <inkml:channel name="F" type="integer" max="32767" units="dev"/>
-        </inkml:traceFormat>
-        <inkml:channelProperties>
-          <inkml:channelProperty channel="X" name="resolution" value="1000" units="1/cm"/>
-          <inkml:channelProperty channel="Y" name="resolution" value="1000" units="1/cm"/>
-          <inkml:channelProperty channel="F" name="resolution" value="0" units="1/dev"/>
-        </inkml:channelProperties>
-      </inkml:inkSource>
-      <inkml:timestamp xml:id="ts0" timeString="2025-11-14T20:54:12.029"/>
-    </inkml:context>
-    <inkml:brush xml:id="br0">
-      <inkml:brushProperty name="width" value="0.05" units="cm"/>
-      <inkml:brushProperty name="height" value="0.05" units="cm"/>
-      <inkml:brushProperty name="color" value="#B9F9F7"/>
-    </inkml:brush>
-  </inkml:definitions>
-  <inkml:trace contextRef="#ctx0" brushRef="#br0">377 14 24575,'3'-1'0,"-1"0"0,1 0 0,0 1 0,1-1 0,-1 0 0,0 1 0,0 0 0,0 0 0,5 0 0,-3 0 0,22-1 0,591-7 0,-603 11 0,-31-1 0,-35 1 0,-959-3 0,1370-2 0,540 8 0,-869-5 0,-241 2 0,44 1 0,36-4 0,-26-1 0,-171 21 0,310-15 0,42-2 0,770 4 0,-481-7 0,-1291 25 0,1088-15 0,550-5 0,-606-5 0,-467 24 0,79-2 0,241-19 0,38-3 0,1 3 0,-57 10 0,186-3 0,560-5 0,-454-6 0,-352 9 0,-249 44 0,235-24 0,133-21 0,50-6 0,8 1 0,25 0 0,52 0 0,103-2 0,418-9 0,-1112 35 0,890-25 0,-511 14 0,-105-4-1365</inkml:trace>
-</inkml:ink>
-</file>
-
-<file path=ppt/ink/ink36.xml><?xml version="1.0" encoding="utf-8"?>
-<inkml:ink xmlns:inkml="http://www.w3.org/2003/InkML">
-  <inkml:definitions>
-    <inkml:context xml:id="ctx0">
-      <inkml:inkSource xml:id="inkSrc0">
-        <inkml:traceFormat>
-          <inkml:channel name="X" type="integer" min="-2.14748E9" max="2.14748E9" units="cm"/>
-          <inkml:channel name="Y" type="integer" min="-2.14748E9" max="2.14748E9" units="cm"/>
-          <inkml:channel name="F" type="integer" max="32767" units="dev"/>
-        </inkml:traceFormat>
-        <inkml:channelProperties>
-          <inkml:channelProperty channel="X" name="resolution" value="1000" units="1/cm"/>
-          <inkml:channelProperty channel="Y" name="resolution" value="1000" units="1/cm"/>
-          <inkml:channelProperty channel="F" name="resolution" value="0" units="1/dev"/>
-        </inkml:channelProperties>
-      </inkml:inkSource>
-      <inkml:timestamp xml:id="ts0" timeString="2025-11-14T20:54:17.827"/>
-    </inkml:context>
-    <inkml:brush xml:id="br0">
-      <inkml:brushProperty name="width" value="0.05" units="cm"/>
-      <inkml:brushProperty name="height" value="0.05" units="cm"/>
-      <inkml:brushProperty name="color" value="#B9F9F7"/>
-    </inkml:brush>
-  </inkml:definitions>
-  <inkml:trace contextRef="#ctx0" brushRef="#br0">220 285 24575,'291'14'0,"-274"-14"0,0 0 0,-1 0 0,1-2 0,0 0 0,-1-1 0,0-1 0,20-6 0,4-2 0,2 2 0,0 2 0,0 1 0,60-1 0,-22 1 0,-71 7 0,28-5 0,-33 3 0,-22 0 0,-861-55 0,833 53 0,38 2 0,30 0 0,285 0 0,160-6 0,-462 8 0,-8-1 0,-16-1 0,-36-2 0,-173-4 0,-140-10 0,355 17 0,-36-7 0,95 1 0,260-7 0,-296 12 0,-12 0 0,-27-2 0,-45-2 0,-73-3 0,454 6 0,-283 3 0,-597-43 0,536 37 0,31 4 0,23 0 0,86 3 0,178 25 0,-255-20 0,-18-3 0,-19 0 0,-222 0 0,149-5 0,172 2-1365,-73 0-5461</inkml:trace>
 </inkml:ink>
 </file>
 
@@ -9013,7 +8397,7 @@
           <p:nvPr>
             <p:extLst>
               <p:ext uri="{D42A27DB-BD31-4B8C-83A1-F6EECF244321}">
-                <p14:modId xmlns:p14="http://schemas.microsoft.com/office/powerpoint/2010/main" val="1727539013"/>
+                <p14:modId xmlns:p14="http://schemas.microsoft.com/office/powerpoint/2010/main" val="499720943"/>
               </p:ext>
             </p:extLst>
           </p:nvPr>
@@ -10933,7 +10317,7 @@
           <p:nvPr>
             <p:extLst>
               <p:ext uri="{D42A27DB-BD31-4B8C-83A1-F6EECF244321}">
-                <p14:modId xmlns:p14="http://schemas.microsoft.com/office/powerpoint/2010/main" val="701022677"/>
+                <p14:modId xmlns:p14="http://schemas.microsoft.com/office/powerpoint/2010/main" val="276473647"/>
               </p:ext>
             </p:extLst>
           </p:nvPr>
@@ -18130,12 +17514,29 @@
           <a:prstGeom prst="rect">
             <a:avLst/>
           </a:prstGeom>
-          <a:solidFill>
-            <a:schemeClr val="accent2">
-              <a:lumMod val="40000"/>
-              <a:lumOff val="60000"/>
-            </a:schemeClr>
-          </a:solidFill>
+          <a:gradFill>
+            <a:gsLst>
+              <a:gs pos="0">
+                <a:srgbClr val="FCEAF7"/>
+              </a:gs>
+              <a:gs pos="24000">
+                <a:srgbClr val="F9D9F0"/>
+              </a:gs>
+              <a:gs pos="70000">
+                <a:schemeClr val="accent2">
+                  <a:lumMod val="40000"/>
+                  <a:lumOff val="60000"/>
+                </a:schemeClr>
+              </a:gs>
+              <a:gs pos="100000">
+                <a:schemeClr val="accent2">
+                  <a:lumMod val="40000"/>
+                  <a:lumOff val="60000"/>
+                </a:schemeClr>
+              </a:gs>
+            </a:gsLst>
+            <a:lin ang="5400000" scaled="1"/>
+          </a:gradFill>
           <a:ln>
             <a:noFill/>
           </a:ln>
@@ -23788,8 +23189,8 @@
           </a:p>
         </p:txBody>
       </p:sp>
-      <mc:AlternateContent xmlns:mc="http://schemas.openxmlformats.org/markup-compatibility/2006">
-        <mc:Choice xmlns:p14="http://schemas.microsoft.com/office/powerpoint/2010/main" Requires="p14">
+      <mc:AlternateContent xmlns:mc="http://schemas.openxmlformats.org/markup-compatibility/2006" xmlns:p14="http://schemas.microsoft.com/office/powerpoint/2010/main">
+        <mc:Choice Requires="p14">
           <p:contentPart p14:bwMode="auto" r:id="rId2">
             <p14:nvContentPartPr>
               <p14:cNvPr id="12" name="Ink 11">
@@ -23808,7 +23209,7 @@
             </p14:xfrm>
           </p:contentPart>
         </mc:Choice>
-        <mc:Fallback>
+        <mc:Fallback xmlns="">
           <p:pic>
             <p:nvPicPr>
               <p:cNvPr id="12" name="Ink 11">
@@ -23839,8 +23240,8 @@
           </p:pic>
         </mc:Fallback>
       </mc:AlternateContent>
-      <mc:AlternateContent xmlns:mc="http://schemas.openxmlformats.org/markup-compatibility/2006">
-        <mc:Choice xmlns:p14="http://schemas.microsoft.com/office/powerpoint/2010/main" Requires="p14">
+      <mc:AlternateContent xmlns:mc="http://schemas.openxmlformats.org/markup-compatibility/2006" xmlns:p14="http://schemas.microsoft.com/office/powerpoint/2010/main">
+        <mc:Choice Requires="p14">
           <p:contentPart p14:bwMode="auto" r:id="rId4">
             <p14:nvContentPartPr>
               <p14:cNvPr id="13" name="Ink 12">
@@ -23859,7 +23260,7 @@
             </p14:xfrm>
           </p:contentPart>
         </mc:Choice>
-        <mc:Fallback>
+        <mc:Fallback xmlns="">
           <p:pic>
             <p:nvPicPr>
               <p:cNvPr id="13" name="Ink 12">
@@ -24020,8 +23421,8 @@
           </a:p>
         </p:txBody>
       </p:sp>
-      <mc:AlternateContent xmlns:mc="http://schemas.openxmlformats.org/markup-compatibility/2006">
-        <mc:Choice xmlns:p14="http://schemas.microsoft.com/office/powerpoint/2010/main" Requires="p14">
+      <mc:AlternateContent xmlns:mc="http://schemas.openxmlformats.org/markup-compatibility/2006" xmlns:p14="http://schemas.microsoft.com/office/powerpoint/2010/main">
+        <mc:Choice Requires="p14">
           <p:contentPart p14:bwMode="auto" r:id="rId6">
             <p14:nvContentPartPr>
               <p14:cNvPr id="25" name="Ink 24">
@@ -24040,7 +23441,7 @@
             </p14:xfrm>
           </p:contentPart>
         </mc:Choice>
-        <mc:Fallback>
+        <mc:Fallback xmlns="">
           <p:pic>
             <p:nvPicPr>
               <p:cNvPr id="25" name="Ink 24">
@@ -24071,8 +23472,8 @@
           </p:pic>
         </mc:Fallback>
       </mc:AlternateContent>
-      <mc:AlternateContent xmlns:mc="http://schemas.openxmlformats.org/markup-compatibility/2006">
-        <mc:Choice xmlns:p14="http://schemas.microsoft.com/office/powerpoint/2010/main" Requires="p14">
+      <mc:AlternateContent xmlns:mc="http://schemas.openxmlformats.org/markup-compatibility/2006" xmlns:p14="http://schemas.microsoft.com/office/powerpoint/2010/main">
+        <mc:Choice Requires="p14">
           <p:contentPart p14:bwMode="auto" r:id="rId8">
             <p14:nvContentPartPr>
               <p14:cNvPr id="27" name="Ink 26">
@@ -24091,7 +23492,7 @@
             </p14:xfrm>
           </p:contentPart>
         </mc:Choice>
-        <mc:Fallback>
+        <mc:Fallback xmlns="">
           <p:pic>
             <p:nvPicPr>
               <p:cNvPr id="27" name="Ink 26">
@@ -24142,8 +23543,8 @@
             <a:chExt cx="564840" cy="174240"/>
           </a:xfrm>
         </p:grpSpPr>
-        <mc:AlternateContent xmlns:mc="http://schemas.openxmlformats.org/markup-compatibility/2006">
-          <mc:Choice xmlns:p14="http://schemas.microsoft.com/office/powerpoint/2010/main" Requires="p14">
+        <mc:AlternateContent xmlns:mc="http://schemas.openxmlformats.org/markup-compatibility/2006" xmlns:p14="http://schemas.microsoft.com/office/powerpoint/2010/main">
+          <mc:Choice Requires="p14">
             <p:contentPart p14:bwMode="auto" r:id="rId10">
               <p14:nvContentPartPr>
                 <p14:cNvPr id="21" name="Ink 20">
@@ -24162,7 +23563,7 @@
               </p14:xfrm>
             </p:contentPart>
           </mc:Choice>
-          <mc:Fallback>
+          <mc:Fallback xmlns="">
             <p:pic>
               <p:nvPicPr>
                 <p:cNvPr id="21" name="Ink 20">
@@ -24193,8 +23594,8 @@
             </p:pic>
           </mc:Fallback>
         </mc:AlternateContent>
-        <mc:AlternateContent xmlns:mc="http://schemas.openxmlformats.org/markup-compatibility/2006">
-          <mc:Choice xmlns:p14="http://schemas.microsoft.com/office/powerpoint/2010/main" Requires="p14">
+        <mc:AlternateContent xmlns:mc="http://schemas.openxmlformats.org/markup-compatibility/2006" xmlns:p14="http://schemas.microsoft.com/office/powerpoint/2010/main">
+          <mc:Choice Requires="p14">
             <p:contentPart p14:bwMode="auto" r:id="rId12">
               <p14:nvContentPartPr>
                 <p14:cNvPr id="22" name="Ink 21">
@@ -24213,7 +23614,7 @@
               </p14:xfrm>
             </p:contentPart>
           </mc:Choice>
-          <mc:Fallback>
+          <mc:Fallback xmlns="">
             <p:pic>
               <p:nvPicPr>
                 <p:cNvPr id="22" name="Ink 21">
@@ -24244,8 +23645,8 @@
             </p:pic>
           </mc:Fallback>
         </mc:AlternateContent>
-        <mc:AlternateContent xmlns:mc="http://schemas.openxmlformats.org/markup-compatibility/2006">
-          <mc:Choice xmlns:p14="http://schemas.microsoft.com/office/powerpoint/2010/main" Requires="p14">
+        <mc:AlternateContent xmlns:mc="http://schemas.openxmlformats.org/markup-compatibility/2006" xmlns:p14="http://schemas.microsoft.com/office/powerpoint/2010/main">
+          <mc:Choice Requires="p14">
             <p:contentPart p14:bwMode="auto" r:id="rId14">
               <p14:nvContentPartPr>
                 <p14:cNvPr id="23" name="Ink 22">
@@ -24264,7 +23665,7 @@
               </p14:xfrm>
             </p:contentPart>
           </mc:Choice>
-          <mc:Fallback>
+          <mc:Fallback xmlns="">
             <p:pic>
               <p:nvPicPr>
                 <p:cNvPr id="23" name="Ink 22">
@@ -24295,8 +23696,8 @@
             </p:pic>
           </mc:Fallback>
         </mc:AlternateContent>
-        <mc:AlternateContent xmlns:mc="http://schemas.openxmlformats.org/markup-compatibility/2006">
-          <mc:Choice xmlns:p14="http://schemas.microsoft.com/office/powerpoint/2010/main" Requires="p14">
+        <mc:AlternateContent xmlns:mc="http://schemas.openxmlformats.org/markup-compatibility/2006" xmlns:p14="http://schemas.microsoft.com/office/powerpoint/2010/main">
+          <mc:Choice Requires="p14">
             <p:contentPart p14:bwMode="auto" r:id="rId16">
               <p14:nvContentPartPr>
                 <p14:cNvPr id="28" name="Ink 27">
@@ -24315,7 +23716,7 @@
               </p14:xfrm>
             </p:contentPart>
           </mc:Choice>
-          <mc:Fallback>
+          <mc:Fallback xmlns="">
             <p:pic>
               <p:nvPicPr>
                 <p:cNvPr id="28" name="Ink 27">
@@ -24346,8 +23747,8 @@
             </p:pic>
           </mc:Fallback>
         </mc:AlternateContent>
-        <mc:AlternateContent xmlns:mc="http://schemas.openxmlformats.org/markup-compatibility/2006">
-          <mc:Choice xmlns:p14="http://schemas.microsoft.com/office/powerpoint/2010/main" Requires="p14">
+        <mc:AlternateContent xmlns:mc="http://schemas.openxmlformats.org/markup-compatibility/2006" xmlns:p14="http://schemas.microsoft.com/office/powerpoint/2010/main">
+          <mc:Choice Requires="p14">
             <p:contentPart p14:bwMode="auto" r:id="rId18">
               <p14:nvContentPartPr>
                 <p14:cNvPr id="29" name="Ink 28">
@@ -24366,7 +23767,7 @@
               </p14:xfrm>
             </p:contentPart>
           </mc:Choice>
-          <mc:Fallback>
+          <mc:Fallback xmlns="">
             <p:pic>
               <p:nvPicPr>
                 <p:cNvPr id="29" name="Ink 28">
@@ -24397,8 +23798,8 @@
             </p:pic>
           </mc:Fallback>
         </mc:AlternateContent>
-        <mc:AlternateContent xmlns:mc="http://schemas.openxmlformats.org/markup-compatibility/2006">
-          <mc:Choice xmlns:p14="http://schemas.microsoft.com/office/powerpoint/2010/main" Requires="p14">
+        <mc:AlternateContent xmlns:mc="http://schemas.openxmlformats.org/markup-compatibility/2006" xmlns:p14="http://schemas.microsoft.com/office/powerpoint/2010/main">
+          <mc:Choice Requires="p14">
             <p:contentPart p14:bwMode="auto" r:id="rId20">
               <p14:nvContentPartPr>
                 <p14:cNvPr id="30" name="Ink 29">
@@ -24417,7 +23818,7 @@
               </p14:xfrm>
             </p:contentPart>
           </mc:Choice>
-          <mc:Fallback>
+          <mc:Fallback xmlns="">
             <p:pic>
               <p:nvPicPr>
                 <p:cNvPr id="30" name="Ink 29">
@@ -24448,8 +23849,8 @@
             </p:pic>
           </mc:Fallback>
         </mc:AlternateContent>
-        <mc:AlternateContent xmlns:mc="http://schemas.openxmlformats.org/markup-compatibility/2006">
-          <mc:Choice xmlns:p14="http://schemas.microsoft.com/office/powerpoint/2010/main" Requires="p14">
+        <mc:AlternateContent xmlns:mc="http://schemas.openxmlformats.org/markup-compatibility/2006" xmlns:p14="http://schemas.microsoft.com/office/powerpoint/2010/main">
+          <mc:Choice Requires="p14">
             <p:contentPart p14:bwMode="auto" r:id="rId22">
               <p14:nvContentPartPr>
                 <p14:cNvPr id="31" name="Ink 30">
@@ -24468,7 +23869,7 @@
               </p14:xfrm>
             </p:contentPart>
           </mc:Choice>
-          <mc:Fallback>
+          <mc:Fallback xmlns="">
             <p:pic>
               <p:nvPicPr>
                 <p:cNvPr id="31" name="Ink 30">
@@ -24499,8 +23900,8 @@
             </p:pic>
           </mc:Fallback>
         </mc:AlternateContent>
-        <mc:AlternateContent xmlns:mc="http://schemas.openxmlformats.org/markup-compatibility/2006">
-          <mc:Choice xmlns:p14="http://schemas.microsoft.com/office/powerpoint/2010/main" Requires="p14">
+        <mc:AlternateContent xmlns:mc="http://schemas.openxmlformats.org/markup-compatibility/2006" xmlns:p14="http://schemas.microsoft.com/office/powerpoint/2010/main">
+          <mc:Choice Requires="p14">
             <p:contentPart p14:bwMode="auto" r:id="rId24">
               <p14:nvContentPartPr>
                 <p14:cNvPr id="32" name="Ink 31">
@@ -24519,7 +23920,7 @@
               </p14:xfrm>
             </p:contentPart>
           </mc:Choice>
-          <mc:Fallback>
+          <mc:Fallback xmlns="">
             <p:pic>
               <p:nvPicPr>
                 <p:cNvPr id="32" name="Ink 31">
@@ -24550,8 +23951,8 @@
             </p:pic>
           </mc:Fallback>
         </mc:AlternateContent>
-        <mc:AlternateContent xmlns:mc="http://schemas.openxmlformats.org/markup-compatibility/2006">
-          <mc:Choice xmlns:p14="http://schemas.microsoft.com/office/powerpoint/2010/main" Requires="p14">
+        <mc:AlternateContent xmlns:mc="http://schemas.openxmlformats.org/markup-compatibility/2006" xmlns:p14="http://schemas.microsoft.com/office/powerpoint/2010/main">
+          <mc:Choice Requires="p14">
             <p:contentPart p14:bwMode="auto" r:id="rId26">
               <p14:nvContentPartPr>
                 <p14:cNvPr id="33" name="Ink 32">
@@ -24570,7 +23971,7 @@
               </p14:xfrm>
             </p:contentPart>
           </mc:Choice>
-          <mc:Fallback>
+          <mc:Fallback xmlns="">
             <p:pic>
               <p:nvPicPr>
                 <p:cNvPr id="33" name="Ink 32">
@@ -24601,8 +24002,8 @@
             </p:pic>
           </mc:Fallback>
         </mc:AlternateContent>
-        <mc:AlternateContent xmlns:mc="http://schemas.openxmlformats.org/markup-compatibility/2006">
-          <mc:Choice xmlns:p14="http://schemas.microsoft.com/office/powerpoint/2010/main" Requires="p14">
+        <mc:AlternateContent xmlns:mc="http://schemas.openxmlformats.org/markup-compatibility/2006" xmlns:p14="http://schemas.microsoft.com/office/powerpoint/2010/main">
+          <mc:Choice Requires="p14">
             <p:contentPart p14:bwMode="auto" r:id="rId28">
               <p14:nvContentPartPr>
                 <p14:cNvPr id="35" name="Ink 34">
@@ -24621,7 +24022,7 @@
               </p14:xfrm>
             </p:contentPart>
           </mc:Choice>
-          <mc:Fallback>
+          <mc:Fallback xmlns="">
             <p:pic>
               <p:nvPicPr>
                 <p:cNvPr id="35" name="Ink 34">
@@ -24644,1170 +24045,6 @@
                 <a:xfrm>
                   <a:off x="6949590" y="1323484"/>
                   <a:ext cx="102240" cy="64800"/>
-                </a:xfrm>
-                <a:prstGeom prst="rect">
-                  <a:avLst/>
-                </a:prstGeom>
-              </p:spPr>
-            </p:pic>
-          </mc:Fallback>
-        </mc:AlternateContent>
-      </p:grpSp>
-      <mc:AlternateContent xmlns:mc="http://schemas.openxmlformats.org/markup-compatibility/2006">
-        <mc:Choice xmlns:p14="http://schemas.microsoft.com/office/powerpoint/2010/main" Requires="p14">
-          <p:contentPart p14:bwMode="auto" r:id="rId30">
-            <p14:nvContentPartPr>
-              <p14:cNvPr id="37" name="Ink 36">
-                <a:extLst>
-                  <a:ext uri="{FF2B5EF4-FFF2-40B4-BE49-F238E27FC236}">
-                    <a16:creationId xmlns:a16="http://schemas.microsoft.com/office/drawing/2014/main" id="{E4A9ECB3-7A08-86E4-49EA-459DF34F3DA0}"/>
-                  </a:ext>
-                </a:extLst>
-              </p14:cNvPr>
-              <p14:cNvContentPartPr/>
-              <p14:nvPr/>
-            </p14:nvContentPartPr>
-            <p14:xfrm>
-              <a:off x="6397305" y="1471645"/>
-              <a:ext cx="284040" cy="69480"/>
-            </p14:xfrm>
-          </p:contentPart>
-        </mc:Choice>
-        <mc:Fallback>
-          <p:pic>
-            <p:nvPicPr>
-              <p:cNvPr id="37" name="Ink 36">
-                <a:extLst>
-                  <a:ext uri="{FF2B5EF4-FFF2-40B4-BE49-F238E27FC236}">
-                    <a16:creationId xmlns:a16="http://schemas.microsoft.com/office/drawing/2014/main" id="{E4A9ECB3-7A08-86E4-49EA-459DF34F3DA0}"/>
-                  </a:ext>
-                </a:extLst>
-              </p:cNvPr>
-              <p:cNvPicPr/>
-              <p:nvPr/>
-            </p:nvPicPr>
-            <p:blipFill>
-              <a:blip r:embed="rId31"/>
-              <a:stretch>
-                <a:fillRect/>
-              </a:stretch>
-            </p:blipFill>
-            <p:spPr>
-              <a:xfrm>
-                <a:off x="6379665" y="1453645"/>
-                <a:ext cx="319680" cy="105120"/>
-              </a:xfrm>
-              <a:prstGeom prst="rect">
-                <a:avLst/>
-              </a:prstGeom>
-            </p:spPr>
-          </p:pic>
-        </mc:Fallback>
-      </mc:AlternateContent>
-      <mc:AlternateContent xmlns:mc="http://schemas.openxmlformats.org/markup-compatibility/2006">
-        <mc:Choice xmlns:p14="http://schemas.microsoft.com/office/powerpoint/2010/main" Requires="p14">
-          <p:contentPart p14:bwMode="auto" r:id="rId32">
-            <p14:nvContentPartPr>
-              <p14:cNvPr id="38" name="Ink 37">
-                <a:extLst>
-                  <a:ext uri="{FF2B5EF4-FFF2-40B4-BE49-F238E27FC236}">
-                    <a16:creationId xmlns:a16="http://schemas.microsoft.com/office/drawing/2014/main" id="{9552B61E-418A-2F64-9D0F-EF5CB1D02C38}"/>
-                  </a:ext>
-                </a:extLst>
-              </p14:cNvPr>
-              <p14:cNvContentPartPr/>
-              <p14:nvPr/>
-            </p14:nvContentPartPr>
-            <p14:xfrm>
-              <a:off x="6692865" y="1457245"/>
-              <a:ext cx="200520" cy="46080"/>
-            </p14:xfrm>
-          </p:contentPart>
-        </mc:Choice>
-        <mc:Fallback>
-          <p:pic>
-            <p:nvPicPr>
-              <p:cNvPr id="38" name="Ink 37">
-                <a:extLst>
-                  <a:ext uri="{FF2B5EF4-FFF2-40B4-BE49-F238E27FC236}">
-                    <a16:creationId xmlns:a16="http://schemas.microsoft.com/office/drawing/2014/main" id="{9552B61E-418A-2F64-9D0F-EF5CB1D02C38}"/>
-                  </a:ext>
-                </a:extLst>
-              </p:cNvPr>
-              <p:cNvPicPr/>
-              <p:nvPr/>
-            </p:nvPicPr>
-            <p:blipFill>
-              <a:blip r:embed="rId33"/>
-              <a:stretch>
-                <a:fillRect/>
-              </a:stretch>
-            </p:blipFill>
-            <p:spPr>
-              <a:xfrm>
-                <a:off x="6674865" y="1439245"/>
-                <a:ext cx="236160" cy="81720"/>
-              </a:xfrm>
-              <a:prstGeom prst="rect">
-                <a:avLst/>
-              </a:prstGeom>
-            </p:spPr>
-          </p:pic>
-        </mc:Fallback>
-      </mc:AlternateContent>
-      <mc:AlternateContent xmlns:mc="http://schemas.openxmlformats.org/markup-compatibility/2006">
-        <mc:Choice xmlns:p14="http://schemas.microsoft.com/office/powerpoint/2010/main" Requires="p14">
-          <p:contentPart p14:bwMode="auto" r:id="rId34">
-            <p14:nvContentPartPr>
-              <p14:cNvPr id="42" name="Ink 41">
-                <a:extLst>
-                  <a:ext uri="{FF2B5EF4-FFF2-40B4-BE49-F238E27FC236}">
-                    <a16:creationId xmlns:a16="http://schemas.microsoft.com/office/drawing/2014/main" id="{A73C3D82-0A8E-C385-984D-30D9AD6C3EE9}"/>
-                  </a:ext>
-                </a:extLst>
-              </p14:cNvPr>
-              <p14:cNvContentPartPr/>
-              <p14:nvPr/>
-            </p14:nvContentPartPr>
-            <p14:xfrm>
-              <a:off x="6899145" y="1460485"/>
-              <a:ext cx="105120" cy="45000"/>
-            </p14:xfrm>
-          </p:contentPart>
-        </mc:Choice>
-        <mc:Fallback>
-          <p:pic>
-            <p:nvPicPr>
-              <p:cNvPr id="42" name="Ink 41">
-                <a:extLst>
-                  <a:ext uri="{FF2B5EF4-FFF2-40B4-BE49-F238E27FC236}">
-                    <a16:creationId xmlns:a16="http://schemas.microsoft.com/office/drawing/2014/main" id="{A73C3D82-0A8E-C385-984D-30D9AD6C3EE9}"/>
-                  </a:ext>
-                </a:extLst>
-              </p:cNvPr>
-              <p:cNvPicPr/>
-              <p:nvPr/>
-            </p:nvPicPr>
-            <p:blipFill>
-              <a:blip r:embed="rId35"/>
-              <a:stretch>
-                <a:fillRect/>
-              </a:stretch>
-            </p:blipFill>
-            <p:spPr>
-              <a:xfrm>
-                <a:off x="6881145" y="1442485"/>
-                <a:ext cx="140760" cy="80640"/>
-              </a:xfrm>
-              <a:prstGeom prst="rect">
-                <a:avLst/>
-              </a:prstGeom>
-            </p:spPr>
-          </p:pic>
-        </mc:Fallback>
-      </mc:AlternateContent>
-      <mc:AlternateContent xmlns:mc="http://schemas.openxmlformats.org/markup-compatibility/2006">
-        <mc:Choice xmlns:p14="http://schemas.microsoft.com/office/powerpoint/2010/main" Requires="p14">
-          <p:contentPart p14:bwMode="auto" r:id="rId36">
-            <p14:nvContentPartPr>
-              <p14:cNvPr id="43" name="Ink 42">
-                <a:extLst>
-                  <a:ext uri="{FF2B5EF4-FFF2-40B4-BE49-F238E27FC236}">
-                    <a16:creationId xmlns:a16="http://schemas.microsoft.com/office/drawing/2014/main" id="{4DB0F9A0-9FF8-E3EA-CC0F-B6C06F3343BD}"/>
-                  </a:ext>
-                </a:extLst>
-              </p14:cNvPr>
-              <p14:cNvContentPartPr/>
-              <p14:nvPr/>
-            </p14:nvContentPartPr>
-            <p14:xfrm>
-              <a:off x="7003905" y="1462645"/>
-              <a:ext cx="133200" cy="45720"/>
-            </p14:xfrm>
-          </p:contentPart>
-        </mc:Choice>
-        <mc:Fallback>
-          <p:pic>
-            <p:nvPicPr>
-              <p:cNvPr id="43" name="Ink 42">
-                <a:extLst>
-                  <a:ext uri="{FF2B5EF4-FFF2-40B4-BE49-F238E27FC236}">
-                    <a16:creationId xmlns:a16="http://schemas.microsoft.com/office/drawing/2014/main" id="{4DB0F9A0-9FF8-E3EA-CC0F-B6C06F3343BD}"/>
-                  </a:ext>
-                </a:extLst>
-              </p:cNvPr>
-              <p:cNvPicPr/>
-              <p:nvPr/>
-            </p:nvPicPr>
-            <p:blipFill>
-              <a:blip r:embed="rId37"/>
-              <a:stretch>
-                <a:fillRect/>
-              </a:stretch>
-            </p:blipFill>
-            <p:spPr>
-              <a:xfrm>
-                <a:off x="6985905" y="1445005"/>
-                <a:ext cx="168840" cy="81360"/>
-              </a:xfrm>
-              <a:prstGeom prst="rect">
-                <a:avLst/>
-              </a:prstGeom>
-            </p:spPr>
-          </p:pic>
-        </mc:Fallback>
-      </mc:AlternateContent>
-      <mc:AlternateContent xmlns:mc="http://schemas.openxmlformats.org/markup-compatibility/2006">
-        <mc:Choice xmlns:p14="http://schemas.microsoft.com/office/powerpoint/2010/main" Requires="p14">
-          <p:contentPart p14:bwMode="auto" r:id="rId38">
-            <p14:nvContentPartPr>
-              <p14:cNvPr id="44" name="Ink 43">
-                <a:extLst>
-                  <a:ext uri="{FF2B5EF4-FFF2-40B4-BE49-F238E27FC236}">
-                    <a16:creationId xmlns:a16="http://schemas.microsoft.com/office/drawing/2014/main" id="{1564B050-AF18-3B41-BEE1-13DF25CBAE5F}"/>
-                  </a:ext>
-                </a:extLst>
-              </p14:cNvPr>
-              <p14:cNvContentPartPr/>
-              <p14:nvPr/>
-            </p14:nvContentPartPr>
-            <p14:xfrm>
-              <a:off x="7146825" y="1479205"/>
-              <a:ext cx="34920" cy="36000"/>
-            </p14:xfrm>
-          </p:contentPart>
-        </mc:Choice>
-        <mc:Fallback>
-          <p:pic>
-            <p:nvPicPr>
-              <p:cNvPr id="44" name="Ink 43">
-                <a:extLst>
-                  <a:ext uri="{FF2B5EF4-FFF2-40B4-BE49-F238E27FC236}">
-                    <a16:creationId xmlns:a16="http://schemas.microsoft.com/office/drawing/2014/main" id="{1564B050-AF18-3B41-BEE1-13DF25CBAE5F}"/>
-                  </a:ext>
-                </a:extLst>
-              </p:cNvPr>
-              <p:cNvPicPr/>
-              <p:nvPr/>
-            </p:nvPicPr>
-            <p:blipFill>
-              <a:blip r:embed="rId39"/>
-              <a:stretch>
-                <a:fillRect/>
-              </a:stretch>
-            </p:blipFill>
-            <p:spPr>
-              <a:xfrm>
-                <a:off x="7128825" y="1461565"/>
-                <a:ext cx="70560" cy="71640"/>
-              </a:xfrm>
-              <a:prstGeom prst="rect">
-                <a:avLst/>
-              </a:prstGeom>
-            </p:spPr>
-          </p:pic>
-        </mc:Fallback>
-      </mc:AlternateContent>
-      <mc:AlternateContent xmlns:mc="http://schemas.openxmlformats.org/markup-compatibility/2006">
-        <mc:Choice xmlns:p14="http://schemas.microsoft.com/office/powerpoint/2010/main" Requires="p14">
-          <p:contentPart p14:bwMode="auto" r:id="rId40">
-            <p14:nvContentPartPr>
-              <p14:cNvPr id="46" name="Ink 45">
-                <a:extLst>
-                  <a:ext uri="{FF2B5EF4-FFF2-40B4-BE49-F238E27FC236}">
-                    <a16:creationId xmlns:a16="http://schemas.microsoft.com/office/drawing/2014/main" id="{B525FE82-DC2A-CDF7-D898-8B69F3BCF311}"/>
-                  </a:ext>
-                </a:extLst>
-              </p14:cNvPr>
-              <p14:cNvContentPartPr/>
-              <p14:nvPr/>
-            </p14:nvContentPartPr>
-            <p14:xfrm>
-              <a:off x="6397305" y="1606285"/>
-              <a:ext cx="360" cy="360"/>
-            </p14:xfrm>
-          </p:contentPart>
-        </mc:Choice>
-        <mc:Fallback>
-          <p:pic>
-            <p:nvPicPr>
-              <p:cNvPr id="46" name="Ink 45">
-                <a:extLst>
-                  <a:ext uri="{FF2B5EF4-FFF2-40B4-BE49-F238E27FC236}">
-                    <a16:creationId xmlns:a16="http://schemas.microsoft.com/office/drawing/2014/main" id="{B525FE82-DC2A-CDF7-D898-8B69F3BCF311}"/>
-                  </a:ext>
-                </a:extLst>
-              </p:cNvPr>
-              <p:cNvPicPr/>
-              <p:nvPr/>
-            </p:nvPicPr>
-            <p:blipFill>
-              <a:blip r:embed="rId41"/>
-              <a:stretch>
-                <a:fillRect/>
-              </a:stretch>
-            </p:blipFill>
-            <p:spPr>
-              <a:xfrm>
-                <a:off x="6334665" y="1543645"/>
-                <a:ext cx="126000" cy="126000"/>
-              </a:xfrm>
-              <a:prstGeom prst="rect">
-                <a:avLst/>
-              </a:prstGeom>
-            </p:spPr>
-          </p:pic>
-        </mc:Fallback>
-      </mc:AlternateContent>
-      <p:grpSp>
-        <p:nvGrpSpPr>
-          <p:cNvPr id="55" name="Group 54">
-            <a:extLst>
-              <a:ext uri="{FF2B5EF4-FFF2-40B4-BE49-F238E27FC236}">
-                <a16:creationId xmlns:a16="http://schemas.microsoft.com/office/drawing/2014/main" id="{4E7E173D-00A3-6DB0-3809-D8AFB7174B70}"/>
-              </a:ext>
-            </a:extLst>
-          </p:cNvPr>
-          <p:cNvGrpSpPr/>
-          <p:nvPr/>
-        </p:nvGrpSpPr>
-        <p:grpSpPr>
-          <a:xfrm>
-            <a:off x="6248265" y="1531405"/>
-            <a:ext cx="1206360" cy="828720"/>
-            <a:chOff x="6248265" y="1531405"/>
-            <a:chExt cx="1206360" cy="828720"/>
-          </a:xfrm>
-        </p:grpSpPr>
-        <mc:AlternateContent xmlns:mc="http://schemas.openxmlformats.org/markup-compatibility/2006">
-          <mc:Choice xmlns:p14="http://schemas.microsoft.com/office/powerpoint/2010/main" Requires="p14">
-            <p:contentPart p14:bwMode="auto" r:id="rId42">
-              <p14:nvContentPartPr>
-                <p14:cNvPr id="47" name="Ink 46">
-                  <a:extLst>
-                    <a:ext uri="{FF2B5EF4-FFF2-40B4-BE49-F238E27FC236}">
-                      <a16:creationId xmlns:a16="http://schemas.microsoft.com/office/drawing/2014/main" id="{86D42EF6-8A64-0B92-B1C4-4C2B20C69C00}"/>
-                    </a:ext>
-                  </a:extLst>
-                </p14:cNvPr>
-                <p14:cNvContentPartPr/>
-                <p14:nvPr/>
-              </p14:nvContentPartPr>
-              <p14:xfrm>
-                <a:off x="6346545" y="1682605"/>
-                <a:ext cx="360" cy="360"/>
-              </p14:xfrm>
-            </p:contentPart>
-          </mc:Choice>
-          <mc:Fallback>
-            <p:pic>
-              <p:nvPicPr>
-                <p:cNvPr id="47" name="Ink 46">
-                  <a:extLst>
-                    <a:ext uri="{FF2B5EF4-FFF2-40B4-BE49-F238E27FC236}">
-                      <a16:creationId xmlns:a16="http://schemas.microsoft.com/office/drawing/2014/main" id="{86D42EF6-8A64-0B92-B1C4-4C2B20C69C00}"/>
-                    </a:ext>
-                  </a:extLst>
-                </p:cNvPr>
-                <p:cNvPicPr/>
-                <p:nvPr/>
-              </p:nvPicPr>
-              <p:blipFill>
-                <a:blip r:embed="rId41"/>
-                <a:stretch>
-                  <a:fillRect/>
-                </a:stretch>
-              </p:blipFill>
-              <p:spPr>
-                <a:xfrm>
-                  <a:off x="6283905" y="1619605"/>
-                  <a:ext cx="126000" cy="126000"/>
-                </a:xfrm>
-                <a:prstGeom prst="rect">
-                  <a:avLst/>
-                </a:prstGeom>
-              </p:spPr>
-            </p:pic>
-          </mc:Fallback>
-        </mc:AlternateContent>
-        <mc:AlternateContent xmlns:mc="http://schemas.openxmlformats.org/markup-compatibility/2006">
-          <mc:Choice xmlns:p14="http://schemas.microsoft.com/office/powerpoint/2010/main" Requires="p14">
-            <p:contentPart p14:bwMode="auto" r:id="rId43">
-              <p14:nvContentPartPr>
-                <p14:cNvPr id="48" name="Ink 47">
-                  <a:extLst>
-                    <a:ext uri="{FF2B5EF4-FFF2-40B4-BE49-F238E27FC236}">
-                      <a16:creationId xmlns:a16="http://schemas.microsoft.com/office/drawing/2014/main" id="{9CEDF741-F399-C4C0-5A68-D9D34E77436A}"/>
-                    </a:ext>
-                  </a:extLst>
-                </p14:cNvPr>
-                <p14:cNvContentPartPr/>
-                <p14:nvPr/>
-              </p14:nvContentPartPr>
-              <p14:xfrm>
-                <a:off x="6343305" y="1672885"/>
-                <a:ext cx="360" cy="360"/>
-              </p14:xfrm>
-            </p:contentPart>
-          </mc:Choice>
-          <mc:Fallback>
-            <p:pic>
-              <p:nvPicPr>
-                <p:cNvPr id="48" name="Ink 47">
-                  <a:extLst>
-                    <a:ext uri="{FF2B5EF4-FFF2-40B4-BE49-F238E27FC236}">
-                      <a16:creationId xmlns:a16="http://schemas.microsoft.com/office/drawing/2014/main" id="{9CEDF741-F399-C4C0-5A68-D9D34E77436A}"/>
-                    </a:ext>
-                  </a:extLst>
-                </p:cNvPr>
-                <p:cNvPicPr/>
-                <p:nvPr/>
-              </p:nvPicPr>
-              <p:blipFill>
-                <a:blip r:embed="rId41"/>
-                <a:stretch>
-                  <a:fillRect/>
-                </a:stretch>
-              </p:blipFill>
-              <p:spPr>
-                <a:xfrm>
-                  <a:off x="6280665" y="1610245"/>
-                  <a:ext cx="126000" cy="126000"/>
-                </a:xfrm>
-                <a:prstGeom prst="rect">
-                  <a:avLst/>
-                </a:prstGeom>
-              </p:spPr>
-            </p:pic>
-          </mc:Fallback>
-        </mc:AlternateContent>
-        <mc:AlternateContent xmlns:mc="http://schemas.openxmlformats.org/markup-compatibility/2006">
-          <mc:Choice xmlns:p14="http://schemas.microsoft.com/office/powerpoint/2010/main" Requires="p14">
-            <p:contentPart p14:bwMode="auto" r:id="rId44">
-              <p14:nvContentPartPr>
-                <p14:cNvPr id="49" name="Ink 48">
-                  <a:extLst>
-                    <a:ext uri="{FF2B5EF4-FFF2-40B4-BE49-F238E27FC236}">
-                      <a16:creationId xmlns:a16="http://schemas.microsoft.com/office/drawing/2014/main" id="{3FF43712-51B7-471D-ED7C-AACB1E2F32D2}"/>
-                    </a:ext>
-                  </a:extLst>
-                </p14:cNvPr>
-                <p14:cNvContentPartPr/>
-                <p14:nvPr/>
-              </p14:nvContentPartPr>
-              <p14:xfrm>
-                <a:off x="6343305" y="1666765"/>
-                <a:ext cx="360" cy="360"/>
-              </p14:xfrm>
-            </p:contentPart>
-          </mc:Choice>
-          <mc:Fallback>
-            <p:pic>
-              <p:nvPicPr>
-                <p:cNvPr id="49" name="Ink 48">
-                  <a:extLst>
-                    <a:ext uri="{FF2B5EF4-FFF2-40B4-BE49-F238E27FC236}">
-                      <a16:creationId xmlns:a16="http://schemas.microsoft.com/office/drawing/2014/main" id="{3FF43712-51B7-471D-ED7C-AACB1E2F32D2}"/>
-                    </a:ext>
-                  </a:extLst>
-                </p:cNvPr>
-                <p:cNvPicPr/>
-                <p:nvPr/>
-              </p:nvPicPr>
-              <p:blipFill>
-                <a:blip r:embed="rId41"/>
-                <a:stretch>
-                  <a:fillRect/>
-                </a:stretch>
-              </p:blipFill>
-              <p:spPr>
-                <a:xfrm>
-                  <a:off x="6280665" y="1603765"/>
-                  <a:ext cx="126000" cy="126000"/>
-                </a:xfrm>
-                <a:prstGeom prst="rect">
-                  <a:avLst/>
-                </a:prstGeom>
-              </p:spPr>
-            </p:pic>
-          </mc:Fallback>
-        </mc:AlternateContent>
-        <mc:AlternateContent xmlns:mc="http://schemas.openxmlformats.org/markup-compatibility/2006">
-          <mc:Choice xmlns:p14="http://schemas.microsoft.com/office/powerpoint/2010/main" Requires="p14">
-            <p:contentPart p14:bwMode="auto" r:id="rId45">
-              <p14:nvContentPartPr>
-                <p14:cNvPr id="51" name="Ink 50">
-                  <a:extLst>
-                    <a:ext uri="{FF2B5EF4-FFF2-40B4-BE49-F238E27FC236}">
-                      <a16:creationId xmlns:a16="http://schemas.microsoft.com/office/drawing/2014/main" id="{60551BAD-52A5-A839-8311-87B679D2EB0C}"/>
-                    </a:ext>
-                  </a:extLst>
-                </p14:cNvPr>
-                <p14:cNvContentPartPr/>
-                <p14:nvPr/>
-              </p14:nvContentPartPr>
-              <p14:xfrm>
-                <a:off x="6248265" y="1698445"/>
-                <a:ext cx="360" cy="1080"/>
-              </p14:xfrm>
-            </p:contentPart>
-          </mc:Choice>
-          <mc:Fallback>
-            <p:pic>
-              <p:nvPicPr>
-                <p:cNvPr id="51" name="Ink 50">
-                  <a:extLst>
-                    <a:ext uri="{FF2B5EF4-FFF2-40B4-BE49-F238E27FC236}">
-                      <a16:creationId xmlns:a16="http://schemas.microsoft.com/office/drawing/2014/main" id="{60551BAD-52A5-A839-8311-87B679D2EB0C}"/>
-                    </a:ext>
-                  </a:extLst>
-                </p:cNvPr>
-                <p:cNvPicPr/>
-                <p:nvPr/>
-              </p:nvPicPr>
-              <p:blipFill>
-                <a:blip r:embed="rId46"/>
-                <a:stretch>
-                  <a:fillRect/>
-                </a:stretch>
-              </p:blipFill>
-              <p:spPr>
-                <a:xfrm>
-                  <a:off x="6212265" y="1662445"/>
-                  <a:ext cx="72000" cy="72720"/>
-                </a:xfrm>
-                <a:prstGeom prst="rect">
-                  <a:avLst/>
-                </a:prstGeom>
-              </p:spPr>
-            </p:pic>
-          </mc:Fallback>
-        </mc:AlternateContent>
-        <mc:AlternateContent xmlns:mc="http://schemas.openxmlformats.org/markup-compatibility/2006">
-          <mc:Choice xmlns:p14="http://schemas.microsoft.com/office/powerpoint/2010/main" Requires="p14">
-            <p:contentPart p14:bwMode="auto" r:id="rId47">
-              <p14:nvContentPartPr>
-                <p14:cNvPr id="52" name="Ink 51">
-                  <a:extLst>
-                    <a:ext uri="{FF2B5EF4-FFF2-40B4-BE49-F238E27FC236}">
-                      <a16:creationId xmlns:a16="http://schemas.microsoft.com/office/drawing/2014/main" id="{431A89C6-F82C-CAE2-4456-A61904B3EE62}"/>
-                    </a:ext>
-                  </a:extLst>
-                </p14:cNvPr>
-                <p14:cNvContentPartPr/>
-                <p14:nvPr/>
-              </p14:nvContentPartPr>
-              <p14:xfrm>
-                <a:off x="6260865" y="1669285"/>
-                <a:ext cx="9000" cy="720"/>
-              </p14:xfrm>
-            </p:contentPart>
-          </mc:Choice>
-          <mc:Fallback>
-            <p:pic>
-              <p:nvPicPr>
-                <p:cNvPr id="52" name="Ink 51">
-                  <a:extLst>
-                    <a:ext uri="{FF2B5EF4-FFF2-40B4-BE49-F238E27FC236}">
-                      <a16:creationId xmlns:a16="http://schemas.microsoft.com/office/drawing/2014/main" id="{431A89C6-F82C-CAE2-4456-A61904B3EE62}"/>
-                    </a:ext>
-                  </a:extLst>
-                </p:cNvPr>
-                <p:cNvPicPr/>
-                <p:nvPr/>
-              </p:nvPicPr>
-              <p:blipFill>
-                <a:blip r:embed="rId48"/>
-                <a:stretch>
-                  <a:fillRect/>
-                </a:stretch>
-              </p:blipFill>
-              <p:spPr>
-                <a:xfrm>
-                  <a:off x="6225225" y="1633645"/>
-                  <a:ext cx="80640" cy="72360"/>
-                </a:xfrm>
-                <a:prstGeom prst="rect">
-                  <a:avLst/>
-                </a:prstGeom>
-              </p:spPr>
-            </p:pic>
-          </mc:Fallback>
-        </mc:AlternateContent>
-        <mc:AlternateContent xmlns:mc="http://schemas.openxmlformats.org/markup-compatibility/2006">
-          <mc:Choice xmlns:p14="http://schemas.microsoft.com/office/powerpoint/2010/main" Requires="p14">
-            <p:contentPart p14:bwMode="auto" r:id="rId49">
-              <p14:nvContentPartPr>
-                <p14:cNvPr id="54" name="Ink 53">
-                  <a:extLst>
-                    <a:ext uri="{FF2B5EF4-FFF2-40B4-BE49-F238E27FC236}">
-                      <a16:creationId xmlns:a16="http://schemas.microsoft.com/office/drawing/2014/main" id="{D54A3B31-3E12-F0E4-610A-BD7BB33A04FD}"/>
-                    </a:ext>
-                  </a:extLst>
-                </p14:cNvPr>
-                <p14:cNvContentPartPr/>
-                <p14:nvPr/>
-              </p14:nvContentPartPr>
-              <p14:xfrm>
-                <a:off x="6326385" y="1531405"/>
-                <a:ext cx="1128240" cy="828720"/>
-              </p14:xfrm>
-            </p:contentPart>
-          </mc:Choice>
-          <mc:Fallback>
-            <p:pic>
-              <p:nvPicPr>
-                <p:cNvPr id="54" name="Ink 53">
-                  <a:extLst>
-                    <a:ext uri="{FF2B5EF4-FFF2-40B4-BE49-F238E27FC236}">
-                      <a16:creationId xmlns:a16="http://schemas.microsoft.com/office/drawing/2014/main" id="{D54A3B31-3E12-F0E4-610A-BD7BB33A04FD}"/>
-                    </a:ext>
-                  </a:extLst>
-                </p:cNvPr>
-                <p:cNvPicPr/>
-                <p:nvPr/>
-              </p:nvPicPr>
-              <p:blipFill>
-                <a:blip r:embed="rId50"/>
-                <a:stretch>
-                  <a:fillRect/>
-                </a:stretch>
-              </p:blipFill>
-              <p:spPr>
-                <a:xfrm>
-                  <a:off x="6290385" y="1495765"/>
-                  <a:ext cx="1199880" cy="900360"/>
-                </a:xfrm>
-                <a:prstGeom prst="rect">
-                  <a:avLst/>
-                </a:prstGeom>
-              </p:spPr>
-            </p:pic>
-          </mc:Fallback>
-        </mc:AlternateContent>
-      </p:grpSp>
-      <mc:AlternateContent xmlns:mc="http://schemas.openxmlformats.org/markup-compatibility/2006">
-        <mc:Choice xmlns:p14="http://schemas.microsoft.com/office/powerpoint/2010/main" Requires="p14">
-          <p:contentPart p14:bwMode="auto" r:id="rId51">
-            <p14:nvContentPartPr>
-              <p14:cNvPr id="56" name="Ink 55">
-                <a:extLst>
-                  <a:ext uri="{FF2B5EF4-FFF2-40B4-BE49-F238E27FC236}">
-                    <a16:creationId xmlns:a16="http://schemas.microsoft.com/office/drawing/2014/main" id="{7645125B-DC8F-8892-EE3F-07909644C618}"/>
-                  </a:ext>
-                </a:extLst>
-              </p14:cNvPr>
-              <p14:cNvContentPartPr/>
-              <p14:nvPr/>
-            </p14:nvContentPartPr>
-            <p14:xfrm>
-              <a:off x="6381105" y="1882645"/>
-              <a:ext cx="864360" cy="1105200"/>
-            </p14:xfrm>
-          </p:contentPart>
-        </mc:Choice>
-        <mc:Fallback>
-          <p:pic>
-            <p:nvPicPr>
-              <p:cNvPr id="56" name="Ink 55">
-                <a:extLst>
-                  <a:ext uri="{FF2B5EF4-FFF2-40B4-BE49-F238E27FC236}">
-                    <a16:creationId xmlns:a16="http://schemas.microsoft.com/office/drawing/2014/main" id="{7645125B-DC8F-8892-EE3F-07909644C618}"/>
-                  </a:ext>
-                </a:extLst>
-              </p:cNvPr>
-              <p:cNvPicPr/>
-              <p:nvPr/>
-            </p:nvPicPr>
-            <p:blipFill>
-              <a:blip r:embed="rId52"/>
-              <a:stretch>
-                <a:fillRect/>
-              </a:stretch>
-            </p:blipFill>
-            <p:spPr>
-              <a:xfrm>
-                <a:off x="6345105" y="1846645"/>
-                <a:ext cx="936000" cy="1176840"/>
-              </a:xfrm>
-              <a:prstGeom prst="rect">
-                <a:avLst/>
-              </a:prstGeom>
-            </p:spPr>
-          </p:pic>
-        </mc:Fallback>
-      </mc:AlternateContent>
-      <mc:AlternateContent xmlns:mc="http://schemas.openxmlformats.org/markup-compatibility/2006">
-        <mc:Choice xmlns:p14="http://schemas.microsoft.com/office/powerpoint/2010/main" Requires="p14">
-          <p:contentPart p14:bwMode="auto" r:id="rId53">
-            <p14:nvContentPartPr>
-              <p14:cNvPr id="57" name="Ink 56">
-                <a:extLst>
-                  <a:ext uri="{FF2B5EF4-FFF2-40B4-BE49-F238E27FC236}">
-                    <a16:creationId xmlns:a16="http://schemas.microsoft.com/office/drawing/2014/main" id="{05C443A3-FFC9-9361-E3AF-F840EA4F226C}"/>
-                  </a:ext>
-                </a:extLst>
-              </p14:cNvPr>
-              <p14:cNvContentPartPr/>
-              <p14:nvPr/>
-            </p14:nvContentPartPr>
-            <p14:xfrm>
-              <a:off x="6466425" y="2147605"/>
-              <a:ext cx="814680" cy="809280"/>
-            </p14:xfrm>
-          </p:contentPart>
-        </mc:Choice>
-        <mc:Fallback>
-          <p:pic>
-            <p:nvPicPr>
-              <p:cNvPr id="57" name="Ink 56">
-                <a:extLst>
-                  <a:ext uri="{FF2B5EF4-FFF2-40B4-BE49-F238E27FC236}">
-                    <a16:creationId xmlns:a16="http://schemas.microsoft.com/office/drawing/2014/main" id="{05C443A3-FFC9-9361-E3AF-F840EA4F226C}"/>
-                  </a:ext>
-                </a:extLst>
-              </p:cNvPr>
-              <p:cNvPicPr/>
-              <p:nvPr/>
-            </p:nvPicPr>
-            <p:blipFill>
-              <a:blip r:embed="rId54"/>
-              <a:stretch>
-                <a:fillRect/>
-              </a:stretch>
-            </p:blipFill>
-            <p:spPr>
-              <a:xfrm>
-                <a:off x="6430425" y="2111605"/>
-                <a:ext cx="886320" cy="880920"/>
-              </a:xfrm>
-              <a:prstGeom prst="rect">
-                <a:avLst/>
-              </a:prstGeom>
-            </p:spPr>
-          </p:pic>
-        </mc:Fallback>
-      </mc:AlternateContent>
-      <mc:AlternateContent xmlns:mc="http://schemas.openxmlformats.org/markup-compatibility/2006">
-        <mc:Choice xmlns:p14="http://schemas.microsoft.com/office/powerpoint/2010/main" Requires="p14">
-          <p:contentPart p14:bwMode="auto" r:id="rId55">
-            <p14:nvContentPartPr>
-              <p14:cNvPr id="58" name="Ink 57">
-                <a:extLst>
-                  <a:ext uri="{FF2B5EF4-FFF2-40B4-BE49-F238E27FC236}">
-                    <a16:creationId xmlns:a16="http://schemas.microsoft.com/office/drawing/2014/main" id="{971C6E00-5842-A231-AF20-9045C18EF94E}"/>
-                  </a:ext>
-                </a:extLst>
-              </p14:cNvPr>
-              <p14:cNvContentPartPr/>
-              <p14:nvPr/>
-            </p14:nvContentPartPr>
-            <p14:xfrm>
-              <a:off x="6683910" y="3024049"/>
-              <a:ext cx="18000" cy="1800"/>
-            </p14:xfrm>
-          </p:contentPart>
-        </mc:Choice>
-        <mc:Fallback>
-          <p:pic>
-            <p:nvPicPr>
-              <p:cNvPr id="58" name="Ink 57">
-                <a:extLst>
-                  <a:ext uri="{FF2B5EF4-FFF2-40B4-BE49-F238E27FC236}">
-                    <a16:creationId xmlns:a16="http://schemas.microsoft.com/office/drawing/2014/main" id="{971C6E00-5842-A231-AF20-9045C18EF94E}"/>
-                  </a:ext>
-                </a:extLst>
-              </p:cNvPr>
-              <p:cNvPicPr/>
-              <p:nvPr/>
-            </p:nvPicPr>
-            <p:blipFill>
-              <a:blip r:embed="rId56"/>
-              <a:stretch>
-                <a:fillRect/>
-              </a:stretch>
-            </p:blipFill>
-            <p:spPr>
-              <a:xfrm>
-                <a:off x="6675270" y="3015049"/>
-                <a:ext cx="35640" cy="19440"/>
-              </a:xfrm>
-              <a:prstGeom prst="rect">
-                <a:avLst/>
-              </a:prstGeom>
-            </p:spPr>
-          </p:pic>
-        </mc:Fallback>
-      </mc:AlternateContent>
-      <mc:AlternateContent xmlns:mc="http://schemas.openxmlformats.org/markup-compatibility/2006">
-        <mc:Choice xmlns:p14="http://schemas.microsoft.com/office/powerpoint/2010/main" Requires="p14">
-          <p:contentPart p14:bwMode="auto" r:id="rId57">
-            <p14:nvContentPartPr>
-              <p14:cNvPr id="60" name="Ink 59">
-                <a:extLst>
-                  <a:ext uri="{FF2B5EF4-FFF2-40B4-BE49-F238E27FC236}">
-                    <a16:creationId xmlns:a16="http://schemas.microsoft.com/office/drawing/2014/main" id="{68596965-7747-00D5-185C-3FC6434F518C}"/>
-                  </a:ext>
-                </a:extLst>
-              </p14:cNvPr>
-              <p14:cNvContentPartPr/>
-              <p14:nvPr/>
-            </p14:nvContentPartPr>
-            <p14:xfrm>
-              <a:off x="6691110" y="3033409"/>
-              <a:ext cx="500760" cy="720"/>
-            </p14:xfrm>
-          </p:contentPart>
-        </mc:Choice>
-        <mc:Fallback>
-          <p:pic>
-            <p:nvPicPr>
-              <p:cNvPr id="60" name="Ink 59">
-                <a:extLst>
-                  <a:ext uri="{FF2B5EF4-FFF2-40B4-BE49-F238E27FC236}">
-                    <a16:creationId xmlns:a16="http://schemas.microsoft.com/office/drawing/2014/main" id="{68596965-7747-00D5-185C-3FC6434F518C}"/>
-                  </a:ext>
-                </a:extLst>
-              </p:cNvPr>
-              <p:cNvPicPr/>
-              <p:nvPr/>
-            </p:nvPicPr>
-            <p:blipFill>
-              <a:blip r:embed="rId58"/>
-              <a:stretch>
-                <a:fillRect/>
-              </a:stretch>
-            </p:blipFill>
-            <p:spPr>
-              <a:xfrm>
-                <a:off x="6682110" y="3015409"/>
-                <a:ext cx="518400" cy="36000"/>
-              </a:xfrm>
-              <a:prstGeom prst="rect">
-                <a:avLst/>
-              </a:prstGeom>
-            </p:spPr>
-          </p:pic>
-        </mc:Fallback>
-      </mc:AlternateContent>
-      <mc:AlternateContent xmlns:mc="http://schemas.openxmlformats.org/markup-compatibility/2006">
-        <mc:Choice xmlns:p14="http://schemas.microsoft.com/office/powerpoint/2010/main" Requires="p14">
-          <p:contentPart p14:bwMode="auto" r:id="rId59">
-            <p14:nvContentPartPr>
-              <p14:cNvPr id="62" name="Ink 61">
-                <a:extLst>
-                  <a:ext uri="{FF2B5EF4-FFF2-40B4-BE49-F238E27FC236}">
-                    <a16:creationId xmlns:a16="http://schemas.microsoft.com/office/drawing/2014/main" id="{60196E28-92FB-E8A0-34A7-525F4F3C9F26}"/>
-                  </a:ext>
-                </a:extLst>
-              </p14:cNvPr>
-              <p14:cNvContentPartPr/>
-              <p14:nvPr/>
-            </p14:nvContentPartPr>
-            <p14:xfrm>
-              <a:off x="6826830" y="3012169"/>
-              <a:ext cx="336240" cy="360"/>
-            </p14:xfrm>
-          </p:contentPart>
-        </mc:Choice>
-        <mc:Fallback>
-          <p:pic>
-            <p:nvPicPr>
-              <p:cNvPr id="62" name="Ink 61">
-                <a:extLst>
-                  <a:ext uri="{FF2B5EF4-FFF2-40B4-BE49-F238E27FC236}">
-                    <a16:creationId xmlns:a16="http://schemas.microsoft.com/office/drawing/2014/main" id="{60196E28-92FB-E8A0-34A7-525F4F3C9F26}"/>
-                  </a:ext>
-                </a:extLst>
-              </p:cNvPr>
-              <p:cNvPicPr/>
-              <p:nvPr/>
-            </p:nvPicPr>
-            <p:blipFill>
-              <a:blip r:embed="rId60"/>
-              <a:stretch>
-                <a:fillRect/>
-              </a:stretch>
-            </p:blipFill>
-            <p:spPr>
-              <a:xfrm>
-                <a:off x="6817830" y="3003169"/>
-                <a:ext cx="353880" cy="18000"/>
-              </a:xfrm>
-              <a:prstGeom prst="rect">
-                <a:avLst/>
-              </a:prstGeom>
-            </p:spPr>
-          </p:pic>
-        </mc:Fallback>
-      </mc:AlternateContent>
-      <mc:AlternateContent xmlns:mc="http://schemas.openxmlformats.org/markup-compatibility/2006">
-        <mc:Choice xmlns:p14="http://schemas.microsoft.com/office/powerpoint/2010/main" Requires="p14">
-          <p:contentPart p14:bwMode="auto" r:id="rId61">
-            <p14:nvContentPartPr>
-              <p14:cNvPr id="68" name="Ink 67">
-                <a:extLst>
-                  <a:ext uri="{FF2B5EF4-FFF2-40B4-BE49-F238E27FC236}">
-                    <a16:creationId xmlns:a16="http://schemas.microsoft.com/office/drawing/2014/main" id="{AAB5BCF8-EE7E-0579-957F-E661C32A2B6B}"/>
-                  </a:ext>
-                </a:extLst>
-              </p14:cNvPr>
-              <p14:cNvContentPartPr/>
-              <p14:nvPr/>
-            </p14:nvContentPartPr>
-            <p14:xfrm>
-              <a:off x="6793440" y="3217046"/>
-              <a:ext cx="398160" cy="9720"/>
-            </p14:xfrm>
-          </p:contentPart>
-        </mc:Choice>
-        <mc:Fallback>
-          <p:pic>
-            <p:nvPicPr>
-              <p:cNvPr id="68" name="Ink 67">
-                <a:extLst>
-                  <a:ext uri="{FF2B5EF4-FFF2-40B4-BE49-F238E27FC236}">
-                    <a16:creationId xmlns:a16="http://schemas.microsoft.com/office/drawing/2014/main" id="{AAB5BCF8-EE7E-0579-957F-E661C32A2B6B}"/>
-                  </a:ext>
-                </a:extLst>
-              </p:cNvPr>
-              <p:cNvPicPr/>
-              <p:nvPr/>
-            </p:nvPicPr>
-            <p:blipFill>
-              <a:blip r:embed="rId62"/>
-              <a:stretch>
-                <a:fillRect/>
-              </a:stretch>
-            </p:blipFill>
-            <p:spPr>
-              <a:xfrm>
-                <a:off x="6784440" y="3208046"/>
-                <a:ext cx="415800" cy="27360"/>
-              </a:xfrm>
-              <a:prstGeom prst="rect">
-                <a:avLst/>
-              </a:prstGeom>
-            </p:spPr>
-          </p:pic>
-        </mc:Fallback>
-      </mc:AlternateContent>
-      <p:grpSp>
-        <p:nvGrpSpPr>
-          <p:cNvPr id="70" name="Group 69">
-            <a:extLst>
-              <a:ext uri="{FF2B5EF4-FFF2-40B4-BE49-F238E27FC236}">
-                <a16:creationId xmlns:a16="http://schemas.microsoft.com/office/drawing/2014/main" id="{247C867B-4A57-B9D5-0781-D76231F05B3C}"/>
-              </a:ext>
-            </a:extLst>
-          </p:cNvPr>
-          <p:cNvGrpSpPr/>
-          <p:nvPr/>
-        </p:nvGrpSpPr>
-        <p:grpSpPr>
-          <a:xfrm>
-            <a:off x="6677160" y="3066926"/>
-            <a:ext cx="524520" cy="141120"/>
-            <a:chOff x="6677160" y="3066926"/>
-            <a:chExt cx="524520" cy="141120"/>
-          </a:xfrm>
-        </p:grpSpPr>
-        <mc:AlternateContent xmlns:mc="http://schemas.openxmlformats.org/markup-compatibility/2006">
-          <mc:Choice xmlns:p14="http://schemas.microsoft.com/office/powerpoint/2010/main" Requires="p14">
-            <p:contentPart p14:bwMode="auto" r:id="rId63">
-              <p14:nvContentPartPr>
-                <p14:cNvPr id="63" name="Ink 62">
-                  <a:extLst>
-                    <a:ext uri="{FF2B5EF4-FFF2-40B4-BE49-F238E27FC236}">
-                      <a16:creationId xmlns:a16="http://schemas.microsoft.com/office/drawing/2014/main" id="{85B4A7D6-02D4-54FF-1A73-656B6B08317D}"/>
-                    </a:ext>
-                  </a:extLst>
-                </p14:cNvPr>
-                <p14:cNvContentPartPr/>
-                <p14:nvPr/>
-              </p14:nvContentPartPr>
-              <p14:xfrm>
-                <a:off x="6703080" y="3071606"/>
-                <a:ext cx="245160" cy="2880"/>
-              </p14:xfrm>
-            </p:contentPart>
-          </mc:Choice>
-          <mc:Fallback>
-            <p:pic>
-              <p:nvPicPr>
-                <p:cNvPr id="63" name="Ink 62">
-                  <a:extLst>
-                    <a:ext uri="{FF2B5EF4-FFF2-40B4-BE49-F238E27FC236}">
-                      <a16:creationId xmlns:a16="http://schemas.microsoft.com/office/drawing/2014/main" id="{85B4A7D6-02D4-54FF-1A73-656B6B08317D}"/>
-                    </a:ext>
-                  </a:extLst>
-                </p:cNvPr>
-                <p:cNvPicPr/>
-                <p:nvPr/>
-              </p:nvPicPr>
-              <p:blipFill>
-                <a:blip r:embed="rId64"/>
-                <a:stretch>
-                  <a:fillRect/>
-                </a:stretch>
-              </p:blipFill>
-              <p:spPr>
-                <a:xfrm>
-                  <a:off x="6694080" y="3062966"/>
-                  <a:ext cx="262800" cy="20520"/>
-                </a:xfrm>
-                <a:prstGeom prst="rect">
-                  <a:avLst/>
-                </a:prstGeom>
-              </p:spPr>
-            </p:pic>
-          </mc:Fallback>
-        </mc:AlternateContent>
-        <mc:AlternateContent xmlns:mc="http://schemas.openxmlformats.org/markup-compatibility/2006">
-          <mc:Choice xmlns:p14="http://schemas.microsoft.com/office/powerpoint/2010/main" Requires="p14">
-            <p:contentPart p14:bwMode="auto" r:id="rId65">
-              <p14:nvContentPartPr>
-                <p14:cNvPr id="64" name="Ink 63">
-                  <a:extLst>
-                    <a:ext uri="{FF2B5EF4-FFF2-40B4-BE49-F238E27FC236}">
-                      <a16:creationId xmlns:a16="http://schemas.microsoft.com/office/drawing/2014/main" id="{86C1B5E1-5464-C170-1193-A6E07245A106}"/>
-                    </a:ext>
-                  </a:extLst>
-                </p14:cNvPr>
-                <p14:cNvContentPartPr/>
-                <p14:nvPr/>
-              </p14:nvContentPartPr>
-              <p14:xfrm>
-                <a:off x="6743400" y="3066926"/>
-                <a:ext cx="458280" cy="3600"/>
-              </p14:xfrm>
-            </p:contentPart>
-          </mc:Choice>
-          <mc:Fallback>
-            <p:pic>
-              <p:nvPicPr>
-                <p:cNvPr id="64" name="Ink 63">
-                  <a:extLst>
-                    <a:ext uri="{FF2B5EF4-FFF2-40B4-BE49-F238E27FC236}">
-                      <a16:creationId xmlns:a16="http://schemas.microsoft.com/office/drawing/2014/main" id="{86C1B5E1-5464-C170-1193-A6E07245A106}"/>
-                    </a:ext>
-                  </a:extLst>
-                </p:cNvPr>
-                <p:cNvPicPr/>
-                <p:nvPr/>
-              </p:nvPicPr>
-              <p:blipFill>
-                <a:blip r:embed="rId66"/>
-                <a:stretch>
-                  <a:fillRect/>
-                </a:stretch>
-              </p:blipFill>
-              <p:spPr>
-                <a:xfrm>
-                  <a:off x="6734760" y="3057926"/>
-                  <a:ext cx="475920" cy="21240"/>
-                </a:xfrm>
-                <a:prstGeom prst="rect">
-                  <a:avLst/>
-                </a:prstGeom>
-              </p:spPr>
-            </p:pic>
-          </mc:Fallback>
-        </mc:AlternateContent>
-        <mc:AlternateContent xmlns:mc="http://schemas.openxmlformats.org/markup-compatibility/2006">
-          <mc:Choice xmlns:p14="http://schemas.microsoft.com/office/powerpoint/2010/main" Requires="p14">
-            <p:contentPart p14:bwMode="auto" r:id="rId67">
-              <p14:nvContentPartPr>
-                <p14:cNvPr id="65" name="Ink 64">
-                  <a:extLst>
-                    <a:ext uri="{FF2B5EF4-FFF2-40B4-BE49-F238E27FC236}">
-                      <a16:creationId xmlns:a16="http://schemas.microsoft.com/office/drawing/2014/main" id="{A3EF33A2-FCF0-0E75-C5C1-E3AEA8EF3206}"/>
-                    </a:ext>
-                  </a:extLst>
-                </p14:cNvPr>
-                <p14:cNvContentPartPr/>
-                <p14:nvPr/>
-              </p14:nvContentPartPr>
-              <p14:xfrm>
-                <a:off x="6677160" y="3092846"/>
-                <a:ext cx="511200" cy="115200"/>
-              </p14:xfrm>
-            </p:contentPart>
-          </mc:Choice>
-          <mc:Fallback>
-            <p:pic>
-              <p:nvPicPr>
-                <p:cNvPr id="65" name="Ink 64">
-                  <a:extLst>
-                    <a:ext uri="{FF2B5EF4-FFF2-40B4-BE49-F238E27FC236}">
-                      <a16:creationId xmlns:a16="http://schemas.microsoft.com/office/drawing/2014/main" id="{A3EF33A2-FCF0-0E75-C5C1-E3AEA8EF3206}"/>
-                    </a:ext>
-                  </a:extLst>
-                </p:cNvPr>
-                <p:cNvPicPr/>
-                <p:nvPr/>
-              </p:nvPicPr>
-              <p:blipFill>
-                <a:blip r:embed="rId68"/>
-                <a:stretch>
-                  <a:fillRect/>
-                </a:stretch>
-              </p:blipFill>
-              <p:spPr>
-                <a:xfrm>
-                  <a:off x="6668160" y="3083846"/>
-                  <a:ext cx="528840" cy="132840"/>
-                </a:xfrm>
-                <a:prstGeom prst="rect">
-                  <a:avLst/>
-                </a:prstGeom>
-              </p:spPr>
-            </p:pic>
-          </mc:Fallback>
-        </mc:AlternateContent>
-        <mc:AlternateContent xmlns:mc="http://schemas.openxmlformats.org/markup-compatibility/2006">
-          <mc:Choice xmlns:p14="http://schemas.microsoft.com/office/powerpoint/2010/main" Requires="p14">
-            <p:contentPart p14:bwMode="auto" r:id="rId69">
-              <p14:nvContentPartPr>
-                <p14:cNvPr id="69" name="Ink 68">
-                  <a:extLst>
-                    <a:ext uri="{FF2B5EF4-FFF2-40B4-BE49-F238E27FC236}">
-                      <a16:creationId xmlns:a16="http://schemas.microsoft.com/office/drawing/2014/main" id="{795AC9A8-D149-166F-8869-EE07DBCC1CD5}"/>
-                    </a:ext>
-                  </a:extLst>
-                </p14:cNvPr>
-                <p14:cNvContentPartPr/>
-                <p14:nvPr/>
-              </p14:nvContentPartPr>
-              <p14:xfrm>
-                <a:off x="6738360" y="3095366"/>
-                <a:ext cx="382320" cy="108000"/>
-              </p14:xfrm>
-            </p:contentPart>
-          </mc:Choice>
-          <mc:Fallback>
-            <p:pic>
-              <p:nvPicPr>
-                <p:cNvPr id="69" name="Ink 68">
-                  <a:extLst>
-                    <a:ext uri="{FF2B5EF4-FFF2-40B4-BE49-F238E27FC236}">
-                      <a16:creationId xmlns:a16="http://schemas.microsoft.com/office/drawing/2014/main" id="{795AC9A8-D149-166F-8869-EE07DBCC1CD5}"/>
-                    </a:ext>
-                  </a:extLst>
-                </p:cNvPr>
-                <p:cNvPicPr/>
-                <p:nvPr/>
-              </p:nvPicPr>
-              <p:blipFill>
-                <a:blip r:embed="rId70"/>
-                <a:stretch>
-                  <a:fillRect/>
-                </a:stretch>
-              </p:blipFill>
-              <p:spPr>
-                <a:xfrm>
-                  <a:off x="6729720" y="3086366"/>
-                  <a:ext cx="399960" cy="125640"/>
                 </a:xfrm>
                 <a:prstGeom prst="rect">
                   <a:avLst/>

</xml_diff>

<commit_message>
almost fully functional game
</commit_message>
<xml_diff>
--- a/misc/state possibilities for figures.pptx
+++ b/misc/state possibilities for figures.pptx
@@ -11740,7 +11740,7 @@
           <a:p>
             <a:fld id="{9A3D6B63-7973-4513-BC84-C3DC84D916C6}" type="datetimeFigureOut">
               <a:rPr lang="en-CA" smtClean="0"/>
-              <a:t>2025-11-18</a:t>
+              <a:t>2025-11-19</a:t>
             </a:fld>
             <a:endParaRPr lang="en-CA"/>
           </a:p>
@@ -11940,7 +11940,7 @@
           <a:p>
             <a:fld id="{9A3D6B63-7973-4513-BC84-C3DC84D916C6}" type="datetimeFigureOut">
               <a:rPr lang="en-CA" smtClean="0"/>
-              <a:t>2025-11-18</a:t>
+              <a:t>2025-11-19</a:t>
             </a:fld>
             <a:endParaRPr lang="en-CA"/>
           </a:p>
@@ -12150,7 +12150,7 @@
           <a:p>
             <a:fld id="{9A3D6B63-7973-4513-BC84-C3DC84D916C6}" type="datetimeFigureOut">
               <a:rPr lang="en-CA" smtClean="0"/>
-              <a:t>2025-11-18</a:t>
+              <a:t>2025-11-19</a:t>
             </a:fld>
             <a:endParaRPr lang="en-CA"/>
           </a:p>
@@ -12350,7 +12350,7 @@
           <a:p>
             <a:fld id="{9A3D6B63-7973-4513-BC84-C3DC84D916C6}" type="datetimeFigureOut">
               <a:rPr lang="en-CA" smtClean="0"/>
-              <a:t>2025-11-18</a:t>
+              <a:t>2025-11-19</a:t>
             </a:fld>
             <a:endParaRPr lang="en-CA"/>
           </a:p>
@@ -12626,7 +12626,7 @@
           <a:p>
             <a:fld id="{9A3D6B63-7973-4513-BC84-C3DC84D916C6}" type="datetimeFigureOut">
               <a:rPr lang="en-CA" smtClean="0"/>
-              <a:t>2025-11-18</a:t>
+              <a:t>2025-11-19</a:t>
             </a:fld>
             <a:endParaRPr lang="en-CA"/>
           </a:p>
@@ -12894,7 +12894,7 @@
           <a:p>
             <a:fld id="{9A3D6B63-7973-4513-BC84-C3DC84D916C6}" type="datetimeFigureOut">
               <a:rPr lang="en-CA" smtClean="0"/>
-              <a:t>2025-11-18</a:t>
+              <a:t>2025-11-19</a:t>
             </a:fld>
             <a:endParaRPr lang="en-CA"/>
           </a:p>
@@ -13309,7 +13309,7 @@
           <a:p>
             <a:fld id="{9A3D6B63-7973-4513-BC84-C3DC84D916C6}" type="datetimeFigureOut">
               <a:rPr lang="en-CA" smtClean="0"/>
-              <a:t>2025-11-18</a:t>
+              <a:t>2025-11-19</a:t>
             </a:fld>
             <a:endParaRPr lang="en-CA"/>
           </a:p>
@@ -13451,7 +13451,7 @@
           <a:p>
             <a:fld id="{9A3D6B63-7973-4513-BC84-C3DC84D916C6}" type="datetimeFigureOut">
               <a:rPr lang="en-CA" smtClean="0"/>
-              <a:t>2025-11-18</a:t>
+              <a:t>2025-11-19</a:t>
             </a:fld>
             <a:endParaRPr lang="en-CA"/>
           </a:p>
@@ -13564,7 +13564,7 @@
           <a:p>
             <a:fld id="{9A3D6B63-7973-4513-BC84-C3DC84D916C6}" type="datetimeFigureOut">
               <a:rPr lang="en-CA" smtClean="0"/>
-              <a:t>2025-11-18</a:t>
+              <a:t>2025-11-19</a:t>
             </a:fld>
             <a:endParaRPr lang="en-CA"/>
           </a:p>
@@ -13877,7 +13877,7 @@
           <a:p>
             <a:fld id="{9A3D6B63-7973-4513-BC84-C3DC84D916C6}" type="datetimeFigureOut">
               <a:rPr lang="en-CA" smtClean="0"/>
-              <a:t>2025-11-18</a:t>
+              <a:t>2025-11-19</a:t>
             </a:fld>
             <a:endParaRPr lang="en-CA"/>
           </a:p>
@@ -14166,7 +14166,7 @@
           <a:p>
             <a:fld id="{9A3D6B63-7973-4513-BC84-C3DC84D916C6}" type="datetimeFigureOut">
               <a:rPr lang="en-CA" smtClean="0"/>
-              <a:t>2025-11-18</a:t>
+              <a:t>2025-11-19</a:t>
             </a:fld>
             <a:endParaRPr lang="en-CA"/>
           </a:p>
@@ -14409,7 +14409,7 @@
           <a:p>
             <a:fld id="{9A3D6B63-7973-4513-BC84-C3DC84D916C6}" type="datetimeFigureOut">
               <a:rPr lang="en-CA" smtClean="0"/>
-              <a:t>2025-11-18</a:t>
+              <a:t>2025-11-19</a:t>
             </a:fld>
             <a:endParaRPr lang="en-CA"/>
           </a:p>
@@ -16170,376 +16170,645 @@
           <a:chExt cx="0" cy="0"/>
         </a:xfrm>
       </p:grpSpPr>
-      <p:sp>
-        <p:nvSpPr>
-          <p:cNvPr id="4" name="Oval 3">
+      <p:grpSp>
+        <p:nvGrpSpPr>
+          <p:cNvPr id="13" name="Group 12">
             <a:extLst>
               <a:ext uri="{FF2B5EF4-FFF2-40B4-BE49-F238E27FC236}">
-                <a16:creationId xmlns:a16="http://schemas.microsoft.com/office/drawing/2014/main" id="{ED69BF1D-52C3-25FC-1BBF-27741A647D47}"/>
+                <a16:creationId xmlns:a16="http://schemas.microsoft.com/office/drawing/2014/main" id="{461504DC-CF8F-338A-7629-784239D0482C}"/>
               </a:ext>
             </a:extLst>
           </p:cNvPr>
-          <p:cNvSpPr/>
+          <p:cNvGrpSpPr/>
           <p:nvPr/>
-        </p:nvSpPr>
-        <p:spPr>
-          <a:xfrm rot="2311774">
-            <a:off x="5764453" y="2682581"/>
-            <a:ext cx="1322877" cy="2401108"/>
+        </p:nvGrpSpPr>
+        <p:grpSpPr>
+          <a:xfrm>
+            <a:off x="3826843" y="1361358"/>
+            <a:ext cx="4538314" cy="4135284"/>
+            <a:chOff x="3958117" y="948405"/>
+            <a:chExt cx="4538314" cy="4135284"/>
           </a:xfrm>
-          <a:prstGeom prst="ellipse">
-            <a:avLst/>
-          </a:prstGeom>
-        </p:spPr>
-        <p:style>
-          <a:lnRef idx="2">
-            <a:schemeClr val="accent1">
-              <a:shade val="15000"/>
-            </a:schemeClr>
-          </a:lnRef>
-          <a:fillRef idx="1">
-            <a:schemeClr val="accent1"/>
-          </a:fillRef>
-          <a:effectRef idx="0">
-            <a:schemeClr val="accent1"/>
-          </a:effectRef>
-          <a:fontRef idx="minor">
-            <a:schemeClr val="lt1"/>
-          </a:fontRef>
-        </p:style>
-        <p:txBody>
-          <a:bodyPr rtlCol="0" anchor="ctr"/>
-          <a:lstStyle/>
-          <a:p>
-            <a:pPr algn="ctr"/>
-            <a:endParaRPr lang="en-CA"/>
-          </a:p>
-        </p:txBody>
-      </p:sp>
-      <p:sp>
-        <p:nvSpPr>
-          <p:cNvPr id="3" name="Oval 2">
-            <a:extLst>
-              <a:ext uri="{FF2B5EF4-FFF2-40B4-BE49-F238E27FC236}">
-                <a16:creationId xmlns:a16="http://schemas.microsoft.com/office/drawing/2014/main" id="{76985402-11B5-5602-05E6-0E7B6B782714}"/>
-              </a:ext>
-            </a:extLst>
-          </p:cNvPr>
-          <p:cNvSpPr/>
-          <p:nvPr/>
-        </p:nvSpPr>
-        <p:spPr>
-          <a:xfrm rot="8174236">
-            <a:off x="4955877" y="3253168"/>
-            <a:ext cx="606217" cy="1787274"/>
-          </a:xfrm>
-          <a:prstGeom prst="ellipse">
-            <a:avLst/>
-          </a:prstGeom>
-        </p:spPr>
-        <p:style>
-          <a:lnRef idx="2">
-            <a:schemeClr val="accent1">
-              <a:shade val="15000"/>
-            </a:schemeClr>
-          </a:lnRef>
-          <a:fillRef idx="1">
-            <a:schemeClr val="accent1"/>
-          </a:fillRef>
-          <a:effectRef idx="0">
-            <a:schemeClr val="accent1"/>
-          </a:effectRef>
-          <a:fontRef idx="minor">
-            <a:schemeClr val="lt1"/>
-          </a:fontRef>
-        </p:style>
-        <p:txBody>
-          <a:bodyPr rtlCol="0" anchor="ctr"/>
-          <a:lstStyle/>
-          <a:p>
-            <a:pPr algn="ctr"/>
-            <a:endParaRPr lang="en-CA"/>
-          </a:p>
-        </p:txBody>
-      </p:sp>
-      <p:sp>
-        <p:nvSpPr>
-          <p:cNvPr id="5" name="Rectangle: Rounded Corners 4">
-            <a:extLst>
-              <a:ext uri="{FF2B5EF4-FFF2-40B4-BE49-F238E27FC236}">
-                <a16:creationId xmlns:a16="http://schemas.microsoft.com/office/drawing/2014/main" id="{3F53D605-69FC-7FE1-E003-191F6F148241}"/>
-              </a:ext>
-            </a:extLst>
-          </p:cNvPr>
-          <p:cNvSpPr/>
-          <p:nvPr/>
-        </p:nvSpPr>
-        <p:spPr>
-          <a:xfrm>
-            <a:off x="4459224" y="3986784"/>
-            <a:ext cx="3273552" cy="603504"/>
-          </a:xfrm>
-          <a:prstGeom prst="roundRect">
-            <a:avLst>
-              <a:gd name="adj" fmla="val 50000"/>
-            </a:avLst>
-          </a:prstGeom>
-        </p:spPr>
-        <p:style>
-          <a:lnRef idx="2">
-            <a:schemeClr val="accent1">
-              <a:shade val="15000"/>
-            </a:schemeClr>
-          </a:lnRef>
-          <a:fillRef idx="1">
-            <a:schemeClr val="accent1"/>
-          </a:fillRef>
-          <a:effectRef idx="0">
-            <a:schemeClr val="accent1"/>
-          </a:effectRef>
-          <a:fontRef idx="minor">
-            <a:schemeClr val="lt1"/>
-          </a:fontRef>
-        </p:style>
-        <p:txBody>
-          <a:bodyPr rtlCol="0" anchor="ctr"/>
-          <a:lstStyle/>
-          <a:p>
-            <a:pPr algn="ctr"/>
-            <a:endParaRPr lang="en-CA"/>
-          </a:p>
-        </p:txBody>
-      </p:sp>
-      <p:sp>
-        <p:nvSpPr>
-          <p:cNvPr id="2" name="Oval 1">
-            <a:extLst>
-              <a:ext uri="{FF2B5EF4-FFF2-40B4-BE49-F238E27FC236}">
-                <a16:creationId xmlns:a16="http://schemas.microsoft.com/office/drawing/2014/main" id="{81C0A52C-EDCD-F1D4-14B9-2BD6BCA6B98D}"/>
-              </a:ext>
-            </a:extLst>
-          </p:cNvPr>
-          <p:cNvSpPr/>
-          <p:nvPr/>
-        </p:nvSpPr>
-        <p:spPr>
-          <a:xfrm rot="2311774">
-            <a:off x="3958117" y="3300984"/>
-            <a:ext cx="533400" cy="1691640"/>
-          </a:xfrm>
-          <a:prstGeom prst="ellipse">
-            <a:avLst/>
-          </a:prstGeom>
-        </p:spPr>
-        <p:style>
-          <a:lnRef idx="2">
-            <a:schemeClr val="accent1">
-              <a:shade val="15000"/>
-            </a:schemeClr>
-          </a:lnRef>
-          <a:fillRef idx="1">
-            <a:schemeClr val="accent1"/>
-          </a:fillRef>
-          <a:effectRef idx="0">
-            <a:schemeClr val="accent1"/>
-          </a:effectRef>
-          <a:fontRef idx="minor">
-            <a:schemeClr val="lt1"/>
-          </a:fontRef>
-        </p:style>
-        <p:txBody>
-          <a:bodyPr rtlCol="0" anchor="ctr"/>
-          <a:lstStyle/>
-          <a:p>
-            <a:pPr algn="ctr"/>
-            <a:endParaRPr lang="en-CA"/>
-          </a:p>
-        </p:txBody>
-      </p:sp>
-      <p:sp>
-        <p:nvSpPr>
-          <p:cNvPr id="11" name="Oval 10">
-            <a:extLst>
-              <a:ext uri="{FF2B5EF4-FFF2-40B4-BE49-F238E27FC236}">
-                <a16:creationId xmlns:a16="http://schemas.microsoft.com/office/drawing/2014/main" id="{13075ADF-DF52-FE58-319B-C5E46D4431F3}"/>
-              </a:ext>
-            </a:extLst>
-          </p:cNvPr>
-          <p:cNvSpPr/>
-          <p:nvPr/>
-        </p:nvSpPr>
-        <p:spPr>
-          <a:xfrm>
-            <a:off x="5925312" y="1124712"/>
-            <a:ext cx="2185416" cy="2048256"/>
-          </a:xfrm>
-          <a:prstGeom prst="ellipse">
-            <a:avLst/>
-          </a:prstGeom>
-        </p:spPr>
-        <p:style>
-          <a:lnRef idx="2">
-            <a:schemeClr val="accent1">
-              <a:shade val="15000"/>
-            </a:schemeClr>
-          </a:lnRef>
-          <a:fillRef idx="1">
-            <a:schemeClr val="accent1"/>
-          </a:fillRef>
-          <a:effectRef idx="0">
-            <a:schemeClr val="accent1"/>
-          </a:effectRef>
-          <a:fontRef idx="minor">
-            <a:schemeClr val="lt1"/>
-          </a:fontRef>
-        </p:style>
-        <p:txBody>
-          <a:bodyPr rtlCol="0" anchor="ctr"/>
-          <a:lstStyle/>
-          <a:p>
-            <a:pPr algn="ctr"/>
-            <a:endParaRPr lang="en-CA"/>
-          </a:p>
-        </p:txBody>
-      </p:sp>
-      <p:sp>
-        <p:nvSpPr>
-          <p:cNvPr id="14" name="Oval 13">
-            <a:extLst>
-              <a:ext uri="{FF2B5EF4-FFF2-40B4-BE49-F238E27FC236}">
-                <a16:creationId xmlns:a16="http://schemas.microsoft.com/office/drawing/2014/main" id="{9EA14FC4-BE20-5CBB-1B98-AA30B6BF2DDB}"/>
-              </a:ext>
-            </a:extLst>
-          </p:cNvPr>
-          <p:cNvSpPr/>
-          <p:nvPr/>
-        </p:nvSpPr>
-        <p:spPr>
-          <a:xfrm rot="1875076">
-            <a:off x="6159190" y="3086972"/>
-            <a:ext cx="533400" cy="1691640"/>
-          </a:xfrm>
-          <a:prstGeom prst="ellipse">
-            <a:avLst/>
-          </a:prstGeom>
-        </p:spPr>
-        <p:style>
-          <a:lnRef idx="2">
-            <a:schemeClr val="accent1">
-              <a:shade val="15000"/>
-            </a:schemeClr>
-          </a:lnRef>
-          <a:fillRef idx="1">
-            <a:schemeClr val="accent1"/>
-          </a:fillRef>
-          <a:effectRef idx="0">
-            <a:schemeClr val="accent1"/>
-          </a:effectRef>
-          <a:fontRef idx="minor">
-            <a:schemeClr val="lt1"/>
-          </a:fontRef>
-        </p:style>
-        <p:txBody>
-          <a:bodyPr rtlCol="0" anchor="ctr"/>
-          <a:lstStyle/>
-          <a:p>
-            <a:pPr algn="ctr"/>
-            <a:endParaRPr lang="en-CA"/>
-          </a:p>
-        </p:txBody>
-      </p:sp>
-      <p:sp>
-        <p:nvSpPr>
-          <p:cNvPr id="6" name="Rectangle: Rounded Corners 5">
-            <a:extLst>
-              <a:ext uri="{FF2B5EF4-FFF2-40B4-BE49-F238E27FC236}">
-                <a16:creationId xmlns:a16="http://schemas.microsoft.com/office/drawing/2014/main" id="{0D9AC8EB-644A-A58A-A475-612676716F99}"/>
-              </a:ext>
-            </a:extLst>
-          </p:cNvPr>
-          <p:cNvSpPr/>
-          <p:nvPr/>
-        </p:nvSpPr>
-        <p:spPr>
-          <a:xfrm rot="1782648">
-            <a:off x="5437803" y="1198039"/>
-            <a:ext cx="3006406" cy="420624"/>
-          </a:xfrm>
-          <a:prstGeom prst="roundRect">
-            <a:avLst/>
-          </a:prstGeom>
-        </p:spPr>
-        <p:style>
-          <a:lnRef idx="2">
-            <a:schemeClr val="accent1">
-              <a:shade val="15000"/>
-            </a:schemeClr>
-          </a:lnRef>
-          <a:fillRef idx="1">
-            <a:schemeClr val="accent1"/>
-          </a:fillRef>
-          <a:effectRef idx="0">
-            <a:schemeClr val="accent1"/>
-          </a:effectRef>
-          <a:fontRef idx="minor">
-            <a:schemeClr val="lt1"/>
-          </a:fontRef>
-        </p:style>
-        <p:txBody>
-          <a:bodyPr rtlCol="0" anchor="ctr"/>
-          <a:lstStyle/>
-          <a:p>
-            <a:pPr algn="ctr"/>
-            <a:endParaRPr lang="en-CA"/>
-          </a:p>
-        </p:txBody>
-      </p:sp>
-      <p:sp>
-        <p:nvSpPr>
-          <p:cNvPr id="7" name="Oval 6">
-            <a:extLst>
-              <a:ext uri="{FF2B5EF4-FFF2-40B4-BE49-F238E27FC236}">
-                <a16:creationId xmlns:a16="http://schemas.microsoft.com/office/drawing/2014/main" id="{39174CDB-2B01-DBAA-65A0-700D0A436C13}"/>
-              </a:ext>
-            </a:extLst>
-          </p:cNvPr>
-          <p:cNvSpPr/>
-          <p:nvPr/>
-        </p:nvSpPr>
-        <p:spPr>
-          <a:xfrm rot="1563314">
-            <a:off x="6557560" y="844401"/>
-            <a:ext cx="1975104" cy="1087281"/>
-          </a:xfrm>
-          <a:prstGeom prst="ellipse">
-            <a:avLst/>
-          </a:prstGeom>
-        </p:spPr>
-        <p:style>
-          <a:lnRef idx="2">
-            <a:schemeClr val="accent1">
-              <a:shade val="15000"/>
-            </a:schemeClr>
-          </a:lnRef>
-          <a:fillRef idx="1">
-            <a:schemeClr val="accent1"/>
-          </a:fillRef>
-          <a:effectRef idx="0">
-            <a:schemeClr val="accent1"/>
-          </a:effectRef>
-          <a:fontRef idx="minor">
-            <a:schemeClr val="lt1"/>
-          </a:fontRef>
-        </p:style>
-        <p:txBody>
-          <a:bodyPr rtlCol="0" anchor="ctr"/>
-          <a:lstStyle/>
-          <a:p>
-            <a:pPr algn="ctr"/>
-            <a:endParaRPr lang="en-CA"/>
-          </a:p>
-        </p:txBody>
-      </p:sp>
+        </p:grpSpPr>
+        <p:sp>
+          <p:nvSpPr>
+            <p:cNvPr id="4" name="Oval 3">
+              <a:extLst>
+                <a:ext uri="{FF2B5EF4-FFF2-40B4-BE49-F238E27FC236}">
+                  <a16:creationId xmlns:a16="http://schemas.microsoft.com/office/drawing/2014/main" id="{ED69BF1D-52C3-25FC-1BBF-27741A647D47}"/>
+                </a:ext>
+              </a:extLst>
+            </p:cNvPr>
+            <p:cNvSpPr/>
+            <p:nvPr/>
+          </p:nvSpPr>
+          <p:spPr>
+            <a:xfrm rot="2311774">
+              <a:off x="5764453" y="2682581"/>
+              <a:ext cx="1322877" cy="2401108"/>
+            </a:xfrm>
+            <a:prstGeom prst="ellipse">
+              <a:avLst/>
+            </a:prstGeom>
+            <a:solidFill>
+              <a:srgbClr val="15EBE6"/>
+            </a:solidFill>
+            <a:ln w="76200">
+              <a:solidFill>
+                <a:schemeClr val="tx1"/>
+              </a:solidFill>
+            </a:ln>
+          </p:spPr>
+          <p:style>
+            <a:lnRef idx="2">
+              <a:schemeClr val="accent1">
+                <a:shade val="15000"/>
+              </a:schemeClr>
+            </a:lnRef>
+            <a:fillRef idx="1">
+              <a:schemeClr val="accent1"/>
+            </a:fillRef>
+            <a:effectRef idx="0">
+              <a:schemeClr val="accent1"/>
+            </a:effectRef>
+            <a:fontRef idx="minor">
+              <a:schemeClr val="lt1"/>
+            </a:fontRef>
+          </p:style>
+          <p:txBody>
+            <a:bodyPr rtlCol="0" anchor="ctr"/>
+            <a:lstStyle/>
+            <a:p>
+              <a:pPr algn="ctr"/>
+              <a:endParaRPr lang="en-CA"/>
+            </a:p>
+          </p:txBody>
+        </p:sp>
+        <p:sp>
+          <p:nvSpPr>
+            <p:cNvPr id="3" name="Oval 2">
+              <a:extLst>
+                <a:ext uri="{FF2B5EF4-FFF2-40B4-BE49-F238E27FC236}">
+                  <a16:creationId xmlns:a16="http://schemas.microsoft.com/office/drawing/2014/main" id="{76985402-11B5-5602-05E6-0E7B6B782714}"/>
+                </a:ext>
+              </a:extLst>
+            </p:cNvPr>
+            <p:cNvSpPr/>
+            <p:nvPr/>
+          </p:nvSpPr>
+          <p:spPr>
+            <a:xfrm rot="8174236">
+              <a:off x="4955877" y="3253168"/>
+              <a:ext cx="606217" cy="1787274"/>
+            </a:xfrm>
+            <a:prstGeom prst="ellipse">
+              <a:avLst/>
+            </a:prstGeom>
+            <a:solidFill>
+              <a:srgbClr val="15EBE6"/>
+            </a:solidFill>
+            <a:ln w="76200">
+              <a:solidFill>
+                <a:schemeClr val="tx1"/>
+              </a:solidFill>
+            </a:ln>
+          </p:spPr>
+          <p:style>
+            <a:lnRef idx="2">
+              <a:schemeClr val="accent1">
+                <a:shade val="15000"/>
+              </a:schemeClr>
+            </a:lnRef>
+            <a:fillRef idx="1">
+              <a:schemeClr val="accent1"/>
+            </a:fillRef>
+            <a:effectRef idx="0">
+              <a:schemeClr val="accent1"/>
+            </a:effectRef>
+            <a:fontRef idx="minor">
+              <a:schemeClr val="lt1"/>
+            </a:fontRef>
+          </p:style>
+          <p:txBody>
+            <a:bodyPr rtlCol="0" anchor="ctr"/>
+            <a:lstStyle/>
+            <a:p>
+              <a:pPr algn="ctr"/>
+              <a:endParaRPr lang="en-CA"/>
+            </a:p>
+          </p:txBody>
+        </p:sp>
+        <p:sp>
+          <p:nvSpPr>
+            <p:cNvPr id="5" name="Rectangle: Rounded Corners 4">
+              <a:extLst>
+                <a:ext uri="{FF2B5EF4-FFF2-40B4-BE49-F238E27FC236}">
+                  <a16:creationId xmlns:a16="http://schemas.microsoft.com/office/drawing/2014/main" id="{3F53D605-69FC-7FE1-E003-191F6F148241}"/>
+                </a:ext>
+              </a:extLst>
+            </p:cNvPr>
+            <p:cNvSpPr/>
+            <p:nvPr/>
+          </p:nvSpPr>
+          <p:spPr>
+            <a:xfrm>
+              <a:off x="4459224" y="3986784"/>
+              <a:ext cx="3273552" cy="603504"/>
+            </a:xfrm>
+            <a:prstGeom prst="roundRect">
+              <a:avLst>
+                <a:gd name="adj" fmla="val 50000"/>
+              </a:avLst>
+            </a:prstGeom>
+            <a:ln>
+              <a:solidFill>
+                <a:schemeClr val="tx1"/>
+              </a:solidFill>
+            </a:ln>
+          </p:spPr>
+          <p:style>
+            <a:lnRef idx="2">
+              <a:schemeClr val="accent1">
+                <a:shade val="15000"/>
+              </a:schemeClr>
+            </a:lnRef>
+            <a:fillRef idx="1">
+              <a:schemeClr val="accent1"/>
+            </a:fillRef>
+            <a:effectRef idx="0">
+              <a:schemeClr val="accent1"/>
+            </a:effectRef>
+            <a:fontRef idx="minor">
+              <a:schemeClr val="lt1"/>
+            </a:fontRef>
+          </p:style>
+          <p:txBody>
+            <a:bodyPr rtlCol="0" anchor="ctr"/>
+            <a:lstStyle/>
+            <a:p>
+              <a:pPr algn="ctr"/>
+              <a:endParaRPr lang="en-CA"/>
+            </a:p>
+          </p:txBody>
+        </p:sp>
+        <p:sp>
+          <p:nvSpPr>
+            <p:cNvPr id="2" name="Oval 1">
+              <a:extLst>
+                <a:ext uri="{FF2B5EF4-FFF2-40B4-BE49-F238E27FC236}">
+                  <a16:creationId xmlns:a16="http://schemas.microsoft.com/office/drawing/2014/main" id="{81C0A52C-EDCD-F1D4-14B9-2BD6BCA6B98D}"/>
+                </a:ext>
+              </a:extLst>
+            </p:cNvPr>
+            <p:cNvSpPr/>
+            <p:nvPr/>
+          </p:nvSpPr>
+          <p:spPr>
+            <a:xfrm rot="2311774">
+              <a:off x="3958117" y="3300984"/>
+              <a:ext cx="533400" cy="1691640"/>
+            </a:xfrm>
+            <a:prstGeom prst="ellipse">
+              <a:avLst/>
+            </a:prstGeom>
+            <a:solidFill>
+              <a:srgbClr val="EEC186"/>
+            </a:solidFill>
+            <a:ln w="76200">
+              <a:solidFill>
+                <a:schemeClr val="tx1"/>
+              </a:solidFill>
+            </a:ln>
+          </p:spPr>
+          <p:style>
+            <a:lnRef idx="2">
+              <a:schemeClr val="accent1">
+                <a:shade val="15000"/>
+              </a:schemeClr>
+            </a:lnRef>
+            <a:fillRef idx="1">
+              <a:schemeClr val="accent1"/>
+            </a:fillRef>
+            <a:effectRef idx="0">
+              <a:schemeClr val="accent1"/>
+            </a:effectRef>
+            <a:fontRef idx="minor">
+              <a:schemeClr val="lt1"/>
+            </a:fontRef>
+          </p:style>
+          <p:txBody>
+            <a:bodyPr rtlCol="0" anchor="ctr"/>
+            <a:lstStyle/>
+            <a:p>
+              <a:pPr algn="ctr"/>
+              <a:endParaRPr lang="en-CA"/>
+            </a:p>
+          </p:txBody>
+        </p:sp>
+        <p:sp>
+          <p:nvSpPr>
+            <p:cNvPr id="11" name="Oval 10">
+              <a:extLst>
+                <a:ext uri="{FF2B5EF4-FFF2-40B4-BE49-F238E27FC236}">
+                  <a16:creationId xmlns:a16="http://schemas.microsoft.com/office/drawing/2014/main" id="{13075ADF-DF52-FE58-319B-C5E46D4431F3}"/>
+                </a:ext>
+              </a:extLst>
+            </p:cNvPr>
+            <p:cNvSpPr/>
+            <p:nvPr/>
+          </p:nvSpPr>
+          <p:spPr>
+            <a:xfrm>
+              <a:off x="5925312" y="1124712"/>
+              <a:ext cx="2185416" cy="2048256"/>
+            </a:xfrm>
+            <a:prstGeom prst="ellipse">
+              <a:avLst/>
+            </a:prstGeom>
+            <a:solidFill>
+              <a:srgbClr val="EEC186"/>
+            </a:solidFill>
+            <a:ln w="76200">
+              <a:solidFill>
+                <a:schemeClr val="tx1"/>
+              </a:solidFill>
+            </a:ln>
+          </p:spPr>
+          <p:style>
+            <a:lnRef idx="2">
+              <a:schemeClr val="accent1">
+                <a:shade val="15000"/>
+              </a:schemeClr>
+            </a:lnRef>
+            <a:fillRef idx="1">
+              <a:schemeClr val="accent1"/>
+            </a:fillRef>
+            <a:effectRef idx="0">
+              <a:schemeClr val="accent1"/>
+            </a:effectRef>
+            <a:fontRef idx="minor">
+              <a:schemeClr val="lt1"/>
+            </a:fontRef>
+          </p:style>
+          <p:txBody>
+            <a:bodyPr rtlCol="0" anchor="ctr"/>
+            <a:lstStyle/>
+            <a:p>
+              <a:pPr algn="ctr"/>
+              <a:endParaRPr lang="en-CA"/>
+            </a:p>
+          </p:txBody>
+        </p:sp>
+        <p:sp>
+          <p:nvSpPr>
+            <p:cNvPr id="6" name="Rectangle: Rounded Corners 5">
+              <a:extLst>
+                <a:ext uri="{FF2B5EF4-FFF2-40B4-BE49-F238E27FC236}">
+                  <a16:creationId xmlns:a16="http://schemas.microsoft.com/office/drawing/2014/main" id="{0D9AC8EB-644A-A58A-A475-612676716F99}"/>
+                </a:ext>
+              </a:extLst>
+            </p:cNvPr>
+            <p:cNvSpPr/>
+            <p:nvPr/>
+          </p:nvSpPr>
+          <p:spPr>
+            <a:xfrm rot="1782648">
+              <a:off x="5437803" y="1198039"/>
+              <a:ext cx="3006406" cy="420624"/>
+            </a:xfrm>
+            <a:prstGeom prst="roundRect">
+              <a:avLst/>
+            </a:prstGeom>
+            <a:solidFill>
+              <a:schemeClr val="tx1"/>
+            </a:solidFill>
+            <a:ln w="76200">
+              <a:solidFill>
+                <a:schemeClr val="tx1"/>
+              </a:solidFill>
+            </a:ln>
+          </p:spPr>
+          <p:style>
+            <a:lnRef idx="2">
+              <a:schemeClr val="accent1">
+                <a:shade val="15000"/>
+              </a:schemeClr>
+            </a:lnRef>
+            <a:fillRef idx="1">
+              <a:schemeClr val="accent1"/>
+            </a:fillRef>
+            <a:effectRef idx="0">
+              <a:schemeClr val="accent1"/>
+            </a:effectRef>
+            <a:fontRef idx="minor">
+              <a:schemeClr val="lt1"/>
+            </a:fontRef>
+          </p:style>
+          <p:txBody>
+            <a:bodyPr rtlCol="0" anchor="ctr"/>
+            <a:lstStyle/>
+            <a:p>
+              <a:pPr algn="ctr"/>
+              <a:endParaRPr lang="en-CA"/>
+            </a:p>
+          </p:txBody>
+        </p:sp>
+        <p:grpSp>
+          <p:nvGrpSpPr>
+            <p:cNvPr id="12" name="Group 11">
+              <a:extLst>
+                <a:ext uri="{FF2B5EF4-FFF2-40B4-BE49-F238E27FC236}">
+                  <a16:creationId xmlns:a16="http://schemas.microsoft.com/office/drawing/2014/main" id="{23235A99-F351-2E66-7829-790C9CB14455}"/>
+                </a:ext>
+              </a:extLst>
+            </p:cNvPr>
+            <p:cNvGrpSpPr/>
+            <p:nvPr/>
+          </p:nvGrpSpPr>
+          <p:grpSpPr>
+            <a:xfrm>
+              <a:off x="4459224" y="3986784"/>
+              <a:ext cx="3273552" cy="603504"/>
+              <a:chOff x="4459224" y="3986784"/>
+              <a:chExt cx="3273552" cy="603504"/>
+            </a:xfrm>
+          </p:grpSpPr>
+          <p:sp>
+            <p:nvSpPr>
+              <p:cNvPr id="8" name="Rectangle: Rounded Corners 7">
+                <a:extLst>
+                  <a:ext uri="{FF2B5EF4-FFF2-40B4-BE49-F238E27FC236}">
+                    <a16:creationId xmlns:a16="http://schemas.microsoft.com/office/drawing/2014/main" id="{C7A49D4D-45B1-2B81-F36B-41EADBEDE92C}"/>
+                  </a:ext>
+                </a:extLst>
+              </p:cNvPr>
+              <p:cNvSpPr/>
+              <p:nvPr/>
+            </p:nvSpPr>
+            <p:spPr>
+              <a:xfrm>
+                <a:off x="4459224" y="3986784"/>
+                <a:ext cx="3273552" cy="603504"/>
+              </a:xfrm>
+              <a:prstGeom prst="roundRect">
+                <a:avLst>
+                  <a:gd name="adj" fmla="val 50000"/>
+                </a:avLst>
+              </a:prstGeom>
+              <a:solidFill>
+                <a:schemeClr val="bg1">
+                  <a:lumMod val="95000"/>
+                </a:schemeClr>
+              </a:solidFill>
+              <a:ln w="76200">
+                <a:solidFill>
+                  <a:schemeClr val="tx1"/>
+                </a:solidFill>
+              </a:ln>
+            </p:spPr>
+            <p:style>
+              <a:lnRef idx="2">
+                <a:schemeClr val="accent1">
+                  <a:shade val="15000"/>
+                </a:schemeClr>
+              </a:lnRef>
+              <a:fillRef idx="1">
+                <a:schemeClr val="accent1"/>
+              </a:fillRef>
+              <a:effectRef idx="0">
+                <a:schemeClr val="accent1"/>
+              </a:effectRef>
+              <a:fontRef idx="minor">
+                <a:schemeClr val="lt1"/>
+              </a:fontRef>
+            </p:style>
+            <p:txBody>
+              <a:bodyPr rtlCol="0" anchor="ctr"/>
+              <a:lstStyle/>
+              <a:p>
+                <a:pPr algn="ctr"/>
+                <a:endParaRPr lang="en-CA"/>
+              </a:p>
+            </p:txBody>
+          </p:sp>
+          <p:sp>
+            <p:nvSpPr>
+              <p:cNvPr id="9" name="Rectangle 8">
+                <a:extLst>
+                  <a:ext uri="{FF2B5EF4-FFF2-40B4-BE49-F238E27FC236}">
+                    <a16:creationId xmlns:a16="http://schemas.microsoft.com/office/drawing/2014/main" id="{4E91CF73-225E-5EDD-5D8B-641F2F0A620E}"/>
+                  </a:ext>
+                </a:extLst>
+              </p:cNvPr>
+              <p:cNvSpPr/>
+              <p:nvPr/>
+            </p:nvSpPr>
+            <p:spPr>
+              <a:xfrm>
+                <a:off x="5084064" y="4005452"/>
+                <a:ext cx="474740" cy="568800"/>
+              </a:xfrm>
+              <a:prstGeom prst="rect">
+                <a:avLst/>
+              </a:prstGeom>
+              <a:solidFill>
+                <a:srgbClr val="FF0000"/>
+              </a:solidFill>
+              <a:ln w="76200">
+                <a:solidFill>
+                  <a:srgbClr val="FF0000"/>
+                </a:solidFill>
+              </a:ln>
+            </p:spPr>
+            <p:style>
+              <a:lnRef idx="2">
+                <a:schemeClr val="accent1">
+                  <a:shade val="15000"/>
+                </a:schemeClr>
+              </a:lnRef>
+              <a:fillRef idx="1">
+                <a:schemeClr val="accent1"/>
+              </a:fillRef>
+              <a:effectRef idx="0">
+                <a:schemeClr val="accent1"/>
+              </a:effectRef>
+              <a:fontRef idx="minor">
+                <a:schemeClr val="lt1"/>
+              </a:fontRef>
+            </p:style>
+            <p:txBody>
+              <a:bodyPr rtlCol="0" anchor="ctr"/>
+              <a:lstStyle/>
+              <a:p>
+                <a:pPr algn="ctr"/>
+                <a:endParaRPr lang="en-CA"/>
+              </a:p>
+            </p:txBody>
+          </p:sp>
+          <p:sp>
+            <p:nvSpPr>
+              <p:cNvPr id="10" name="Rectangle 9">
+                <a:extLst>
+                  <a:ext uri="{FF2B5EF4-FFF2-40B4-BE49-F238E27FC236}">
+                    <a16:creationId xmlns:a16="http://schemas.microsoft.com/office/drawing/2014/main" id="{0DC5EA6F-7282-9154-A31D-FC12669053F3}"/>
+                  </a:ext>
+                </a:extLst>
+              </p:cNvPr>
+              <p:cNvSpPr/>
+              <p:nvPr/>
+            </p:nvSpPr>
+            <p:spPr>
+              <a:xfrm>
+                <a:off x="6457103" y="4004136"/>
+                <a:ext cx="474740" cy="568800"/>
+              </a:xfrm>
+              <a:prstGeom prst="rect">
+                <a:avLst/>
+              </a:prstGeom>
+              <a:solidFill>
+                <a:srgbClr val="FF0000"/>
+              </a:solidFill>
+              <a:ln w="76200">
+                <a:solidFill>
+                  <a:srgbClr val="FF0000"/>
+                </a:solidFill>
+              </a:ln>
+            </p:spPr>
+            <p:style>
+              <a:lnRef idx="2">
+                <a:schemeClr val="accent1">
+                  <a:shade val="15000"/>
+                </a:schemeClr>
+              </a:lnRef>
+              <a:fillRef idx="1">
+                <a:schemeClr val="accent1"/>
+              </a:fillRef>
+              <a:effectRef idx="0">
+                <a:schemeClr val="accent1"/>
+              </a:effectRef>
+              <a:fontRef idx="minor">
+                <a:schemeClr val="lt1"/>
+              </a:fontRef>
+            </p:style>
+            <p:txBody>
+              <a:bodyPr rtlCol="0" anchor="ctr"/>
+              <a:lstStyle/>
+              <a:p>
+                <a:pPr algn="ctr"/>
+                <a:endParaRPr lang="en-CA"/>
+              </a:p>
+            </p:txBody>
+          </p:sp>
+        </p:grpSp>
+        <p:sp>
+          <p:nvSpPr>
+            <p:cNvPr id="7" name="Oval 6">
+              <a:extLst>
+                <a:ext uri="{FF2B5EF4-FFF2-40B4-BE49-F238E27FC236}">
+                  <a16:creationId xmlns:a16="http://schemas.microsoft.com/office/drawing/2014/main" id="{39174CDB-2B01-DBAA-65A0-700D0A436C13}"/>
+                </a:ext>
+              </a:extLst>
+            </p:cNvPr>
+            <p:cNvSpPr/>
+            <p:nvPr/>
+          </p:nvSpPr>
+          <p:spPr>
+            <a:xfrm rot="1563314">
+              <a:off x="6521327" y="948405"/>
+              <a:ext cx="1975104" cy="891550"/>
+            </a:xfrm>
+            <a:prstGeom prst="ellipse">
+              <a:avLst/>
+            </a:prstGeom>
+            <a:solidFill>
+              <a:schemeClr val="tx1"/>
+            </a:solidFill>
+            <a:ln w="76200">
+              <a:solidFill>
+                <a:schemeClr val="tx1"/>
+              </a:solidFill>
+            </a:ln>
+          </p:spPr>
+          <p:style>
+            <a:lnRef idx="2">
+              <a:schemeClr val="accent1">
+                <a:shade val="15000"/>
+              </a:schemeClr>
+            </a:lnRef>
+            <a:fillRef idx="1">
+              <a:schemeClr val="accent1"/>
+            </a:fillRef>
+            <a:effectRef idx="0">
+              <a:schemeClr val="accent1"/>
+            </a:effectRef>
+            <a:fontRef idx="minor">
+              <a:schemeClr val="lt1"/>
+            </a:fontRef>
+          </p:style>
+          <p:txBody>
+            <a:bodyPr rtlCol="0" anchor="ctr"/>
+            <a:lstStyle/>
+            <a:p>
+              <a:pPr algn="ctr"/>
+              <a:endParaRPr lang="en-CA"/>
+            </a:p>
+          </p:txBody>
+        </p:sp>
+        <p:sp>
+          <p:nvSpPr>
+            <p:cNvPr id="14" name="Oval 13">
+              <a:extLst>
+                <a:ext uri="{FF2B5EF4-FFF2-40B4-BE49-F238E27FC236}">
+                  <a16:creationId xmlns:a16="http://schemas.microsoft.com/office/drawing/2014/main" id="{9EA14FC4-BE20-5CBB-1B98-AA30B6BF2DDB}"/>
+                </a:ext>
+              </a:extLst>
+            </p:cNvPr>
+            <p:cNvSpPr/>
+            <p:nvPr/>
+          </p:nvSpPr>
+          <p:spPr>
+            <a:xfrm rot="1875076">
+              <a:off x="6159190" y="3086972"/>
+              <a:ext cx="533400" cy="1691640"/>
+            </a:xfrm>
+            <a:prstGeom prst="ellipse">
+              <a:avLst/>
+            </a:prstGeom>
+            <a:solidFill>
+              <a:srgbClr val="EEC186"/>
+            </a:solidFill>
+            <a:ln w="76200">
+              <a:solidFill>
+                <a:schemeClr val="tx1"/>
+              </a:solidFill>
+            </a:ln>
+          </p:spPr>
+          <p:style>
+            <a:lnRef idx="2">
+              <a:schemeClr val="accent1">
+                <a:shade val="15000"/>
+              </a:schemeClr>
+            </a:lnRef>
+            <a:fillRef idx="1">
+              <a:schemeClr val="accent1"/>
+            </a:fillRef>
+            <a:effectRef idx="0">
+              <a:schemeClr val="accent1"/>
+            </a:effectRef>
+            <a:fontRef idx="minor">
+              <a:schemeClr val="lt1"/>
+            </a:fontRef>
+          </p:style>
+          <p:txBody>
+            <a:bodyPr rtlCol="0" anchor="ctr"/>
+            <a:lstStyle/>
+            <a:p>
+              <a:pPr algn="ctr"/>
+              <a:endParaRPr lang="en-CA"/>
+            </a:p>
+          </p:txBody>
+        </p:sp>
+      </p:grpSp>
     </p:spTree>
     <p:extLst>
       <p:ext uri="{BB962C8B-B14F-4D97-AF65-F5344CB8AC3E}">
@@ -16982,330 +17251,532 @@
           <a:chExt cx="0" cy="0"/>
         </a:xfrm>
       </p:grpSpPr>
-      <p:sp>
-        <p:nvSpPr>
-          <p:cNvPr id="4" name="Oval 3">
+      <p:grpSp>
+        <p:nvGrpSpPr>
+          <p:cNvPr id="13" name="Group 12">
             <a:extLst>
               <a:ext uri="{FF2B5EF4-FFF2-40B4-BE49-F238E27FC236}">
-                <a16:creationId xmlns:a16="http://schemas.microsoft.com/office/drawing/2014/main" id="{29224691-2AF1-84AE-55BB-9816BED76BCD}"/>
+                <a16:creationId xmlns:a16="http://schemas.microsoft.com/office/drawing/2014/main" id="{7DFC6D58-4C31-65CE-145A-CEAF308B648D}"/>
               </a:ext>
             </a:extLst>
           </p:cNvPr>
-          <p:cNvSpPr/>
+          <p:cNvGrpSpPr/>
           <p:nvPr/>
-        </p:nvSpPr>
-        <p:spPr>
-          <a:xfrm rot="20118178">
-            <a:off x="5434562" y="2908051"/>
-            <a:ext cx="1322877" cy="2401108"/>
+        </p:nvGrpSpPr>
+        <p:grpSpPr>
+          <a:xfrm>
+            <a:off x="4256320" y="936307"/>
+            <a:ext cx="3679359" cy="4985386"/>
+            <a:chOff x="4458038" y="1199729"/>
+            <a:chExt cx="3679359" cy="4985386"/>
           </a:xfrm>
-          <a:prstGeom prst="ellipse">
-            <a:avLst/>
-          </a:prstGeom>
-        </p:spPr>
-        <p:style>
-          <a:lnRef idx="2">
-            <a:schemeClr val="accent1">
-              <a:shade val="15000"/>
-            </a:schemeClr>
-          </a:lnRef>
-          <a:fillRef idx="1">
-            <a:schemeClr val="accent1"/>
-          </a:fillRef>
-          <a:effectRef idx="0">
-            <a:schemeClr val="accent1"/>
-          </a:effectRef>
-          <a:fontRef idx="minor">
-            <a:schemeClr val="lt1"/>
-          </a:fontRef>
-        </p:style>
-        <p:txBody>
-          <a:bodyPr rtlCol="0" anchor="ctr"/>
-          <a:lstStyle/>
-          <a:p>
-            <a:pPr algn="ctr"/>
-            <a:endParaRPr lang="en-CA"/>
-          </a:p>
-        </p:txBody>
-      </p:sp>
-      <p:sp>
-        <p:nvSpPr>
-          <p:cNvPr id="5" name="Rectangle: Rounded Corners 4">
-            <a:extLst>
-              <a:ext uri="{FF2B5EF4-FFF2-40B4-BE49-F238E27FC236}">
-                <a16:creationId xmlns:a16="http://schemas.microsoft.com/office/drawing/2014/main" id="{5DC4E29C-284A-6931-94C8-174475A48B13}"/>
-              </a:ext>
-            </a:extLst>
-          </p:cNvPr>
-          <p:cNvSpPr/>
-          <p:nvPr/>
-        </p:nvSpPr>
-        <p:spPr>
-          <a:xfrm>
-            <a:off x="4459224" y="3986784"/>
-            <a:ext cx="3273552" cy="603504"/>
-          </a:xfrm>
-          <a:prstGeom prst="roundRect">
-            <a:avLst>
-              <a:gd name="adj" fmla="val 50000"/>
-            </a:avLst>
-          </a:prstGeom>
-        </p:spPr>
-        <p:style>
-          <a:lnRef idx="2">
-            <a:schemeClr val="accent1">
-              <a:shade val="15000"/>
-            </a:schemeClr>
-          </a:lnRef>
-          <a:fillRef idx="1">
-            <a:schemeClr val="accent1"/>
-          </a:fillRef>
-          <a:effectRef idx="0">
-            <a:schemeClr val="accent1"/>
-          </a:effectRef>
-          <a:fontRef idx="minor">
-            <a:schemeClr val="lt1"/>
-          </a:fontRef>
-        </p:style>
-        <p:txBody>
-          <a:bodyPr rtlCol="0" anchor="ctr"/>
-          <a:lstStyle/>
-          <a:p>
-            <a:pPr algn="ctr"/>
-            <a:endParaRPr lang="en-CA"/>
-          </a:p>
-        </p:txBody>
-      </p:sp>
-      <p:sp>
-        <p:nvSpPr>
-          <p:cNvPr id="11" name="Oval 10">
-            <a:extLst>
-              <a:ext uri="{FF2B5EF4-FFF2-40B4-BE49-F238E27FC236}">
-                <a16:creationId xmlns:a16="http://schemas.microsoft.com/office/drawing/2014/main" id="{709B2CF6-7373-8CD5-C2B5-C463496E37B3}"/>
-              </a:ext>
-            </a:extLst>
-          </p:cNvPr>
-          <p:cNvSpPr/>
-          <p:nvPr/>
-        </p:nvSpPr>
-        <p:spPr>
-          <a:xfrm>
-            <a:off x="4458038" y="1199729"/>
-            <a:ext cx="2185416" cy="2048256"/>
-          </a:xfrm>
-          <a:prstGeom prst="ellipse">
-            <a:avLst/>
-          </a:prstGeom>
-        </p:spPr>
-        <p:style>
-          <a:lnRef idx="2">
-            <a:schemeClr val="accent1">
-              <a:shade val="15000"/>
-            </a:schemeClr>
-          </a:lnRef>
-          <a:fillRef idx="1">
-            <a:schemeClr val="accent1"/>
-          </a:fillRef>
-          <a:effectRef idx="0">
-            <a:schemeClr val="accent1"/>
-          </a:effectRef>
-          <a:fontRef idx="minor">
-            <a:schemeClr val="lt1"/>
-          </a:fontRef>
-        </p:style>
-        <p:txBody>
-          <a:bodyPr rtlCol="0" anchor="ctr"/>
-          <a:lstStyle/>
-          <a:p>
-            <a:pPr algn="ctr"/>
-            <a:endParaRPr lang="en-CA"/>
-          </a:p>
-        </p:txBody>
-      </p:sp>
-      <p:sp>
-        <p:nvSpPr>
-          <p:cNvPr id="6" name="Oval 5">
-            <a:extLst>
-              <a:ext uri="{FF2B5EF4-FFF2-40B4-BE49-F238E27FC236}">
-                <a16:creationId xmlns:a16="http://schemas.microsoft.com/office/drawing/2014/main" id="{1B496822-12D9-CFE7-8190-143EF2B4B221}"/>
-              </a:ext>
-            </a:extLst>
-          </p:cNvPr>
-          <p:cNvSpPr/>
-          <p:nvPr/>
-        </p:nvSpPr>
-        <p:spPr>
-          <a:xfrm rot="8174236">
-            <a:off x="6587271" y="4612964"/>
-            <a:ext cx="606217" cy="1346174"/>
-          </a:xfrm>
-          <a:prstGeom prst="ellipse">
-            <a:avLst/>
-          </a:prstGeom>
-        </p:spPr>
-        <p:style>
-          <a:lnRef idx="2">
-            <a:schemeClr val="accent1">
-              <a:shade val="15000"/>
-            </a:schemeClr>
-          </a:lnRef>
-          <a:fillRef idx="1">
-            <a:schemeClr val="accent1"/>
-          </a:fillRef>
-          <a:effectRef idx="0">
-            <a:schemeClr val="accent1"/>
-          </a:effectRef>
-          <a:fontRef idx="minor">
-            <a:schemeClr val="lt1"/>
-          </a:fontRef>
-        </p:style>
-        <p:txBody>
-          <a:bodyPr rtlCol="0" anchor="ctr"/>
-          <a:lstStyle/>
-          <a:p>
-            <a:pPr algn="ctr"/>
-            <a:endParaRPr lang="en-CA"/>
-          </a:p>
-        </p:txBody>
-      </p:sp>
-      <p:sp>
-        <p:nvSpPr>
-          <p:cNvPr id="7" name="Oval 6">
-            <a:extLst>
-              <a:ext uri="{FF2B5EF4-FFF2-40B4-BE49-F238E27FC236}">
-                <a16:creationId xmlns:a16="http://schemas.microsoft.com/office/drawing/2014/main" id="{E1A7DAA5-66F2-3815-7BD7-5A07E74E877D}"/>
-              </a:ext>
-            </a:extLst>
-          </p:cNvPr>
-          <p:cNvSpPr/>
-          <p:nvPr/>
-        </p:nvSpPr>
-        <p:spPr>
-          <a:xfrm rot="18651192">
-            <a:off x="7308144" y="5355862"/>
-            <a:ext cx="533400" cy="1125106"/>
-          </a:xfrm>
-          <a:prstGeom prst="ellipse">
-            <a:avLst/>
-          </a:prstGeom>
-        </p:spPr>
-        <p:style>
-          <a:lnRef idx="2">
-            <a:schemeClr val="accent1">
-              <a:shade val="15000"/>
-            </a:schemeClr>
-          </a:lnRef>
-          <a:fillRef idx="1">
-            <a:schemeClr val="accent1"/>
-          </a:fillRef>
-          <a:effectRef idx="0">
-            <a:schemeClr val="accent1"/>
-          </a:effectRef>
-          <a:fontRef idx="minor">
-            <a:schemeClr val="lt1"/>
-          </a:fontRef>
-        </p:style>
-        <p:txBody>
-          <a:bodyPr rtlCol="0" anchor="ctr"/>
-          <a:lstStyle/>
-          <a:p>
-            <a:pPr algn="ctr"/>
-            <a:endParaRPr lang="en-CA"/>
-          </a:p>
-        </p:txBody>
-      </p:sp>
-      <p:sp>
-        <p:nvSpPr>
-          <p:cNvPr id="8" name="Oval 7">
-            <a:extLst>
-              <a:ext uri="{FF2B5EF4-FFF2-40B4-BE49-F238E27FC236}">
-                <a16:creationId xmlns:a16="http://schemas.microsoft.com/office/drawing/2014/main" id="{4AC92B43-C54D-B5EB-60C7-6FAF076CA22C}"/>
-              </a:ext>
-            </a:extLst>
-          </p:cNvPr>
-          <p:cNvSpPr/>
-          <p:nvPr/>
-        </p:nvSpPr>
-        <p:spPr>
-          <a:xfrm rot="1875076">
-            <a:off x="5259993" y="3149866"/>
-            <a:ext cx="533400" cy="1492034"/>
-          </a:xfrm>
-          <a:prstGeom prst="ellipse">
-            <a:avLst/>
-          </a:prstGeom>
-        </p:spPr>
-        <p:style>
-          <a:lnRef idx="2">
-            <a:schemeClr val="accent1">
-              <a:shade val="15000"/>
-            </a:schemeClr>
-          </a:lnRef>
-          <a:fillRef idx="1">
-            <a:schemeClr val="accent1"/>
-          </a:fillRef>
-          <a:effectRef idx="0">
-            <a:schemeClr val="accent1"/>
-          </a:effectRef>
-          <a:fontRef idx="minor">
-            <a:schemeClr val="lt1"/>
-          </a:fontRef>
-        </p:style>
-        <p:txBody>
-          <a:bodyPr rtlCol="0" anchor="ctr"/>
-          <a:lstStyle/>
-          <a:p>
-            <a:pPr algn="ctr"/>
-            <a:endParaRPr lang="en-CA"/>
-          </a:p>
-        </p:txBody>
-      </p:sp>
-      <p:sp>
-        <p:nvSpPr>
-          <p:cNvPr id="9" name="Oval 8">
-            <a:extLst>
-              <a:ext uri="{FF2B5EF4-FFF2-40B4-BE49-F238E27FC236}">
-                <a16:creationId xmlns:a16="http://schemas.microsoft.com/office/drawing/2014/main" id="{5D1E8204-D73F-A6E5-DF83-C8A4BF1B1014}"/>
-              </a:ext>
-            </a:extLst>
-          </p:cNvPr>
-          <p:cNvSpPr/>
-          <p:nvPr/>
-        </p:nvSpPr>
-        <p:spPr>
-          <a:xfrm>
-            <a:off x="4754880" y="1901952"/>
-            <a:ext cx="238568" cy="332379"/>
-          </a:xfrm>
-          <a:prstGeom prst="ellipse">
-            <a:avLst/>
-          </a:prstGeom>
-        </p:spPr>
-        <p:style>
-          <a:lnRef idx="2">
-            <a:schemeClr val="accent1">
-              <a:shade val="15000"/>
-            </a:schemeClr>
-          </a:lnRef>
-          <a:fillRef idx="1">
-            <a:schemeClr val="accent1"/>
-          </a:fillRef>
-          <a:effectRef idx="0">
-            <a:schemeClr val="accent1"/>
-          </a:effectRef>
-          <a:fontRef idx="minor">
-            <a:schemeClr val="lt1"/>
-          </a:fontRef>
-        </p:style>
-        <p:txBody>
-          <a:bodyPr rtlCol="0" anchor="ctr"/>
-          <a:lstStyle/>
-          <a:p>
-            <a:pPr algn="ctr"/>
-            <a:endParaRPr lang="en-CA"/>
-          </a:p>
-        </p:txBody>
-      </p:sp>
+        </p:grpSpPr>
+        <p:sp>
+          <p:nvSpPr>
+            <p:cNvPr id="4" name="Oval 3">
+              <a:extLst>
+                <a:ext uri="{FF2B5EF4-FFF2-40B4-BE49-F238E27FC236}">
+                  <a16:creationId xmlns:a16="http://schemas.microsoft.com/office/drawing/2014/main" id="{29224691-2AF1-84AE-55BB-9816BED76BCD}"/>
+                </a:ext>
+              </a:extLst>
+            </p:cNvPr>
+            <p:cNvSpPr/>
+            <p:nvPr/>
+          </p:nvSpPr>
+          <p:spPr>
+            <a:xfrm rot="20118178">
+              <a:off x="5434562" y="2908051"/>
+              <a:ext cx="1322877" cy="2401108"/>
+            </a:xfrm>
+            <a:prstGeom prst="ellipse">
+              <a:avLst/>
+            </a:prstGeom>
+            <a:solidFill>
+              <a:srgbClr val="F9D9F0"/>
+            </a:solidFill>
+            <a:ln w="76200">
+              <a:solidFill>
+                <a:schemeClr val="tx1"/>
+              </a:solidFill>
+            </a:ln>
+          </p:spPr>
+          <p:style>
+            <a:lnRef idx="2">
+              <a:schemeClr val="accent1">
+                <a:shade val="15000"/>
+              </a:schemeClr>
+            </a:lnRef>
+            <a:fillRef idx="1">
+              <a:schemeClr val="accent1"/>
+            </a:fillRef>
+            <a:effectRef idx="0">
+              <a:schemeClr val="accent1"/>
+            </a:effectRef>
+            <a:fontRef idx="minor">
+              <a:schemeClr val="lt1"/>
+            </a:fontRef>
+          </p:style>
+          <p:txBody>
+            <a:bodyPr rtlCol="0" anchor="ctr"/>
+            <a:lstStyle/>
+            <a:p>
+              <a:pPr algn="ctr"/>
+              <a:endParaRPr lang="en-CA"/>
+            </a:p>
+          </p:txBody>
+        </p:sp>
+        <p:sp>
+          <p:nvSpPr>
+            <p:cNvPr id="5" name="Rectangle: Rounded Corners 4">
+              <a:extLst>
+                <a:ext uri="{FF2B5EF4-FFF2-40B4-BE49-F238E27FC236}">
+                  <a16:creationId xmlns:a16="http://schemas.microsoft.com/office/drawing/2014/main" id="{5DC4E29C-284A-6931-94C8-174475A48B13}"/>
+                </a:ext>
+              </a:extLst>
+            </p:cNvPr>
+            <p:cNvSpPr/>
+            <p:nvPr/>
+          </p:nvSpPr>
+          <p:spPr>
+            <a:xfrm>
+              <a:off x="4459224" y="3986784"/>
+              <a:ext cx="3273552" cy="603504"/>
+            </a:xfrm>
+            <a:prstGeom prst="roundRect">
+              <a:avLst>
+                <a:gd name="adj" fmla="val 50000"/>
+              </a:avLst>
+            </a:prstGeom>
+          </p:spPr>
+          <p:style>
+            <a:lnRef idx="2">
+              <a:schemeClr val="accent1">
+                <a:shade val="15000"/>
+              </a:schemeClr>
+            </a:lnRef>
+            <a:fillRef idx="1">
+              <a:schemeClr val="accent1"/>
+            </a:fillRef>
+            <a:effectRef idx="0">
+              <a:schemeClr val="accent1"/>
+            </a:effectRef>
+            <a:fontRef idx="minor">
+              <a:schemeClr val="lt1"/>
+            </a:fontRef>
+          </p:style>
+          <p:txBody>
+            <a:bodyPr rtlCol="0" anchor="ctr"/>
+            <a:lstStyle/>
+            <a:p>
+              <a:pPr algn="ctr"/>
+              <a:endParaRPr lang="en-CA"/>
+            </a:p>
+          </p:txBody>
+        </p:sp>
+        <p:sp>
+          <p:nvSpPr>
+            <p:cNvPr id="11" name="Oval 10">
+              <a:extLst>
+                <a:ext uri="{FF2B5EF4-FFF2-40B4-BE49-F238E27FC236}">
+                  <a16:creationId xmlns:a16="http://schemas.microsoft.com/office/drawing/2014/main" id="{709B2CF6-7373-8CD5-C2B5-C463496E37B3}"/>
+                </a:ext>
+              </a:extLst>
+            </p:cNvPr>
+            <p:cNvSpPr/>
+            <p:nvPr/>
+          </p:nvSpPr>
+          <p:spPr>
+            <a:xfrm>
+              <a:off x="4458038" y="1199729"/>
+              <a:ext cx="2185416" cy="2048256"/>
+            </a:xfrm>
+            <a:prstGeom prst="ellipse">
+              <a:avLst/>
+            </a:prstGeom>
+            <a:solidFill>
+              <a:srgbClr val="362908"/>
+            </a:solidFill>
+            <a:ln w="76200">
+              <a:solidFill>
+                <a:schemeClr val="tx1"/>
+              </a:solidFill>
+            </a:ln>
+          </p:spPr>
+          <p:style>
+            <a:lnRef idx="2">
+              <a:schemeClr val="accent1">
+                <a:shade val="15000"/>
+              </a:schemeClr>
+            </a:lnRef>
+            <a:fillRef idx="1">
+              <a:schemeClr val="accent1"/>
+            </a:fillRef>
+            <a:effectRef idx="0">
+              <a:schemeClr val="accent1"/>
+            </a:effectRef>
+            <a:fontRef idx="minor">
+              <a:schemeClr val="lt1"/>
+            </a:fontRef>
+          </p:style>
+          <p:txBody>
+            <a:bodyPr rtlCol="0" anchor="ctr"/>
+            <a:lstStyle/>
+            <a:p>
+              <a:pPr algn="ctr"/>
+              <a:endParaRPr lang="en-CA"/>
+            </a:p>
+          </p:txBody>
+        </p:sp>
+        <p:sp>
+          <p:nvSpPr>
+            <p:cNvPr id="6" name="Oval 5">
+              <a:extLst>
+                <a:ext uri="{FF2B5EF4-FFF2-40B4-BE49-F238E27FC236}">
+                  <a16:creationId xmlns:a16="http://schemas.microsoft.com/office/drawing/2014/main" id="{1B496822-12D9-CFE7-8190-143EF2B4B221}"/>
+                </a:ext>
+              </a:extLst>
+            </p:cNvPr>
+            <p:cNvSpPr/>
+            <p:nvPr/>
+          </p:nvSpPr>
+          <p:spPr>
+            <a:xfrm rot="8174236">
+              <a:off x="6587271" y="4612964"/>
+              <a:ext cx="606217" cy="1346174"/>
+            </a:xfrm>
+            <a:prstGeom prst="ellipse">
+              <a:avLst/>
+            </a:prstGeom>
+            <a:solidFill>
+              <a:srgbClr val="362908"/>
+            </a:solidFill>
+            <a:ln w="76200">
+              <a:solidFill>
+                <a:schemeClr val="tx1"/>
+              </a:solidFill>
+            </a:ln>
+          </p:spPr>
+          <p:style>
+            <a:lnRef idx="2">
+              <a:schemeClr val="accent1">
+                <a:shade val="15000"/>
+              </a:schemeClr>
+            </a:lnRef>
+            <a:fillRef idx="1">
+              <a:schemeClr val="accent1"/>
+            </a:fillRef>
+            <a:effectRef idx="0">
+              <a:schemeClr val="accent1"/>
+            </a:effectRef>
+            <a:fontRef idx="minor">
+              <a:schemeClr val="lt1"/>
+            </a:fontRef>
+          </p:style>
+          <p:txBody>
+            <a:bodyPr rtlCol="0" anchor="ctr"/>
+            <a:lstStyle/>
+            <a:p>
+              <a:pPr algn="ctr"/>
+              <a:endParaRPr lang="en-CA"/>
+            </a:p>
+          </p:txBody>
+        </p:sp>
+        <p:sp>
+          <p:nvSpPr>
+            <p:cNvPr id="7" name="Oval 6">
+              <a:extLst>
+                <a:ext uri="{FF2B5EF4-FFF2-40B4-BE49-F238E27FC236}">
+                  <a16:creationId xmlns:a16="http://schemas.microsoft.com/office/drawing/2014/main" id="{E1A7DAA5-66F2-3815-7BD7-5A07E74E877D}"/>
+                </a:ext>
+              </a:extLst>
+            </p:cNvPr>
+            <p:cNvSpPr/>
+            <p:nvPr/>
+          </p:nvSpPr>
+          <p:spPr>
+            <a:xfrm rot="18651192">
+              <a:off x="7308144" y="5355862"/>
+              <a:ext cx="533400" cy="1125106"/>
+            </a:xfrm>
+            <a:prstGeom prst="ellipse">
+              <a:avLst/>
+            </a:prstGeom>
+            <a:solidFill>
+              <a:srgbClr val="362908"/>
+            </a:solidFill>
+            <a:ln w="76200">
+              <a:solidFill>
+                <a:schemeClr val="tx1"/>
+              </a:solidFill>
+            </a:ln>
+          </p:spPr>
+          <p:style>
+            <a:lnRef idx="2">
+              <a:schemeClr val="accent1">
+                <a:shade val="15000"/>
+              </a:schemeClr>
+            </a:lnRef>
+            <a:fillRef idx="1">
+              <a:schemeClr val="accent1"/>
+            </a:fillRef>
+            <a:effectRef idx="0">
+              <a:schemeClr val="accent1"/>
+            </a:effectRef>
+            <a:fontRef idx="minor">
+              <a:schemeClr val="lt1"/>
+            </a:fontRef>
+          </p:style>
+          <p:txBody>
+            <a:bodyPr rtlCol="0" anchor="ctr"/>
+            <a:lstStyle/>
+            <a:p>
+              <a:pPr algn="ctr"/>
+              <a:endParaRPr lang="en-CA"/>
+            </a:p>
+          </p:txBody>
+        </p:sp>
+        <p:grpSp>
+          <p:nvGrpSpPr>
+            <p:cNvPr id="2" name="Group 1">
+              <a:extLst>
+                <a:ext uri="{FF2B5EF4-FFF2-40B4-BE49-F238E27FC236}">
+                  <a16:creationId xmlns:a16="http://schemas.microsoft.com/office/drawing/2014/main" id="{22D0DEA1-F222-D487-6BA7-290CC0CC89FC}"/>
+                </a:ext>
+              </a:extLst>
+            </p:cNvPr>
+            <p:cNvGrpSpPr/>
+            <p:nvPr/>
+          </p:nvGrpSpPr>
+          <p:grpSpPr>
+            <a:xfrm>
+              <a:off x="4458038" y="4006404"/>
+              <a:ext cx="3273552" cy="603504"/>
+              <a:chOff x="4459224" y="3986784"/>
+              <a:chExt cx="3273552" cy="603504"/>
+            </a:xfrm>
+          </p:grpSpPr>
+          <p:sp>
+            <p:nvSpPr>
+              <p:cNvPr id="3" name="Rectangle: Rounded Corners 2">
+                <a:extLst>
+                  <a:ext uri="{FF2B5EF4-FFF2-40B4-BE49-F238E27FC236}">
+                    <a16:creationId xmlns:a16="http://schemas.microsoft.com/office/drawing/2014/main" id="{91BBB02B-2811-02B2-77FB-2AF3A1EC8C15}"/>
+                  </a:ext>
+                </a:extLst>
+              </p:cNvPr>
+              <p:cNvSpPr/>
+              <p:nvPr/>
+            </p:nvSpPr>
+            <p:spPr>
+              <a:xfrm>
+                <a:off x="4459224" y="3986784"/>
+                <a:ext cx="3273552" cy="603504"/>
+              </a:xfrm>
+              <a:prstGeom prst="roundRect">
+                <a:avLst>
+                  <a:gd name="adj" fmla="val 50000"/>
+                </a:avLst>
+              </a:prstGeom>
+              <a:solidFill>
+                <a:schemeClr val="bg1">
+                  <a:lumMod val="95000"/>
+                </a:schemeClr>
+              </a:solidFill>
+              <a:ln w="76200">
+                <a:solidFill>
+                  <a:schemeClr val="tx1"/>
+                </a:solidFill>
+              </a:ln>
+            </p:spPr>
+            <p:style>
+              <a:lnRef idx="2">
+                <a:schemeClr val="accent1">
+                  <a:shade val="15000"/>
+                </a:schemeClr>
+              </a:lnRef>
+              <a:fillRef idx="1">
+                <a:schemeClr val="accent1"/>
+              </a:fillRef>
+              <a:effectRef idx="0">
+                <a:schemeClr val="accent1"/>
+              </a:effectRef>
+              <a:fontRef idx="minor">
+                <a:schemeClr val="lt1"/>
+              </a:fontRef>
+            </p:style>
+            <p:txBody>
+              <a:bodyPr rtlCol="0" anchor="ctr"/>
+              <a:lstStyle/>
+              <a:p>
+                <a:pPr algn="ctr"/>
+                <a:endParaRPr lang="en-CA"/>
+              </a:p>
+            </p:txBody>
+          </p:sp>
+          <p:sp>
+            <p:nvSpPr>
+              <p:cNvPr id="10" name="Rectangle 9">
+                <a:extLst>
+                  <a:ext uri="{FF2B5EF4-FFF2-40B4-BE49-F238E27FC236}">
+                    <a16:creationId xmlns:a16="http://schemas.microsoft.com/office/drawing/2014/main" id="{888DEF04-92C8-8CA3-188B-E8B23108DEE5}"/>
+                  </a:ext>
+                </a:extLst>
+              </p:cNvPr>
+              <p:cNvSpPr/>
+              <p:nvPr/>
+            </p:nvSpPr>
+            <p:spPr>
+              <a:xfrm>
+                <a:off x="5084064" y="4005452"/>
+                <a:ext cx="474740" cy="568800"/>
+              </a:xfrm>
+              <a:prstGeom prst="rect">
+                <a:avLst/>
+              </a:prstGeom>
+              <a:solidFill>
+                <a:srgbClr val="FF0000"/>
+              </a:solidFill>
+              <a:ln w="76200">
+                <a:solidFill>
+                  <a:srgbClr val="FF0000"/>
+                </a:solidFill>
+              </a:ln>
+            </p:spPr>
+            <p:style>
+              <a:lnRef idx="2">
+                <a:schemeClr val="accent1">
+                  <a:shade val="15000"/>
+                </a:schemeClr>
+              </a:lnRef>
+              <a:fillRef idx="1">
+                <a:schemeClr val="accent1"/>
+              </a:fillRef>
+              <a:effectRef idx="0">
+                <a:schemeClr val="accent1"/>
+              </a:effectRef>
+              <a:fontRef idx="minor">
+                <a:schemeClr val="lt1"/>
+              </a:fontRef>
+            </p:style>
+            <p:txBody>
+              <a:bodyPr rtlCol="0" anchor="ctr"/>
+              <a:lstStyle/>
+              <a:p>
+                <a:pPr algn="ctr"/>
+                <a:endParaRPr lang="en-CA"/>
+              </a:p>
+            </p:txBody>
+          </p:sp>
+          <p:sp>
+            <p:nvSpPr>
+              <p:cNvPr id="12" name="Rectangle 11">
+                <a:extLst>
+                  <a:ext uri="{FF2B5EF4-FFF2-40B4-BE49-F238E27FC236}">
+                    <a16:creationId xmlns:a16="http://schemas.microsoft.com/office/drawing/2014/main" id="{9B289236-215E-D9F9-53C8-7688D49C2215}"/>
+                  </a:ext>
+                </a:extLst>
+              </p:cNvPr>
+              <p:cNvSpPr/>
+              <p:nvPr/>
+            </p:nvSpPr>
+            <p:spPr>
+              <a:xfrm>
+                <a:off x="6457103" y="4004136"/>
+                <a:ext cx="474740" cy="568800"/>
+              </a:xfrm>
+              <a:prstGeom prst="rect">
+                <a:avLst/>
+              </a:prstGeom>
+              <a:solidFill>
+                <a:srgbClr val="FF0000"/>
+              </a:solidFill>
+              <a:ln w="76200">
+                <a:solidFill>
+                  <a:srgbClr val="FF0000"/>
+                </a:solidFill>
+              </a:ln>
+            </p:spPr>
+            <p:style>
+              <a:lnRef idx="2">
+                <a:schemeClr val="accent1">
+                  <a:shade val="15000"/>
+                </a:schemeClr>
+              </a:lnRef>
+              <a:fillRef idx="1">
+                <a:schemeClr val="accent1"/>
+              </a:fillRef>
+              <a:effectRef idx="0">
+                <a:schemeClr val="accent1"/>
+              </a:effectRef>
+              <a:fontRef idx="minor">
+                <a:schemeClr val="lt1"/>
+              </a:fontRef>
+            </p:style>
+            <p:txBody>
+              <a:bodyPr rtlCol="0" anchor="ctr"/>
+              <a:lstStyle/>
+              <a:p>
+                <a:pPr algn="ctr"/>
+                <a:endParaRPr lang="en-CA"/>
+              </a:p>
+            </p:txBody>
+          </p:sp>
+        </p:grpSp>
+        <p:sp>
+          <p:nvSpPr>
+            <p:cNvPr id="8" name="Oval 7">
+              <a:extLst>
+                <a:ext uri="{FF2B5EF4-FFF2-40B4-BE49-F238E27FC236}">
+                  <a16:creationId xmlns:a16="http://schemas.microsoft.com/office/drawing/2014/main" id="{4AC92B43-C54D-B5EB-60C7-6FAF076CA22C}"/>
+                </a:ext>
+              </a:extLst>
+            </p:cNvPr>
+            <p:cNvSpPr/>
+            <p:nvPr/>
+          </p:nvSpPr>
+          <p:spPr>
+            <a:xfrm rot="1875076">
+              <a:off x="5259993" y="3149866"/>
+              <a:ext cx="533400" cy="1492034"/>
+            </a:xfrm>
+            <a:prstGeom prst="ellipse">
+              <a:avLst/>
+            </a:prstGeom>
+            <a:solidFill>
+              <a:srgbClr val="362908"/>
+            </a:solidFill>
+            <a:ln w="76200">
+              <a:solidFill>
+                <a:schemeClr val="tx1"/>
+              </a:solidFill>
+            </a:ln>
+          </p:spPr>
+          <p:style>
+            <a:lnRef idx="2">
+              <a:schemeClr val="accent1">
+                <a:shade val="15000"/>
+              </a:schemeClr>
+            </a:lnRef>
+            <a:fillRef idx="1">
+              <a:schemeClr val="accent1"/>
+            </a:fillRef>
+            <a:effectRef idx="0">
+              <a:schemeClr val="accent1"/>
+            </a:effectRef>
+            <a:fontRef idx="minor">
+              <a:schemeClr val="lt1"/>
+            </a:fontRef>
+          </p:style>
+          <p:txBody>
+            <a:bodyPr rtlCol="0" anchor="ctr"/>
+            <a:lstStyle/>
+            <a:p>
+              <a:pPr algn="ctr"/>
+              <a:endParaRPr lang="en-CA"/>
+            </a:p>
+          </p:txBody>
+        </p:sp>
+      </p:grpSp>
     </p:spTree>
     <p:extLst>
       <p:ext uri="{BB962C8B-B14F-4D97-AF65-F5344CB8AC3E}">
@@ -17716,12 +18187,20 @@
         </p:nvSpPr>
         <p:spPr>
           <a:xfrm rot="18260708">
-            <a:off x="5814417" y="3177117"/>
+            <a:off x="6373135" y="2654318"/>
             <a:ext cx="533400" cy="1492034"/>
           </a:xfrm>
           <a:prstGeom prst="ellipse">
             <a:avLst/>
           </a:prstGeom>
+          <a:solidFill>
+            <a:srgbClr val="0FB5B1"/>
+          </a:solidFill>
+          <a:ln w="76200">
+            <a:solidFill>
+              <a:schemeClr val="tx1"/>
+            </a:solidFill>
+          </a:ln>
         </p:spPr>
         <p:style>
           <a:lnRef idx="2">
@@ -17762,12 +18241,17 @@
         </p:nvSpPr>
         <p:spPr>
           <a:xfrm rot="9112926">
-            <a:off x="5471840" y="4652387"/>
+            <a:off x="6030558" y="4129588"/>
             <a:ext cx="606217" cy="1346174"/>
           </a:xfrm>
           <a:prstGeom prst="ellipse">
             <a:avLst/>
           </a:prstGeom>
+          <a:ln w="76200">
+            <a:solidFill>
+              <a:schemeClr val="tx1"/>
+            </a:solidFill>
+          </a:ln>
         </p:spPr>
         <p:style>
           <a:lnRef idx="2">
@@ -17808,12 +18292,20 @@
         </p:nvSpPr>
         <p:spPr>
           <a:xfrm>
-            <a:off x="4865254" y="2947599"/>
+            <a:off x="5423972" y="2424800"/>
             <a:ext cx="1322877" cy="2401108"/>
           </a:xfrm>
           <a:prstGeom prst="ellipse">
             <a:avLst/>
           </a:prstGeom>
+          <a:solidFill>
+            <a:srgbClr val="0FB5B1"/>
+          </a:solidFill>
+          <a:ln w="76200">
+            <a:solidFill>
+              <a:schemeClr val="tx1"/>
+            </a:solidFill>
+          </a:ln>
         </p:spPr>
         <p:style>
           <a:lnRef idx="2">
@@ -17854,12 +18346,20 @@
         </p:nvSpPr>
         <p:spPr>
           <a:xfrm>
-            <a:off x="4458038" y="1199729"/>
+            <a:off x="5016756" y="676930"/>
             <a:ext cx="2185416" cy="2048256"/>
           </a:xfrm>
           <a:prstGeom prst="ellipse">
             <a:avLst/>
           </a:prstGeom>
+          <a:solidFill>
+            <a:srgbClr val="FEF5F0"/>
+          </a:solidFill>
+          <a:ln w="76200">
+            <a:solidFill>
+              <a:schemeClr val="tx1"/>
+            </a:solidFill>
+          </a:ln>
         </p:spPr>
         <p:style>
           <a:lnRef idx="2">
@@ -17900,12 +18400,17 @@
         </p:nvSpPr>
         <p:spPr>
           <a:xfrm rot="12328088">
-            <a:off x="4908752" y="4675621"/>
+            <a:off x="5467470" y="4152822"/>
             <a:ext cx="606217" cy="1346174"/>
           </a:xfrm>
           <a:prstGeom prst="ellipse">
             <a:avLst/>
           </a:prstGeom>
+          <a:ln w="76200">
+            <a:solidFill>
+              <a:schemeClr val="tx1"/>
+            </a:solidFill>
+          </a:ln>
         </p:spPr>
         <p:style>
           <a:lnRef idx="2">
@@ -17946,12 +18451,20 @@
         </p:nvSpPr>
         <p:spPr>
           <a:xfrm rot="1378696">
-            <a:off x="4598554" y="5578762"/>
+            <a:off x="5157272" y="5055963"/>
             <a:ext cx="533400" cy="1125106"/>
           </a:xfrm>
           <a:prstGeom prst="ellipse">
             <a:avLst/>
           </a:prstGeom>
+          <a:solidFill>
+            <a:srgbClr val="FFFF00"/>
+          </a:solidFill>
+          <a:ln w="76200">
+            <a:solidFill>
+              <a:schemeClr val="tx1"/>
+            </a:solidFill>
+          </a:ln>
         </p:spPr>
         <p:style>
           <a:lnRef idx="2">
@@ -17992,58 +18505,20 @@
         </p:nvSpPr>
         <p:spPr>
           <a:xfrm rot="3652591">
-            <a:off x="4726747" y="3098031"/>
+            <a:off x="5285465" y="2575232"/>
             <a:ext cx="533400" cy="1492034"/>
           </a:xfrm>
           <a:prstGeom prst="ellipse">
             <a:avLst/>
           </a:prstGeom>
-        </p:spPr>
-        <p:style>
-          <a:lnRef idx="2">
-            <a:schemeClr val="accent1">
-              <a:shade val="15000"/>
-            </a:schemeClr>
-          </a:lnRef>
-          <a:fillRef idx="1">
-            <a:schemeClr val="accent1"/>
-          </a:fillRef>
-          <a:effectRef idx="0">
-            <a:schemeClr val="accent1"/>
-          </a:effectRef>
-          <a:fontRef idx="minor">
-            <a:schemeClr val="lt1"/>
-          </a:fontRef>
-        </p:style>
-        <p:txBody>
-          <a:bodyPr rtlCol="0" anchor="ctr"/>
-          <a:lstStyle/>
-          <a:p>
-            <a:pPr algn="ctr"/>
-            <a:endParaRPr lang="en-CA"/>
-          </a:p>
-        </p:txBody>
-      </p:sp>
-      <p:sp>
-        <p:nvSpPr>
-          <p:cNvPr id="9" name="Oval 8">
-            <a:extLst>
-              <a:ext uri="{FF2B5EF4-FFF2-40B4-BE49-F238E27FC236}">
-                <a16:creationId xmlns:a16="http://schemas.microsoft.com/office/drawing/2014/main" id="{B8A3DF8D-8920-15AC-3F8C-120039D54139}"/>
-              </a:ext>
-            </a:extLst>
-          </p:cNvPr>
-          <p:cNvSpPr/>
-          <p:nvPr/>
-        </p:nvSpPr>
-        <p:spPr>
-          <a:xfrm>
-            <a:off x="4754880" y="1901952"/>
-            <a:ext cx="238568" cy="332379"/>
-          </a:xfrm>
-          <a:prstGeom prst="ellipse">
-            <a:avLst/>
-          </a:prstGeom>
+          <a:solidFill>
+            <a:srgbClr val="0FB5B1"/>
+          </a:solidFill>
+          <a:ln w="76200">
+            <a:solidFill>
+              <a:schemeClr val="tx1"/>
+            </a:solidFill>
+          </a:ln>
         </p:spPr>
         <p:style>
           <a:lnRef idx="2">
@@ -18084,12 +18559,20 @@
         </p:nvSpPr>
         <p:spPr>
           <a:xfrm rot="19437084">
-            <a:off x="5921431" y="5499421"/>
+            <a:off x="6480149" y="4976622"/>
             <a:ext cx="533400" cy="1125106"/>
           </a:xfrm>
           <a:prstGeom prst="ellipse">
             <a:avLst/>
           </a:prstGeom>
+          <a:solidFill>
+            <a:srgbClr val="FFFF00"/>
+          </a:solidFill>
+          <a:ln w="76200">
+            <a:solidFill>
+              <a:schemeClr val="tx1"/>
+            </a:solidFill>
+          </a:ln>
         </p:spPr>
         <p:style>
           <a:lnRef idx="2">
@@ -18118,40 +18601,304 @@
       </p:sp>
       <p:sp>
         <p:nvSpPr>
-          <p:cNvPr id="12" name="TextBox 11">
+          <p:cNvPr id="13" name="Rectangle 12">
             <a:extLst>
               <a:ext uri="{FF2B5EF4-FFF2-40B4-BE49-F238E27FC236}">
-                <a16:creationId xmlns:a16="http://schemas.microsoft.com/office/drawing/2014/main" id="{2D420658-B363-7A77-AFEE-B9CCC94CE548}"/>
+                <a16:creationId xmlns:a16="http://schemas.microsoft.com/office/drawing/2014/main" id="{A57A847C-4D05-E969-2496-E0A44B2AD6CB}"/>
               </a:ext>
             </a:extLst>
           </p:cNvPr>
-          <p:cNvSpPr txBox="1"/>
+          <p:cNvSpPr/>
+          <p:nvPr/>
+        </p:nvSpPr>
+        <p:spPr>
+          <a:xfrm rot="1257206">
+            <a:off x="5049726" y="5547782"/>
+            <a:ext cx="518561" cy="730900"/>
+          </a:xfrm>
+          <a:prstGeom prst="rect">
+            <a:avLst/>
+          </a:prstGeom>
+          <a:solidFill>
+            <a:srgbClr val="FFFF00"/>
+          </a:solidFill>
+          <a:ln w="76200">
+            <a:solidFill>
+              <a:schemeClr val="tx1"/>
+            </a:solidFill>
+          </a:ln>
+        </p:spPr>
+        <p:style>
+          <a:lnRef idx="2">
+            <a:schemeClr val="accent1">
+              <a:shade val="15000"/>
+            </a:schemeClr>
+          </a:lnRef>
+          <a:fillRef idx="1">
+            <a:schemeClr val="accent1"/>
+          </a:fillRef>
+          <a:effectRef idx="0">
+            <a:schemeClr val="accent1"/>
+          </a:effectRef>
+          <a:fontRef idx="minor">
+            <a:schemeClr val="lt1"/>
+          </a:fontRef>
+        </p:style>
+        <p:txBody>
+          <a:bodyPr rtlCol="0" anchor="ctr"/>
+          <a:lstStyle/>
+          <a:p>
+            <a:pPr algn="ctr"/>
+            <a:endParaRPr lang="en-CA"/>
+          </a:p>
+        </p:txBody>
+      </p:sp>
+      <p:sp>
+        <p:nvSpPr>
+          <p:cNvPr id="14" name="Rectangle 13">
+            <a:extLst>
+              <a:ext uri="{FF2B5EF4-FFF2-40B4-BE49-F238E27FC236}">
+                <a16:creationId xmlns:a16="http://schemas.microsoft.com/office/drawing/2014/main" id="{4FB04276-AA45-BB6F-7F04-7DFBD4E277CB}"/>
+              </a:ext>
+            </a:extLst>
+          </p:cNvPr>
+          <p:cNvSpPr/>
+          <p:nvPr/>
+        </p:nvSpPr>
+        <p:spPr>
+          <a:xfrm rot="19190725">
+            <a:off x="6685444" y="5408862"/>
+            <a:ext cx="518561" cy="730900"/>
+          </a:xfrm>
+          <a:prstGeom prst="rect">
+            <a:avLst/>
+          </a:prstGeom>
+          <a:solidFill>
+            <a:srgbClr val="FFFF00"/>
+          </a:solidFill>
+          <a:ln w="76200">
+            <a:solidFill>
+              <a:schemeClr val="tx1"/>
+            </a:solidFill>
+          </a:ln>
+        </p:spPr>
+        <p:style>
+          <a:lnRef idx="2">
+            <a:schemeClr val="accent1">
+              <a:shade val="15000"/>
+            </a:schemeClr>
+          </a:lnRef>
+          <a:fillRef idx="1">
+            <a:schemeClr val="accent1"/>
+          </a:fillRef>
+          <a:effectRef idx="0">
+            <a:schemeClr val="accent1"/>
+          </a:effectRef>
+          <a:fontRef idx="minor">
+            <a:schemeClr val="lt1"/>
+          </a:fontRef>
+        </p:style>
+        <p:txBody>
+          <a:bodyPr rtlCol="0" anchor="ctr"/>
+          <a:lstStyle/>
+          <a:p>
+            <a:pPr algn="ctr"/>
+            <a:endParaRPr lang="en-CA"/>
+          </a:p>
+        </p:txBody>
+      </p:sp>
+      <p:sp>
+        <p:nvSpPr>
+          <p:cNvPr id="15" name="Rectangle: Rounded Corners 14">
+            <a:extLst>
+              <a:ext uri="{FF2B5EF4-FFF2-40B4-BE49-F238E27FC236}">
+                <a16:creationId xmlns:a16="http://schemas.microsoft.com/office/drawing/2014/main" id="{48E2CB01-0B21-E4DA-DD7E-8FC8C1AA1A30}"/>
+              </a:ext>
+            </a:extLst>
+          </p:cNvPr>
+          <p:cNvSpPr/>
+          <p:nvPr/>
+        </p:nvSpPr>
+        <p:spPr>
+          <a:xfrm rot="939411">
+            <a:off x="4936184" y="933348"/>
+            <a:ext cx="487789" cy="870364"/>
+          </a:xfrm>
+          <a:prstGeom prst="roundRect">
+            <a:avLst/>
+          </a:prstGeom>
+          <a:solidFill>
+            <a:schemeClr val="tx1"/>
+          </a:solidFill>
+          <a:ln w="76200">
+            <a:solidFill>
+              <a:schemeClr val="tx1"/>
+            </a:solidFill>
+          </a:ln>
+        </p:spPr>
+        <p:style>
+          <a:lnRef idx="2">
+            <a:schemeClr val="accent1">
+              <a:shade val="15000"/>
+            </a:schemeClr>
+          </a:lnRef>
+          <a:fillRef idx="1">
+            <a:schemeClr val="accent1"/>
+          </a:fillRef>
+          <a:effectRef idx="0">
+            <a:schemeClr val="accent1"/>
+          </a:effectRef>
+          <a:fontRef idx="minor">
+            <a:schemeClr val="lt1"/>
+          </a:fontRef>
+        </p:style>
+        <p:txBody>
+          <a:bodyPr rtlCol="0" anchor="ctr"/>
+          <a:lstStyle/>
+          <a:p>
+            <a:pPr algn="ctr"/>
+            <a:endParaRPr lang="en-CA"/>
+          </a:p>
+        </p:txBody>
+      </p:sp>
+      <p:sp>
+        <p:nvSpPr>
+          <p:cNvPr id="16" name="Rectangle: Rounded Corners 15">
+            <a:extLst>
+              <a:ext uri="{FF2B5EF4-FFF2-40B4-BE49-F238E27FC236}">
+                <a16:creationId xmlns:a16="http://schemas.microsoft.com/office/drawing/2014/main" id="{34BC0CE8-D6D8-E100-04AD-1E5B065159FC}"/>
+              </a:ext>
+            </a:extLst>
+          </p:cNvPr>
+          <p:cNvSpPr/>
           <p:nvPr/>
         </p:nvSpPr>
         <p:spPr>
           <a:xfrm>
-            <a:off x="6847535" y="5852160"/>
-            <a:ext cx="2579929" cy="369332"/>
+            <a:off x="5309006" y="1368530"/>
+            <a:ext cx="1893166" cy="164528"/>
           </a:xfrm>
-          <a:prstGeom prst="rect">
+          <a:prstGeom prst="roundRect">
             <a:avLst/>
           </a:prstGeom>
-          <a:noFill/>
+          <a:solidFill>
+            <a:schemeClr val="tx1"/>
+          </a:solidFill>
+          <a:ln>
+            <a:solidFill>
+              <a:schemeClr val="tx1"/>
+            </a:solidFill>
+          </a:ln>
         </p:spPr>
+        <p:style>
+          <a:lnRef idx="2">
+            <a:schemeClr val="accent1">
+              <a:shade val="15000"/>
+            </a:schemeClr>
+          </a:lnRef>
+          <a:fillRef idx="1">
+            <a:schemeClr val="accent1"/>
+          </a:fillRef>
+          <a:effectRef idx="0">
+            <a:schemeClr val="accent1"/>
+          </a:effectRef>
+          <a:fontRef idx="minor">
+            <a:schemeClr val="lt1"/>
+          </a:fontRef>
+        </p:style>
         <p:txBody>
-          <a:bodyPr wrap="square" rtlCol="0">
-            <a:spAutoFit/>
-          </a:bodyPr>
+          <a:bodyPr rtlCol="0" anchor="ctr"/>
           <a:lstStyle/>
           <a:p>
-            <a:r>
-              <a:rPr lang="en-US" dirty="0"/>
-              <a:t>Flippers?</a:t>
-            </a:r>
-            <a:endParaRPr lang="en-CA" dirty="0"/>
+            <a:pPr algn="ctr"/>
+            <a:endParaRPr lang="en-CA"/>
           </a:p>
         </p:txBody>
       </p:sp>
+      <p:cxnSp>
+        <p:nvCxnSpPr>
+          <p:cNvPr id="18" name="Straight Connector 17">
+            <a:extLst>
+              <a:ext uri="{FF2B5EF4-FFF2-40B4-BE49-F238E27FC236}">
+                <a16:creationId xmlns:a16="http://schemas.microsoft.com/office/drawing/2014/main" id="{AC96A8D5-04DE-96DA-A4E4-53854DD9C9A9}"/>
+              </a:ext>
+            </a:extLst>
+          </p:cNvPr>
+          <p:cNvCxnSpPr/>
+          <p:nvPr/>
+        </p:nvCxnSpPr>
+        <p:spPr>
+          <a:xfrm>
+            <a:off x="5121965" y="3273287"/>
+            <a:ext cx="187041" cy="430696"/>
+          </a:xfrm>
+          <a:prstGeom prst="line">
+            <a:avLst/>
+          </a:prstGeom>
+          <a:ln w="76200">
+            <a:solidFill>
+              <a:schemeClr val="tx1"/>
+            </a:solidFill>
+          </a:ln>
+        </p:spPr>
+        <p:style>
+          <a:lnRef idx="2">
+            <a:schemeClr val="accent1"/>
+          </a:lnRef>
+          <a:fillRef idx="0">
+            <a:schemeClr val="accent1"/>
+          </a:fillRef>
+          <a:effectRef idx="1">
+            <a:schemeClr val="accent1"/>
+          </a:effectRef>
+          <a:fontRef idx="minor">
+            <a:schemeClr val="tx1"/>
+          </a:fontRef>
+        </p:style>
+      </p:cxnSp>
+      <p:cxnSp>
+        <p:nvCxnSpPr>
+          <p:cNvPr id="19" name="Straight Connector 18">
+            <a:extLst>
+              <a:ext uri="{FF2B5EF4-FFF2-40B4-BE49-F238E27FC236}">
+                <a16:creationId xmlns:a16="http://schemas.microsoft.com/office/drawing/2014/main" id="{57A11922-8600-5C6D-AC9B-59C32D732C66}"/>
+              </a:ext>
+            </a:extLst>
+          </p:cNvPr>
+          <p:cNvCxnSpPr>
+            <a:cxnSpLocks/>
+          </p:cNvCxnSpPr>
+          <p:nvPr/>
+        </p:nvCxnSpPr>
+        <p:spPr>
+          <a:xfrm flipH="1">
+            <a:off x="6806008" y="3390128"/>
+            <a:ext cx="277432" cy="392558"/>
+          </a:xfrm>
+          <a:prstGeom prst="line">
+            <a:avLst/>
+          </a:prstGeom>
+          <a:ln w="76200">
+            <a:solidFill>
+              <a:schemeClr val="tx1"/>
+            </a:solidFill>
+          </a:ln>
+        </p:spPr>
+        <p:style>
+          <a:lnRef idx="2">
+            <a:schemeClr val="accent1"/>
+          </a:lnRef>
+          <a:fillRef idx="0">
+            <a:schemeClr val="accent1"/>
+          </a:fillRef>
+          <a:effectRef idx="1">
+            <a:schemeClr val="accent1"/>
+          </a:effectRef>
+          <a:fontRef idx="minor">
+            <a:schemeClr val="tx1"/>
+          </a:fontRef>
+        </p:style>
+      </p:cxnSp>
     </p:spTree>
     <p:extLst>
       <p:ext uri="{BB962C8B-B14F-4D97-AF65-F5344CB8AC3E}">
@@ -18638,414 +19385,713 @@
           <a:chExt cx="0" cy="0"/>
         </a:xfrm>
       </p:grpSpPr>
-      <p:sp>
-        <p:nvSpPr>
-          <p:cNvPr id="2" name="Rectangle: Rounded Corners 1">
+      <p:grpSp>
+        <p:nvGrpSpPr>
+          <p:cNvPr id="13" name="Group 12">
             <a:extLst>
               <a:ext uri="{FF2B5EF4-FFF2-40B4-BE49-F238E27FC236}">
-                <a16:creationId xmlns:a16="http://schemas.microsoft.com/office/drawing/2014/main" id="{B730DA2C-78F1-643D-B30D-526E0595FD4C}"/>
+                <a16:creationId xmlns:a16="http://schemas.microsoft.com/office/drawing/2014/main" id="{8835E4A4-D68A-7D9D-4F52-50FD316D23C5}"/>
               </a:ext>
             </a:extLst>
           </p:cNvPr>
-          <p:cNvSpPr/>
+          <p:cNvGrpSpPr/>
           <p:nvPr/>
-        </p:nvSpPr>
-        <p:spPr>
-          <a:xfrm rot="16977079">
-            <a:off x="3258277" y="3022400"/>
-            <a:ext cx="3273552" cy="603504"/>
+        </p:nvGrpSpPr>
+        <p:grpSpPr>
+          <a:xfrm>
+            <a:off x="3142218" y="1615338"/>
+            <a:ext cx="5907564" cy="3627323"/>
+            <a:chOff x="3380070" y="1203671"/>
+            <a:chExt cx="5907564" cy="3627323"/>
           </a:xfrm>
-          <a:prstGeom prst="roundRect">
-            <a:avLst>
-              <a:gd name="adj" fmla="val 50000"/>
-            </a:avLst>
-          </a:prstGeom>
-        </p:spPr>
-        <p:style>
-          <a:lnRef idx="2">
-            <a:schemeClr val="accent1">
-              <a:shade val="15000"/>
-            </a:schemeClr>
-          </a:lnRef>
-          <a:fillRef idx="1">
-            <a:schemeClr val="accent1"/>
-          </a:fillRef>
-          <a:effectRef idx="0">
-            <a:schemeClr val="accent1"/>
-          </a:effectRef>
-          <a:fontRef idx="minor">
-            <a:schemeClr val="lt1"/>
-          </a:fontRef>
-        </p:style>
-        <p:txBody>
-          <a:bodyPr rtlCol="0" anchor="ctr"/>
-          <a:lstStyle/>
-          <a:p>
-            <a:pPr algn="ctr"/>
-            <a:endParaRPr lang="en-CA"/>
-          </a:p>
-        </p:txBody>
-      </p:sp>
-      <p:sp>
-        <p:nvSpPr>
-          <p:cNvPr id="4" name="Oval 3">
-            <a:extLst>
-              <a:ext uri="{FF2B5EF4-FFF2-40B4-BE49-F238E27FC236}">
-                <a16:creationId xmlns:a16="http://schemas.microsoft.com/office/drawing/2014/main" id="{6AB22A39-1263-4F11-148F-DF7B048F3358}"/>
-              </a:ext>
-            </a:extLst>
-          </p:cNvPr>
-          <p:cNvSpPr/>
-          <p:nvPr/>
-        </p:nvSpPr>
-        <p:spPr>
-          <a:xfrm rot="16443769">
-            <a:off x="4300076" y="2810273"/>
-            <a:ext cx="1322877" cy="2401108"/>
-          </a:xfrm>
-          <a:prstGeom prst="ellipse">
-            <a:avLst/>
-          </a:prstGeom>
-        </p:spPr>
-        <p:style>
-          <a:lnRef idx="2">
-            <a:schemeClr val="accent1">
-              <a:shade val="15000"/>
-            </a:schemeClr>
-          </a:lnRef>
-          <a:fillRef idx="1">
-            <a:schemeClr val="accent1"/>
-          </a:fillRef>
-          <a:effectRef idx="0">
-            <a:schemeClr val="accent1"/>
-          </a:effectRef>
-          <a:fontRef idx="minor">
-            <a:schemeClr val="lt1"/>
-          </a:fontRef>
-        </p:style>
-        <p:txBody>
-          <a:bodyPr rtlCol="0" anchor="ctr"/>
-          <a:lstStyle/>
-          <a:p>
-            <a:pPr algn="ctr"/>
-            <a:endParaRPr lang="en-CA"/>
-          </a:p>
-        </p:txBody>
-      </p:sp>
-      <p:sp>
-        <p:nvSpPr>
-          <p:cNvPr id="5" name="Rectangle: Rounded Corners 4">
-            <a:extLst>
-              <a:ext uri="{FF2B5EF4-FFF2-40B4-BE49-F238E27FC236}">
-                <a16:creationId xmlns:a16="http://schemas.microsoft.com/office/drawing/2014/main" id="{B930CD3B-0E46-89E9-551F-787D33256F1B}"/>
-              </a:ext>
-            </a:extLst>
-          </p:cNvPr>
-          <p:cNvSpPr/>
-          <p:nvPr/>
-        </p:nvSpPr>
-        <p:spPr>
-          <a:xfrm rot="18876817">
-            <a:off x="3889254" y="3343041"/>
-            <a:ext cx="3273552" cy="603504"/>
-          </a:xfrm>
-          <a:prstGeom prst="roundRect">
-            <a:avLst>
-              <a:gd name="adj" fmla="val 50000"/>
-            </a:avLst>
-          </a:prstGeom>
-        </p:spPr>
-        <p:style>
-          <a:lnRef idx="2">
-            <a:schemeClr val="accent1">
-              <a:shade val="15000"/>
-            </a:schemeClr>
-          </a:lnRef>
-          <a:fillRef idx="1">
-            <a:schemeClr val="accent1"/>
-          </a:fillRef>
-          <a:effectRef idx="0">
-            <a:schemeClr val="accent1"/>
-          </a:effectRef>
-          <a:fontRef idx="minor">
-            <a:schemeClr val="lt1"/>
-          </a:fontRef>
-        </p:style>
-        <p:txBody>
-          <a:bodyPr rtlCol="0" anchor="ctr"/>
-          <a:lstStyle/>
-          <a:p>
-            <a:pPr algn="ctr"/>
-            <a:endParaRPr lang="en-CA"/>
-          </a:p>
-        </p:txBody>
-      </p:sp>
-      <p:sp>
-        <p:nvSpPr>
-          <p:cNvPr id="11" name="Oval 10">
-            <a:extLst>
-              <a:ext uri="{FF2B5EF4-FFF2-40B4-BE49-F238E27FC236}">
-                <a16:creationId xmlns:a16="http://schemas.microsoft.com/office/drawing/2014/main" id="{8FFB2620-019C-FB32-A7A3-692980461684}"/>
-              </a:ext>
-            </a:extLst>
-          </p:cNvPr>
-          <p:cNvSpPr/>
-          <p:nvPr/>
-        </p:nvSpPr>
-        <p:spPr>
-          <a:xfrm>
-            <a:off x="2094608" y="2061369"/>
-            <a:ext cx="2185416" cy="2048256"/>
-          </a:xfrm>
-          <a:prstGeom prst="ellipse">
-            <a:avLst/>
-          </a:prstGeom>
-        </p:spPr>
-        <p:style>
-          <a:lnRef idx="2">
-            <a:schemeClr val="accent1">
-              <a:shade val="15000"/>
-            </a:schemeClr>
-          </a:lnRef>
-          <a:fillRef idx="1">
-            <a:schemeClr val="accent1"/>
-          </a:fillRef>
-          <a:effectRef idx="0">
-            <a:schemeClr val="accent1"/>
-          </a:effectRef>
-          <a:fontRef idx="minor">
-            <a:schemeClr val="lt1"/>
-          </a:fontRef>
-        </p:style>
-        <p:txBody>
-          <a:bodyPr rtlCol="0" anchor="ctr"/>
-          <a:lstStyle/>
-          <a:p>
-            <a:pPr algn="ctr"/>
-            <a:endParaRPr lang="en-CA"/>
-          </a:p>
-        </p:txBody>
-      </p:sp>
-      <p:sp>
-        <p:nvSpPr>
-          <p:cNvPr id="6" name="Oval 5">
-            <a:extLst>
-              <a:ext uri="{FF2B5EF4-FFF2-40B4-BE49-F238E27FC236}">
-                <a16:creationId xmlns:a16="http://schemas.microsoft.com/office/drawing/2014/main" id="{A03D4106-AD09-4027-2FF9-A07ADB635690}"/>
-              </a:ext>
-            </a:extLst>
-          </p:cNvPr>
-          <p:cNvSpPr/>
-          <p:nvPr/>
-        </p:nvSpPr>
-        <p:spPr>
-          <a:xfrm rot="4950290">
-            <a:off x="6245038" y="3439047"/>
-            <a:ext cx="606217" cy="1346174"/>
-          </a:xfrm>
-          <a:prstGeom prst="ellipse">
-            <a:avLst/>
-          </a:prstGeom>
-        </p:spPr>
-        <p:style>
-          <a:lnRef idx="2">
-            <a:schemeClr val="accent1">
-              <a:shade val="15000"/>
-            </a:schemeClr>
-          </a:lnRef>
-          <a:fillRef idx="1">
-            <a:schemeClr val="accent1"/>
-          </a:fillRef>
-          <a:effectRef idx="0">
-            <a:schemeClr val="accent1"/>
-          </a:effectRef>
-          <a:fontRef idx="minor">
-            <a:schemeClr val="lt1"/>
-          </a:fontRef>
-        </p:style>
-        <p:txBody>
-          <a:bodyPr rtlCol="0" anchor="ctr"/>
-          <a:lstStyle/>
-          <a:p>
-            <a:pPr algn="ctr"/>
-            <a:endParaRPr lang="en-CA"/>
-          </a:p>
-        </p:txBody>
-      </p:sp>
-      <p:sp>
-        <p:nvSpPr>
-          <p:cNvPr id="7" name="Oval 6">
-            <a:extLst>
-              <a:ext uri="{FF2B5EF4-FFF2-40B4-BE49-F238E27FC236}">
-                <a16:creationId xmlns:a16="http://schemas.microsoft.com/office/drawing/2014/main" id="{847262A3-982D-328E-8C83-CB97D907A70A}"/>
-              </a:ext>
-            </a:extLst>
-          </p:cNvPr>
-          <p:cNvSpPr/>
-          <p:nvPr/>
-        </p:nvSpPr>
-        <p:spPr>
-          <a:xfrm rot="14293247">
-            <a:off x="7172919" y="3259608"/>
-            <a:ext cx="533400" cy="1125106"/>
-          </a:xfrm>
-          <a:prstGeom prst="ellipse">
-            <a:avLst/>
-          </a:prstGeom>
-        </p:spPr>
-        <p:style>
-          <a:lnRef idx="2">
-            <a:schemeClr val="accent1">
-              <a:shade val="15000"/>
-            </a:schemeClr>
-          </a:lnRef>
-          <a:fillRef idx="1">
-            <a:schemeClr val="accent1"/>
-          </a:fillRef>
-          <a:effectRef idx="0">
-            <a:schemeClr val="accent1"/>
-          </a:effectRef>
-          <a:fontRef idx="minor">
-            <a:schemeClr val="lt1"/>
-          </a:fontRef>
-        </p:style>
-        <p:txBody>
-          <a:bodyPr rtlCol="0" anchor="ctr"/>
-          <a:lstStyle/>
-          <a:p>
-            <a:pPr algn="ctr"/>
-            <a:endParaRPr lang="en-CA"/>
-          </a:p>
-        </p:txBody>
-      </p:sp>
-      <p:sp>
-        <p:nvSpPr>
-          <p:cNvPr id="8" name="Oval 7">
-            <a:extLst>
-              <a:ext uri="{FF2B5EF4-FFF2-40B4-BE49-F238E27FC236}">
-                <a16:creationId xmlns:a16="http://schemas.microsoft.com/office/drawing/2014/main" id="{DF88E84F-08A2-EF91-FBCA-067DA0558BEF}"/>
-              </a:ext>
-            </a:extLst>
-          </p:cNvPr>
-          <p:cNvSpPr/>
-          <p:nvPr/>
-        </p:nvSpPr>
-        <p:spPr>
-          <a:xfrm rot="1875076">
-            <a:off x="3450414" y="3680219"/>
-            <a:ext cx="533400" cy="1492034"/>
-          </a:xfrm>
-          <a:prstGeom prst="ellipse">
-            <a:avLst/>
-          </a:prstGeom>
-        </p:spPr>
-        <p:style>
-          <a:lnRef idx="2">
-            <a:schemeClr val="accent1">
-              <a:shade val="15000"/>
-            </a:schemeClr>
-          </a:lnRef>
-          <a:fillRef idx="1">
-            <a:schemeClr val="accent1"/>
-          </a:fillRef>
-          <a:effectRef idx="0">
-            <a:schemeClr val="accent1"/>
-          </a:effectRef>
-          <a:fontRef idx="minor">
-            <a:schemeClr val="lt1"/>
-          </a:fontRef>
-        </p:style>
-        <p:txBody>
-          <a:bodyPr rtlCol="0" anchor="ctr"/>
-          <a:lstStyle/>
-          <a:p>
-            <a:pPr algn="ctr"/>
-            <a:endParaRPr lang="en-CA"/>
-          </a:p>
-        </p:txBody>
-      </p:sp>
-      <p:sp>
-        <p:nvSpPr>
-          <p:cNvPr id="9" name="Oval 8">
-            <a:extLst>
-              <a:ext uri="{FF2B5EF4-FFF2-40B4-BE49-F238E27FC236}">
-                <a16:creationId xmlns:a16="http://schemas.microsoft.com/office/drawing/2014/main" id="{7934184C-F741-8CA8-17E4-5187D4501166}"/>
-              </a:ext>
-            </a:extLst>
-          </p:cNvPr>
-          <p:cNvSpPr/>
-          <p:nvPr/>
-        </p:nvSpPr>
-        <p:spPr>
-          <a:xfrm>
-            <a:off x="2391450" y="2763592"/>
-            <a:ext cx="238568" cy="332379"/>
-          </a:xfrm>
-          <a:prstGeom prst="ellipse">
-            <a:avLst/>
-          </a:prstGeom>
-        </p:spPr>
-        <p:style>
-          <a:lnRef idx="2">
-            <a:schemeClr val="accent1">
-              <a:shade val="15000"/>
-            </a:schemeClr>
-          </a:lnRef>
-          <a:fillRef idx="1">
-            <a:schemeClr val="accent1"/>
-          </a:fillRef>
-          <a:effectRef idx="0">
-            <a:schemeClr val="accent1"/>
-          </a:effectRef>
-          <a:fontRef idx="minor">
-            <a:schemeClr val="lt1"/>
-          </a:fontRef>
-        </p:style>
-        <p:txBody>
-          <a:bodyPr rtlCol="0" anchor="ctr"/>
-          <a:lstStyle/>
-          <a:p>
-            <a:pPr algn="ctr"/>
-            <a:endParaRPr lang="en-CA"/>
-          </a:p>
-        </p:txBody>
-      </p:sp>
-      <p:sp>
-        <p:nvSpPr>
-          <p:cNvPr id="3" name="TextBox 2">
-            <a:extLst>
-              <a:ext uri="{FF2B5EF4-FFF2-40B4-BE49-F238E27FC236}">
-                <a16:creationId xmlns:a16="http://schemas.microsoft.com/office/drawing/2014/main" id="{7FA8A656-AB0D-3FBA-B797-A2C023BD9B49}"/>
-              </a:ext>
-            </a:extLst>
-          </p:cNvPr>
-          <p:cNvSpPr txBox="1"/>
-          <p:nvPr/>
-        </p:nvSpPr>
-        <p:spPr>
-          <a:xfrm>
-            <a:off x="5555968" y="1380744"/>
-            <a:ext cx="1951256" cy="369332"/>
-          </a:xfrm>
-          <a:prstGeom prst="rect">
-            <a:avLst/>
-          </a:prstGeom>
-          <a:noFill/>
-        </p:spPr>
-        <p:txBody>
-          <a:bodyPr wrap="square" rtlCol="0">
-            <a:spAutoFit/>
-          </a:bodyPr>
-          <a:lstStyle/>
-          <a:p>
-            <a:r>
-              <a:rPr lang="en-US" dirty="0"/>
-              <a:t>Pool noodle</a:t>
-            </a:r>
-            <a:endParaRPr lang="en-CA" dirty="0"/>
-          </a:p>
-        </p:txBody>
-      </p:sp>
+        </p:grpSpPr>
+        <p:sp>
+          <p:nvSpPr>
+            <p:cNvPr id="2" name="Rectangle: Rounded Corners 1">
+              <a:extLst>
+                <a:ext uri="{FF2B5EF4-FFF2-40B4-BE49-F238E27FC236}">
+                  <a16:creationId xmlns:a16="http://schemas.microsoft.com/office/drawing/2014/main" id="{B730DA2C-78F1-643D-B30D-526E0595FD4C}"/>
+                </a:ext>
+              </a:extLst>
+            </p:cNvPr>
+            <p:cNvSpPr/>
+            <p:nvPr/>
+          </p:nvSpPr>
+          <p:spPr>
+            <a:xfrm rot="16977079">
+              <a:off x="4543739" y="2538695"/>
+              <a:ext cx="3273552" cy="603504"/>
+            </a:xfrm>
+            <a:prstGeom prst="roundRect">
+              <a:avLst>
+                <a:gd name="adj" fmla="val 50000"/>
+              </a:avLst>
+            </a:prstGeom>
+            <a:solidFill>
+              <a:srgbClr val="E452BA"/>
+            </a:solidFill>
+            <a:ln w="76200">
+              <a:solidFill>
+                <a:schemeClr val="tx1"/>
+              </a:solidFill>
+            </a:ln>
+          </p:spPr>
+          <p:style>
+            <a:lnRef idx="2">
+              <a:schemeClr val="accent1">
+                <a:shade val="15000"/>
+              </a:schemeClr>
+            </a:lnRef>
+            <a:fillRef idx="1">
+              <a:schemeClr val="accent1"/>
+            </a:fillRef>
+            <a:effectRef idx="0">
+              <a:schemeClr val="accent1"/>
+            </a:effectRef>
+            <a:fontRef idx="minor">
+              <a:schemeClr val="lt1"/>
+            </a:fontRef>
+          </p:style>
+          <p:txBody>
+            <a:bodyPr rtlCol="0" anchor="ctr"/>
+            <a:lstStyle/>
+            <a:p>
+              <a:pPr algn="ctr"/>
+              <a:endParaRPr lang="en-CA"/>
+            </a:p>
+          </p:txBody>
+        </p:sp>
+        <p:sp>
+          <p:nvSpPr>
+            <p:cNvPr id="4" name="Oval 3">
+              <a:extLst>
+                <a:ext uri="{FF2B5EF4-FFF2-40B4-BE49-F238E27FC236}">
+                  <a16:creationId xmlns:a16="http://schemas.microsoft.com/office/drawing/2014/main" id="{6AB22A39-1263-4F11-148F-DF7B048F3358}"/>
+                </a:ext>
+              </a:extLst>
+            </p:cNvPr>
+            <p:cNvSpPr/>
+            <p:nvPr/>
+          </p:nvSpPr>
+          <p:spPr>
+            <a:xfrm rot="16443769">
+              <a:off x="5585538" y="2326568"/>
+              <a:ext cx="1322877" cy="2401108"/>
+            </a:xfrm>
+            <a:prstGeom prst="ellipse">
+              <a:avLst/>
+            </a:prstGeom>
+            <a:solidFill>
+              <a:srgbClr val="D4AA78"/>
+            </a:solidFill>
+            <a:ln w="76200">
+              <a:solidFill>
+                <a:schemeClr val="tx1"/>
+              </a:solidFill>
+            </a:ln>
+          </p:spPr>
+          <p:style>
+            <a:lnRef idx="2">
+              <a:schemeClr val="accent1">
+                <a:shade val="15000"/>
+              </a:schemeClr>
+            </a:lnRef>
+            <a:fillRef idx="1">
+              <a:schemeClr val="accent1"/>
+            </a:fillRef>
+            <a:effectRef idx="0">
+              <a:schemeClr val="accent1"/>
+            </a:effectRef>
+            <a:fontRef idx="minor">
+              <a:schemeClr val="lt1"/>
+            </a:fontRef>
+          </p:style>
+          <p:txBody>
+            <a:bodyPr rtlCol="0" anchor="ctr"/>
+            <a:lstStyle/>
+            <a:p>
+              <a:pPr algn="ctr"/>
+              <a:endParaRPr lang="en-CA"/>
+            </a:p>
+          </p:txBody>
+        </p:sp>
+        <p:sp>
+          <p:nvSpPr>
+            <p:cNvPr id="11" name="Oval 10">
+              <a:extLst>
+                <a:ext uri="{FF2B5EF4-FFF2-40B4-BE49-F238E27FC236}">
+                  <a16:creationId xmlns:a16="http://schemas.microsoft.com/office/drawing/2014/main" id="{8FFB2620-019C-FB32-A7A3-692980461684}"/>
+                </a:ext>
+              </a:extLst>
+            </p:cNvPr>
+            <p:cNvSpPr/>
+            <p:nvPr/>
+          </p:nvSpPr>
+          <p:spPr>
+            <a:xfrm>
+              <a:off x="3380070" y="1577664"/>
+              <a:ext cx="2185416" cy="2048256"/>
+            </a:xfrm>
+            <a:prstGeom prst="ellipse">
+              <a:avLst/>
+            </a:prstGeom>
+            <a:solidFill>
+              <a:srgbClr val="D4AA78"/>
+            </a:solidFill>
+            <a:ln w="76200">
+              <a:solidFill>
+                <a:schemeClr val="tx1"/>
+              </a:solidFill>
+            </a:ln>
+          </p:spPr>
+          <p:style>
+            <a:lnRef idx="2">
+              <a:schemeClr val="accent1">
+                <a:shade val="15000"/>
+              </a:schemeClr>
+            </a:lnRef>
+            <a:fillRef idx="1">
+              <a:schemeClr val="accent1"/>
+            </a:fillRef>
+            <a:effectRef idx="0">
+              <a:schemeClr val="accent1"/>
+            </a:effectRef>
+            <a:fontRef idx="minor">
+              <a:schemeClr val="lt1"/>
+            </a:fontRef>
+          </p:style>
+          <p:txBody>
+            <a:bodyPr rtlCol="0" anchor="ctr"/>
+            <a:lstStyle/>
+            <a:p>
+              <a:pPr algn="ctr"/>
+              <a:endParaRPr lang="en-CA"/>
+            </a:p>
+          </p:txBody>
+        </p:sp>
+        <p:sp>
+          <p:nvSpPr>
+            <p:cNvPr id="8" name="Oval 7">
+              <a:extLst>
+                <a:ext uri="{FF2B5EF4-FFF2-40B4-BE49-F238E27FC236}">
+                  <a16:creationId xmlns:a16="http://schemas.microsoft.com/office/drawing/2014/main" id="{DF88E84F-08A2-EF91-FBCA-067DA0558BEF}"/>
+                </a:ext>
+              </a:extLst>
+            </p:cNvPr>
+            <p:cNvSpPr/>
+            <p:nvPr/>
+          </p:nvSpPr>
+          <p:spPr>
+            <a:xfrm rot="1875076">
+              <a:off x="4735876" y="3196514"/>
+              <a:ext cx="533400" cy="1492034"/>
+            </a:xfrm>
+            <a:prstGeom prst="ellipse">
+              <a:avLst/>
+            </a:prstGeom>
+            <a:solidFill>
+              <a:srgbClr val="D4AA78"/>
+            </a:solidFill>
+            <a:ln w="76200">
+              <a:solidFill>
+                <a:schemeClr val="tx1"/>
+              </a:solidFill>
+            </a:ln>
+          </p:spPr>
+          <p:style>
+            <a:lnRef idx="2">
+              <a:schemeClr val="accent1">
+                <a:shade val="15000"/>
+              </a:schemeClr>
+            </a:lnRef>
+            <a:fillRef idx="1">
+              <a:schemeClr val="accent1"/>
+            </a:fillRef>
+            <a:effectRef idx="0">
+              <a:schemeClr val="accent1"/>
+            </a:effectRef>
+            <a:fontRef idx="minor">
+              <a:schemeClr val="lt1"/>
+            </a:fontRef>
+          </p:style>
+          <p:txBody>
+            <a:bodyPr rtlCol="0" anchor="ctr"/>
+            <a:lstStyle/>
+            <a:p>
+              <a:pPr algn="ctr"/>
+              <a:endParaRPr lang="en-CA"/>
+            </a:p>
+          </p:txBody>
+        </p:sp>
+        <p:sp>
+          <p:nvSpPr>
+            <p:cNvPr id="10" name="Freeform: Shape 9">
+              <a:extLst>
+                <a:ext uri="{FF2B5EF4-FFF2-40B4-BE49-F238E27FC236}">
+                  <a16:creationId xmlns:a16="http://schemas.microsoft.com/office/drawing/2014/main" id="{CF2E6C38-7389-375E-4FE8-37694D5A1F34}"/>
+                </a:ext>
+              </a:extLst>
+            </p:cNvPr>
+            <p:cNvSpPr/>
+            <p:nvPr/>
+          </p:nvSpPr>
+          <p:spPr>
+            <a:xfrm>
+              <a:off x="6639340" y="2935356"/>
+              <a:ext cx="828261" cy="1225826"/>
+            </a:xfrm>
+            <a:custGeom>
+              <a:avLst/>
+              <a:gdLst>
+                <a:gd name="connsiteX0" fmla="*/ 26505 w 828261"/>
+                <a:gd name="connsiteY0" fmla="*/ 0 h 1225826"/>
+                <a:gd name="connsiteX1" fmla="*/ 318052 w 828261"/>
+                <a:gd name="connsiteY1" fmla="*/ 106017 h 1225826"/>
+                <a:gd name="connsiteX2" fmla="*/ 642731 w 828261"/>
+                <a:gd name="connsiteY2" fmla="*/ 278296 h 1225826"/>
+                <a:gd name="connsiteX3" fmla="*/ 768626 w 828261"/>
+                <a:gd name="connsiteY3" fmla="*/ 510209 h 1225826"/>
+                <a:gd name="connsiteX4" fmla="*/ 815009 w 828261"/>
+                <a:gd name="connsiteY4" fmla="*/ 629478 h 1225826"/>
+                <a:gd name="connsiteX5" fmla="*/ 828261 w 828261"/>
+                <a:gd name="connsiteY5" fmla="*/ 775252 h 1225826"/>
+                <a:gd name="connsiteX6" fmla="*/ 801757 w 828261"/>
+                <a:gd name="connsiteY6" fmla="*/ 868017 h 1225826"/>
+                <a:gd name="connsiteX7" fmla="*/ 695739 w 828261"/>
+                <a:gd name="connsiteY7" fmla="*/ 980661 h 1225826"/>
+                <a:gd name="connsiteX8" fmla="*/ 549965 w 828261"/>
+                <a:gd name="connsiteY8" fmla="*/ 1066800 h 1225826"/>
+                <a:gd name="connsiteX9" fmla="*/ 265044 w 828261"/>
+                <a:gd name="connsiteY9" fmla="*/ 1172817 h 1225826"/>
+                <a:gd name="connsiteX10" fmla="*/ 0 w 828261"/>
+                <a:gd name="connsiteY10" fmla="*/ 1225826 h 1225826"/>
+                <a:gd name="connsiteX11" fmla="*/ 26505 w 828261"/>
+                <a:gd name="connsiteY11" fmla="*/ 0 h 1225826"/>
+              </a:gdLst>
+              <a:ahLst/>
+              <a:cxnLst>
+                <a:cxn ang="0">
+                  <a:pos x="connsiteX0" y="connsiteY0"/>
+                </a:cxn>
+                <a:cxn ang="0">
+                  <a:pos x="connsiteX1" y="connsiteY1"/>
+                </a:cxn>
+                <a:cxn ang="0">
+                  <a:pos x="connsiteX2" y="connsiteY2"/>
+                </a:cxn>
+                <a:cxn ang="0">
+                  <a:pos x="connsiteX3" y="connsiteY3"/>
+                </a:cxn>
+                <a:cxn ang="0">
+                  <a:pos x="connsiteX4" y="connsiteY4"/>
+                </a:cxn>
+                <a:cxn ang="0">
+                  <a:pos x="connsiteX5" y="connsiteY5"/>
+                </a:cxn>
+                <a:cxn ang="0">
+                  <a:pos x="connsiteX6" y="connsiteY6"/>
+                </a:cxn>
+                <a:cxn ang="0">
+                  <a:pos x="connsiteX7" y="connsiteY7"/>
+                </a:cxn>
+                <a:cxn ang="0">
+                  <a:pos x="connsiteX8" y="connsiteY8"/>
+                </a:cxn>
+                <a:cxn ang="0">
+                  <a:pos x="connsiteX9" y="connsiteY9"/>
+                </a:cxn>
+                <a:cxn ang="0">
+                  <a:pos x="connsiteX10" y="connsiteY10"/>
+                </a:cxn>
+                <a:cxn ang="0">
+                  <a:pos x="connsiteX11" y="connsiteY11"/>
+                </a:cxn>
+              </a:cxnLst>
+              <a:rect l="l" t="t" r="r" b="b"/>
+              <a:pathLst>
+                <a:path w="828261" h="1225826">
+                  <a:moveTo>
+                    <a:pt x="26505" y="0"/>
+                  </a:moveTo>
+                  <a:lnTo>
+                    <a:pt x="318052" y="106017"/>
+                  </a:lnTo>
+                  <a:lnTo>
+                    <a:pt x="642731" y="278296"/>
+                  </a:lnTo>
+                  <a:lnTo>
+                    <a:pt x="768626" y="510209"/>
+                  </a:lnTo>
+                  <a:lnTo>
+                    <a:pt x="815009" y="629478"/>
+                  </a:lnTo>
+                  <a:lnTo>
+                    <a:pt x="828261" y="775252"/>
+                  </a:lnTo>
+                  <a:lnTo>
+                    <a:pt x="801757" y="868017"/>
+                  </a:lnTo>
+                  <a:lnTo>
+                    <a:pt x="695739" y="980661"/>
+                  </a:lnTo>
+                  <a:lnTo>
+                    <a:pt x="549965" y="1066800"/>
+                  </a:lnTo>
+                  <a:lnTo>
+                    <a:pt x="265044" y="1172817"/>
+                  </a:lnTo>
+                  <a:lnTo>
+                    <a:pt x="0" y="1225826"/>
+                  </a:lnTo>
+                  <a:lnTo>
+                    <a:pt x="26505" y="0"/>
+                  </a:lnTo>
+                  <a:close/>
+                </a:path>
+              </a:pathLst>
+            </a:custGeom>
+            <a:solidFill>
+              <a:schemeClr val="accent2">
+                <a:lumMod val="20000"/>
+                <a:lumOff val="80000"/>
+              </a:schemeClr>
+            </a:solidFill>
+            <a:ln w="76200">
+              <a:solidFill>
+                <a:schemeClr val="tx1"/>
+              </a:solidFill>
+            </a:ln>
+          </p:spPr>
+          <p:style>
+            <a:lnRef idx="2">
+              <a:schemeClr val="accent1">
+                <a:shade val="15000"/>
+              </a:schemeClr>
+            </a:lnRef>
+            <a:fillRef idx="1">
+              <a:schemeClr val="accent1"/>
+            </a:fillRef>
+            <a:effectRef idx="0">
+              <a:schemeClr val="accent1"/>
+            </a:effectRef>
+            <a:fontRef idx="minor">
+              <a:schemeClr val="lt1"/>
+            </a:fontRef>
+          </p:style>
+          <p:txBody>
+            <a:bodyPr rtlCol="0" anchor="ctr"/>
+            <a:lstStyle/>
+            <a:p>
+              <a:pPr algn="ctr"/>
+              <a:endParaRPr lang="en-CA"/>
+            </a:p>
+          </p:txBody>
+        </p:sp>
+        <p:sp>
+          <p:nvSpPr>
+            <p:cNvPr id="12" name="Freeform: Shape 11">
+              <a:extLst>
+                <a:ext uri="{FF2B5EF4-FFF2-40B4-BE49-F238E27FC236}">
+                  <a16:creationId xmlns:a16="http://schemas.microsoft.com/office/drawing/2014/main" id="{FC799402-7CFA-3D20-7AC5-B44FA8625A7F}"/>
+                </a:ext>
+              </a:extLst>
+            </p:cNvPr>
+            <p:cNvSpPr/>
+            <p:nvPr/>
+          </p:nvSpPr>
+          <p:spPr>
+            <a:xfrm>
+              <a:off x="5380384" y="2869095"/>
+              <a:ext cx="927652" cy="1232452"/>
+            </a:xfrm>
+            <a:custGeom>
+              <a:avLst/>
+              <a:gdLst>
+                <a:gd name="connsiteX0" fmla="*/ 377687 w 927652"/>
+                <a:gd name="connsiteY0" fmla="*/ 39757 h 1232452"/>
+                <a:gd name="connsiteX1" fmla="*/ 0 w 927652"/>
+                <a:gd name="connsiteY1" fmla="*/ 1033670 h 1232452"/>
+                <a:gd name="connsiteX2" fmla="*/ 125895 w 927652"/>
+                <a:gd name="connsiteY2" fmla="*/ 1146313 h 1232452"/>
+                <a:gd name="connsiteX3" fmla="*/ 390939 w 927652"/>
+                <a:gd name="connsiteY3" fmla="*/ 1225826 h 1232452"/>
+                <a:gd name="connsiteX4" fmla="*/ 470452 w 927652"/>
+                <a:gd name="connsiteY4" fmla="*/ 1232452 h 1232452"/>
+                <a:gd name="connsiteX5" fmla="*/ 927652 w 927652"/>
+                <a:gd name="connsiteY5" fmla="*/ 19878 h 1232452"/>
+                <a:gd name="connsiteX6" fmla="*/ 728869 w 927652"/>
+                <a:gd name="connsiteY6" fmla="*/ 0 h 1232452"/>
+                <a:gd name="connsiteX7" fmla="*/ 569843 w 927652"/>
+                <a:gd name="connsiteY7" fmla="*/ 13252 h 1232452"/>
+                <a:gd name="connsiteX8" fmla="*/ 377687 w 927652"/>
+                <a:gd name="connsiteY8" fmla="*/ 39757 h 1232452"/>
+              </a:gdLst>
+              <a:ahLst/>
+              <a:cxnLst>
+                <a:cxn ang="0">
+                  <a:pos x="connsiteX0" y="connsiteY0"/>
+                </a:cxn>
+                <a:cxn ang="0">
+                  <a:pos x="connsiteX1" y="connsiteY1"/>
+                </a:cxn>
+                <a:cxn ang="0">
+                  <a:pos x="connsiteX2" y="connsiteY2"/>
+                </a:cxn>
+                <a:cxn ang="0">
+                  <a:pos x="connsiteX3" y="connsiteY3"/>
+                </a:cxn>
+                <a:cxn ang="0">
+                  <a:pos x="connsiteX4" y="connsiteY4"/>
+                </a:cxn>
+                <a:cxn ang="0">
+                  <a:pos x="connsiteX5" y="connsiteY5"/>
+                </a:cxn>
+                <a:cxn ang="0">
+                  <a:pos x="connsiteX6" y="connsiteY6"/>
+                </a:cxn>
+                <a:cxn ang="0">
+                  <a:pos x="connsiteX7" y="connsiteY7"/>
+                </a:cxn>
+                <a:cxn ang="0">
+                  <a:pos x="connsiteX8" y="connsiteY8"/>
+                </a:cxn>
+              </a:cxnLst>
+              <a:rect l="l" t="t" r="r" b="b"/>
+              <a:pathLst>
+                <a:path w="927652" h="1232452">
+                  <a:moveTo>
+                    <a:pt x="377687" y="39757"/>
+                  </a:moveTo>
+                  <a:lnTo>
+                    <a:pt x="0" y="1033670"/>
+                  </a:lnTo>
+                  <a:lnTo>
+                    <a:pt x="125895" y="1146313"/>
+                  </a:lnTo>
+                  <a:lnTo>
+                    <a:pt x="390939" y="1225826"/>
+                  </a:lnTo>
+                  <a:lnTo>
+                    <a:pt x="470452" y="1232452"/>
+                  </a:lnTo>
+                  <a:lnTo>
+                    <a:pt x="927652" y="19878"/>
+                  </a:lnTo>
+                  <a:lnTo>
+                    <a:pt x="728869" y="0"/>
+                  </a:lnTo>
+                  <a:lnTo>
+                    <a:pt x="569843" y="13252"/>
+                  </a:lnTo>
+                  <a:lnTo>
+                    <a:pt x="377687" y="39757"/>
+                  </a:lnTo>
+                  <a:close/>
+                </a:path>
+              </a:pathLst>
+            </a:custGeom>
+            <a:solidFill>
+              <a:schemeClr val="accent2">
+                <a:lumMod val="20000"/>
+                <a:lumOff val="80000"/>
+              </a:schemeClr>
+            </a:solidFill>
+            <a:ln w="76200">
+              <a:solidFill>
+                <a:schemeClr val="tx1"/>
+              </a:solidFill>
+            </a:ln>
+          </p:spPr>
+          <p:style>
+            <a:lnRef idx="2">
+              <a:schemeClr val="accent1">
+                <a:shade val="15000"/>
+              </a:schemeClr>
+            </a:lnRef>
+            <a:fillRef idx="1">
+              <a:schemeClr val="accent1"/>
+            </a:fillRef>
+            <a:effectRef idx="0">
+              <a:schemeClr val="accent1"/>
+            </a:effectRef>
+            <a:fontRef idx="minor">
+              <a:schemeClr val="lt1"/>
+            </a:fontRef>
+          </p:style>
+          <p:txBody>
+            <a:bodyPr rtlCol="0" anchor="ctr"/>
+            <a:lstStyle/>
+            <a:p>
+              <a:pPr algn="ctr"/>
+              <a:endParaRPr lang="en-CA"/>
+            </a:p>
+          </p:txBody>
+        </p:sp>
+        <p:sp>
+          <p:nvSpPr>
+            <p:cNvPr id="5" name="Rectangle: Rounded Corners 4">
+              <a:extLst>
+                <a:ext uri="{FF2B5EF4-FFF2-40B4-BE49-F238E27FC236}">
+                  <a16:creationId xmlns:a16="http://schemas.microsoft.com/office/drawing/2014/main" id="{B930CD3B-0E46-89E9-551F-787D33256F1B}"/>
+                </a:ext>
+              </a:extLst>
+            </p:cNvPr>
+            <p:cNvSpPr/>
+            <p:nvPr/>
+          </p:nvSpPr>
+          <p:spPr>
+            <a:xfrm rot="18876817">
+              <a:off x="5187968" y="2892466"/>
+              <a:ext cx="3273552" cy="603504"/>
+            </a:xfrm>
+            <a:prstGeom prst="roundRect">
+              <a:avLst>
+                <a:gd name="adj" fmla="val 50000"/>
+              </a:avLst>
+            </a:prstGeom>
+            <a:solidFill>
+              <a:srgbClr val="E452BA"/>
+            </a:solidFill>
+            <a:ln w="76200">
+              <a:solidFill>
+                <a:schemeClr val="tx1"/>
+              </a:solidFill>
+            </a:ln>
+          </p:spPr>
+          <p:style>
+            <a:lnRef idx="2">
+              <a:schemeClr val="accent1">
+                <a:shade val="15000"/>
+              </a:schemeClr>
+            </a:lnRef>
+            <a:fillRef idx="1">
+              <a:schemeClr val="accent1"/>
+            </a:fillRef>
+            <a:effectRef idx="0">
+              <a:schemeClr val="accent1"/>
+            </a:effectRef>
+            <a:fontRef idx="minor">
+              <a:schemeClr val="lt1"/>
+            </a:fontRef>
+          </p:style>
+          <p:txBody>
+            <a:bodyPr rtlCol="0" anchor="ctr"/>
+            <a:lstStyle/>
+            <a:p>
+              <a:pPr algn="ctr"/>
+              <a:endParaRPr lang="en-CA"/>
+            </a:p>
+          </p:txBody>
+        </p:sp>
+        <p:sp>
+          <p:nvSpPr>
+            <p:cNvPr id="6" name="Oval 5">
+              <a:extLst>
+                <a:ext uri="{FF2B5EF4-FFF2-40B4-BE49-F238E27FC236}">
+                  <a16:creationId xmlns:a16="http://schemas.microsoft.com/office/drawing/2014/main" id="{A03D4106-AD09-4027-2FF9-A07ADB635690}"/>
+                </a:ext>
+              </a:extLst>
+            </p:cNvPr>
+            <p:cNvSpPr/>
+            <p:nvPr/>
+          </p:nvSpPr>
+          <p:spPr>
+            <a:xfrm rot="4950290">
+              <a:off x="7530501" y="2952832"/>
+              <a:ext cx="606217" cy="1346174"/>
+            </a:xfrm>
+            <a:prstGeom prst="ellipse">
+              <a:avLst/>
+            </a:prstGeom>
+            <a:solidFill>
+              <a:srgbClr val="D4AA78"/>
+            </a:solidFill>
+            <a:ln w="76200">
+              <a:solidFill>
+                <a:schemeClr val="tx1"/>
+              </a:solidFill>
+            </a:ln>
+          </p:spPr>
+          <p:style>
+            <a:lnRef idx="2">
+              <a:schemeClr val="accent1">
+                <a:shade val="15000"/>
+              </a:schemeClr>
+            </a:lnRef>
+            <a:fillRef idx="1">
+              <a:schemeClr val="accent1"/>
+            </a:fillRef>
+            <a:effectRef idx="0">
+              <a:schemeClr val="accent1"/>
+            </a:effectRef>
+            <a:fontRef idx="minor">
+              <a:schemeClr val="lt1"/>
+            </a:fontRef>
+          </p:style>
+          <p:txBody>
+            <a:bodyPr rtlCol="0" anchor="ctr"/>
+            <a:lstStyle/>
+            <a:p>
+              <a:pPr algn="ctr"/>
+              <a:endParaRPr lang="en-CA"/>
+            </a:p>
+          </p:txBody>
+        </p:sp>
+        <p:sp>
+          <p:nvSpPr>
+            <p:cNvPr id="7" name="Oval 6">
+              <a:extLst>
+                <a:ext uri="{FF2B5EF4-FFF2-40B4-BE49-F238E27FC236}">
+                  <a16:creationId xmlns:a16="http://schemas.microsoft.com/office/drawing/2014/main" id="{847262A3-982D-328E-8C83-CB97D907A70A}"/>
+                </a:ext>
+              </a:extLst>
+            </p:cNvPr>
+            <p:cNvSpPr/>
+            <p:nvPr/>
+          </p:nvSpPr>
+          <p:spPr>
+            <a:xfrm rot="14293247">
+              <a:off x="8458381" y="2775903"/>
+              <a:ext cx="533400" cy="1125106"/>
+            </a:xfrm>
+            <a:prstGeom prst="ellipse">
+              <a:avLst/>
+            </a:prstGeom>
+            <a:solidFill>
+              <a:srgbClr val="D4AA78"/>
+            </a:solidFill>
+            <a:ln w="76200">
+              <a:solidFill>
+                <a:schemeClr val="tx1"/>
+              </a:solidFill>
+            </a:ln>
+          </p:spPr>
+          <p:style>
+            <a:lnRef idx="2">
+              <a:schemeClr val="accent1">
+                <a:shade val="15000"/>
+              </a:schemeClr>
+            </a:lnRef>
+            <a:fillRef idx="1">
+              <a:schemeClr val="accent1"/>
+            </a:fillRef>
+            <a:effectRef idx="0">
+              <a:schemeClr val="accent1"/>
+            </a:effectRef>
+            <a:fontRef idx="minor">
+              <a:schemeClr val="lt1"/>
+            </a:fontRef>
+          </p:style>
+          <p:txBody>
+            <a:bodyPr rtlCol="0" anchor="ctr"/>
+            <a:lstStyle/>
+            <a:p>
+              <a:pPr algn="ctr"/>
+              <a:endParaRPr lang="en-CA"/>
+            </a:p>
+          </p:txBody>
+        </p:sp>
+      </p:grpSp>
     </p:spTree>
     <p:extLst>
       <p:ext uri="{BB962C8B-B14F-4D97-AF65-F5344CB8AC3E}">
@@ -19670,462 +20716,540 @@
           <a:chExt cx="0" cy="0"/>
         </a:xfrm>
       </p:grpSpPr>
-      <p:sp>
-        <p:nvSpPr>
-          <p:cNvPr id="10" name="Oval 9">
+      <p:grpSp>
+        <p:nvGrpSpPr>
+          <p:cNvPr id="17" name="Group 16">
             <a:extLst>
               <a:ext uri="{FF2B5EF4-FFF2-40B4-BE49-F238E27FC236}">
-                <a16:creationId xmlns:a16="http://schemas.microsoft.com/office/drawing/2014/main" id="{EA7F91B1-5FC7-CAF4-B8F3-BD1DA9674558}"/>
+                <a16:creationId xmlns:a16="http://schemas.microsoft.com/office/drawing/2014/main" id="{4FD49C7A-3C96-2430-279D-E2A50EC3CB6F}"/>
               </a:ext>
             </a:extLst>
           </p:cNvPr>
-          <p:cNvSpPr/>
+          <p:cNvGrpSpPr/>
           <p:nvPr/>
-        </p:nvSpPr>
-        <p:spPr>
-          <a:xfrm rot="16690148">
-            <a:off x="6122787" y="2845236"/>
-            <a:ext cx="533400" cy="1492034"/>
+        </p:nvGrpSpPr>
+        <p:grpSpPr>
+          <a:xfrm>
+            <a:off x="4486062" y="1361745"/>
+            <a:ext cx="3219876" cy="4134510"/>
+            <a:chOff x="3915628" y="1199729"/>
+            <a:chExt cx="3219876" cy="4134510"/>
           </a:xfrm>
-          <a:prstGeom prst="ellipse">
-            <a:avLst/>
-          </a:prstGeom>
-        </p:spPr>
-        <p:style>
-          <a:lnRef idx="2">
-            <a:schemeClr val="accent1">
-              <a:shade val="15000"/>
-            </a:schemeClr>
-          </a:lnRef>
-          <a:fillRef idx="1">
-            <a:schemeClr val="accent1"/>
-          </a:fillRef>
-          <a:effectRef idx="0">
-            <a:schemeClr val="accent1"/>
-          </a:effectRef>
-          <a:fontRef idx="minor">
-            <a:schemeClr val="lt1"/>
-          </a:fontRef>
-        </p:style>
-        <p:txBody>
-          <a:bodyPr rtlCol="0" anchor="ctr"/>
-          <a:lstStyle/>
-          <a:p>
-            <a:pPr algn="ctr"/>
-            <a:endParaRPr lang="en-CA"/>
-          </a:p>
-        </p:txBody>
-      </p:sp>
-      <p:sp>
-        <p:nvSpPr>
-          <p:cNvPr id="13" name="Rectangle: Rounded Corners 12">
-            <a:extLst>
-              <a:ext uri="{FF2B5EF4-FFF2-40B4-BE49-F238E27FC236}">
-                <a16:creationId xmlns:a16="http://schemas.microsoft.com/office/drawing/2014/main" id="{2B3CB4BC-2835-3383-82A2-BA28CCC4035B}"/>
-              </a:ext>
-            </a:extLst>
-          </p:cNvPr>
-          <p:cNvSpPr/>
-          <p:nvPr/>
-        </p:nvSpPr>
-        <p:spPr>
-          <a:xfrm rot="503577">
-            <a:off x="6145079" y="3223613"/>
-            <a:ext cx="627912" cy="738800"/>
-          </a:xfrm>
-          <a:prstGeom prst="roundRect">
-            <a:avLst/>
-          </a:prstGeom>
-          <a:solidFill>
-            <a:srgbClr val="FFFF00"/>
-          </a:solidFill>
-        </p:spPr>
-        <p:style>
-          <a:lnRef idx="2">
-            <a:schemeClr val="accent1">
-              <a:shade val="15000"/>
-            </a:schemeClr>
-          </a:lnRef>
-          <a:fillRef idx="1">
-            <a:schemeClr val="accent1"/>
-          </a:fillRef>
-          <a:effectRef idx="0">
-            <a:schemeClr val="accent1"/>
-          </a:effectRef>
-          <a:fontRef idx="minor">
-            <a:schemeClr val="lt1"/>
-          </a:fontRef>
-        </p:style>
-        <p:txBody>
-          <a:bodyPr rtlCol="0" anchor="ctr"/>
-          <a:lstStyle/>
-          <a:p>
-            <a:pPr algn="ctr"/>
-            <a:endParaRPr lang="en-CA"/>
-          </a:p>
-        </p:txBody>
-      </p:sp>
-      <p:sp>
-        <p:nvSpPr>
-          <p:cNvPr id="2" name="Oval 1">
-            <a:extLst>
-              <a:ext uri="{FF2B5EF4-FFF2-40B4-BE49-F238E27FC236}">
-                <a16:creationId xmlns:a16="http://schemas.microsoft.com/office/drawing/2014/main" id="{6D54FA99-0189-B68C-709D-BBF36EA09098}"/>
-              </a:ext>
-            </a:extLst>
-          </p:cNvPr>
-          <p:cNvSpPr/>
-          <p:nvPr/>
-        </p:nvSpPr>
-        <p:spPr>
-          <a:xfrm rot="9112926">
-            <a:off x="5596144" y="3939120"/>
-            <a:ext cx="606217" cy="1346174"/>
-          </a:xfrm>
-          <a:prstGeom prst="ellipse">
-            <a:avLst/>
-          </a:prstGeom>
-        </p:spPr>
-        <p:style>
-          <a:lnRef idx="2">
-            <a:schemeClr val="accent1">
-              <a:shade val="15000"/>
-            </a:schemeClr>
-          </a:lnRef>
-          <a:fillRef idx="1">
-            <a:schemeClr val="accent1"/>
-          </a:fillRef>
-          <a:effectRef idx="0">
-            <a:schemeClr val="accent1"/>
-          </a:effectRef>
-          <a:fontRef idx="minor">
-            <a:schemeClr val="lt1"/>
-          </a:fontRef>
-        </p:style>
-        <p:txBody>
-          <a:bodyPr rtlCol="0" anchor="ctr"/>
-          <a:lstStyle/>
-          <a:p>
-            <a:pPr algn="ctr"/>
-            <a:endParaRPr lang="en-CA"/>
-          </a:p>
-        </p:txBody>
-      </p:sp>
-      <p:sp>
-        <p:nvSpPr>
-          <p:cNvPr id="4" name="Oval 3">
-            <a:extLst>
-              <a:ext uri="{FF2B5EF4-FFF2-40B4-BE49-F238E27FC236}">
-                <a16:creationId xmlns:a16="http://schemas.microsoft.com/office/drawing/2014/main" id="{98670BA5-4562-C2BE-6301-9F28EFD222D9}"/>
-              </a:ext>
-            </a:extLst>
-          </p:cNvPr>
-          <p:cNvSpPr/>
-          <p:nvPr/>
-        </p:nvSpPr>
-        <p:spPr>
-          <a:xfrm>
-            <a:off x="4865254" y="2947599"/>
-            <a:ext cx="1322877" cy="1492513"/>
-          </a:xfrm>
-          <a:prstGeom prst="ellipse">
-            <a:avLst/>
-          </a:prstGeom>
-        </p:spPr>
-        <p:style>
-          <a:lnRef idx="2">
-            <a:schemeClr val="accent1">
-              <a:shade val="15000"/>
-            </a:schemeClr>
-          </a:lnRef>
-          <a:fillRef idx="1">
-            <a:schemeClr val="accent1"/>
-          </a:fillRef>
-          <a:effectRef idx="0">
-            <a:schemeClr val="accent1"/>
-          </a:effectRef>
-          <a:fontRef idx="minor">
-            <a:schemeClr val="lt1"/>
-          </a:fontRef>
-        </p:style>
-        <p:txBody>
-          <a:bodyPr rtlCol="0" anchor="ctr"/>
-          <a:lstStyle/>
-          <a:p>
-            <a:pPr algn="ctr"/>
-            <a:endParaRPr lang="en-CA"/>
-          </a:p>
-        </p:txBody>
-      </p:sp>
-      <p:sp>
-        <p:nvSpPr>
-          <p:cNvPr id="11" name="Oval 10">
-            <a:extLst>
-              <a:ext uri="{FF2B5EF4-FFF2-40B4-BE49-F238E27FC236}">
-                <a16:creationId xmlns:a16="http://schemas.microsoft.com/office/drawing/2014/main" id="{C16F9410-133E-8D84-1407-AD956AB6BEA4}"/>
-              </a:ext>
-            </a:extLst>
-          </p:cNvPr>
-          <p:cNvSpPr/>
-          <p:nvPr/>
-        </p:nvSpPr>
-        <p:spPr>
-          <a:xfrm>
-            <a:off x="4458038" y="1199729"/>
-            <a:ext cx="2185416" cy="2048256"/>
-          </a:xfrm>
-          <a:prstGeom prst="ellipse">
-            <a:avLst/>
-          </a:prstGeom>
-        </p:spPr>
-        <p:style>
-          <a:lnRef idx="2">
-            <a:schemeClr val="accent1">
-              <a:shade val="15000"/>
-            </a:schemeClr>
-          </a:lnRef>
-          <a:fillRef idx="1">
-            <a:schemeClr val="accent1"/>
-          </a:fillRef>
-          <a:effectRef idx="0">
-            <a:schemeClr val="accent1"/>
-          </a:effectRef>
-          <a:fontRef idx="minor">
-            <a:schemeClr val="lt1"/>
-          </a:fontRef>
-        </p:style>
-        <p:txBody>
-          <a:bodyPr rtlCol="0" anchor="ctr"/>
-          <a:lstStyle/>
-          <a:p>
-            <a:pPr algn="ctr"/>
-            <a:endParaRPr lang="en-CA"/>
-          </a:p>
-        </p:txBody>
-      </p:sp>
-      <p:sp>
-        <p:nvSpPr>
-          <p:cNvPr id="6" name="Oval 5">
-            <a:extLst>
-              <a:ext uri="{FF2B5EF4-FFF2-40B4-BE49-F238E27FC236}">
-                <a16:creationId xmlns:a16="http://schemas.microsoft.com/office/drawing/2014/main" id="{03DF45A8-B8F9-58FB-2122-C8304252F265}"/>
-              </a:ext>
-            </a:extLst>
-          </p:cNvPr>
-          <p:cNvSpPr/>
-          <p:nvPr/>
-        </p:nvSpPr>
-        <p:spPr>
-          <a:xfrm rot="12328088">
-            <a:off x="4906686" y="3988065"/>
-            <a:ext cx="606217" cy="1346174"/>
-          </a:xfrm>
-          <a:prstGeom prst="ellipse">
-            <a:avLst/>
-          </a:prstGeom>
-        </p:spPr>
-        <p:style>
-          <a:lnRef idx="2">
-            <a:schemeClr val="accent1">
-              <a:shade val="15000"/>
-            </a:schemeClr>
-          </a:lnRef>
-          <a:fillRef idx="1">
-            <a:schemeClr val="accent1"/>
-          </a:fillRef>
-          <a:effectRef idx="0">
-            <a:schemeClr val="accent1"/>
-          </a:effectRef>
-          <a:fontRef idx="minor">
-            <a:schemeClr val="lt1"/>
-          </a:fontRef>
-        </p:style>
-        <p:txBody>
-          <a:bodyPr rtlCol="0" anchor="ctr"/>
-          <a:lstStyle/>
-          <a:p>
-            <a:pPr algn="ctr"/>
-            <a:endParaRPr lang="en-CA"/>
-          </a:p>
-        </p:txBody>
-      </p:sp>
-      <p:sp>
-        <p:nvSpPr>
-          <p:cNvPr id="8" name="Oval 7">
-            <a:extLst>
-              <a:ext uri="{FF2B5EF4-FFF2-40B4-BE49-F238E27FC236}">
-                <a16:creationId xmlns:a16="http://schemas.microsoft.com/office/drawing/2014/main" id="{993538E6-7D1C-D749-C4D6-D66A4EE6ED22}"/>
-              </a:ext>
-            </a:extLst>
-          </p:cNvPr>
-          <p:cNvSpPr/>
-          <p:nvPr/>
-        </p:nvSpPr>
-        <p:spPr>
-          <a:xfrm rot="4957278">
-            <a:off x="4394945" y="2785636"/>
-            <a:ext cx="533400" cy="1492034"/>
-          </a:xfrm>
-          <a:prstGeom prst="ellipse">
-            <a:avLst/>
-          </a:prstGeom>
-        </p:spPr>
-        <p:style>
-          <a:lnRef idx="2">
-            <a:schemeClr val="accent1">
-              <a:shade val="15000"/>
-            </a:schemeClr>
-          </a:lnRef>
-          <a:fillRef idx="1">
-            <a:schemeClr val="accent1"/>
-          </a:fillRef>
-          <a:effectRef idx="0">
-            <a:schemeClr val="accent1"/>
-          </a:effectRef>
-          <a:fontRef idx="minor">
-            <a:schemeClr val="lt1"/>
-          </a:fontRef>
-        </p:style>
-        <p:txBody>
-          <a:bodyPr rtlCol="0" anchor="ctr"/>
-          <a:lstStyle/>
-          <a:p>
-            <a:pPr algn="ctr"/>
-            <a:endParaRPr lang="en-CA"/>
-          </a:p>
-        </p:txBody>
-      </p:sp>
-      <p:sp>
-        <p:nvSpPr>
-          <p:cNvPr id="9" name="Oval 8">
-            <a:extLst>
-              <a:ext uri="{FF2B5EF4-FFF2-40B4-BE49-F238E27FC236}">
-                <a16:creationId xmlns:a16="http://schemas.microsoft.com/office/drawing/2014/main" id="{DF060652-07FE-DFAE-E9A4-B337A8F6709C}"/>
-              </a:ext>
-            </a:extLst>
-          </p:cNvPr>
-          <p:cNvSpPr/>
-          <p:nvPr/>
-        </p:nvSpPr>
-        <p:spPr>
-          <a:xfrm>
-            <a:off x="4754880" y="1901952"/>
-            <a:ext cx="238568" cy="332379"/>
-          </a:xfrm>
-          <a:prstGeom prst="ellipse">
-            <a:avLst/>
-          </a:prstGeom>
-        </p:spPr>
-        <p:style>
-          <a:lnRef idx="2">
-            <a:schemeClr val="accent1">
-              <a:shade val="15000"/>
-            </a:schemeClr>
-          </a:lnRef>
-          <a:fillRef idx="1">
-            <a:schemeClr val="accent1"/>
-          </a:fillRef>
-          <a:effectRef idx="0">
-            <a:schemeClr val="accent1"/>
-          </a:effectRef>
-          <a:fontRef idx="minor">
-            <a:schemeClr val="lt1"/>
-          </a:fontRef>
-        </p:style>
-        <p:txBody>
-          <a:bodyPr rtlCol="0" anchor="ctr"/>
-          <a:lstStyle/>
-          <a:p>
-            <a:pPr algn="ctr"/>
-            <a:endParaRPr lang="en-CA"/>
-          </a:p>
-        </p:txBody>
-      </p:sp>
-      <p:sp>
-        <p:nvSpPr>
-          <p:cNvPr id="12" name="TextBox 11">
-            <a:extLst>
-              <a:ext uri="{FF2B5EF4-FFF2-40B4-BE49-F238E27FC236}">
-                <a16:creationId xmlns:a16="http://schemas.microsoft.com/office/drawing/2014/main" id="{DE824F89-1B57-7C05-B120-24615C8CD26B}"/>
-              </a:ext>
-            </a:extLst>
-          </p:cNvPr>
-          <p:cNvSpPr txBox="1"/>
-          <p:nvPr/>
-        </p:nvSpPr>
-        <p:spPr>
-          <a:xfrm>
-            <a:off x="6643454" y="2790900"/>
-            <a:ext cx="2579929" cy="369332"/>
-          </a:xfrm>
-          <a:prstGeom prst="rect">
-            <a:avLst/>
-          </a:prstGeom>
-          <a:noFill/>
-        </p:spPr>
-        <p:txBody>
-          <a:bodyPr wrap="square" rtlCol="0">
-            <a:spAutoFit/>
-          </a:bodyPr>
-          <a:lstStyle/>
-          <a:p>
-            <a:r>
-              <a:rPr lang="en-US" dirty="0"/>
-              <a:t>Floaties</a:t>
-            </a:r>
-            <a:endParaRPr lang="en-CA" dirty="0"/>
-          </a:p>
-        </p:txBody>
-      </p:sp>
-      <p:sp>
-        <p:nvSpPr>
-          <p:cNvPr id="5" name="Rectangle: Rounded Corners 4">
-            <a:extLst>
-              <a:ext uri="{FF2B5EF4-FFF2-40B4-BE49-F238E27FC236}">
-                <a16:creationId xmlns:a16="http://schemas.microsoft.com/office/drawing/2014/main" id="{45C027C4-F9D3-58BE-55DD-F55622AF1E79}"/>
-              </a:ext>
-            </a:extLst>
-          </p:cNvPr>
-          <p:cNvSpPr/>
-          <p:nvPr/>
-        </p:nvSpPr>
-        <p:spPr>
-          <a:xfrm rot="21092445">
-            <a:off x="4355038" y="3142168"/>
-            <a:ext cx="627912" cy="738800"/>
-          </a:xfrm>
-          <a:prstGeom prst="roundRect">
-            <a:avLst/>
-          </a:prstGeom>
-          <a:solidFill>
-            <a:srgbClr val="FFFF00"/>
-          </a:solidFill>
-        </p:spPr>
-        <p:style>
-          <a:lnRef idx="2">
-            <a:schemeClr val="accent1">
-              <a:shade val="15000"/>
-            </a:schemeClr>
-          </a:lnRef>
-          <a:fillRef idx="1">
-            <a:schemeClr val="accent1"/>
-          </a:fillRef>
-          <a:effectRef idx="0">
-            <a:schemeClr val="accent1"/>
-          </a:effectRef>
-          <a:fontRef idx="minor">
-            <a:schemeClr val="lt1"/>
-          </a:fontRef>
-        </p:style>
-        <p:txBody>
-          <a:bodyPr rtlCol="0" anchor="ctr"/>
-          <a:lstStyle/>
-          <a:p>
-            <a:pPr algn="ctr"/>
-            <a:endParaRPr lang="en-CA"/>
-          </a:p>
-        </p:txBody>
-      </p:sp>
+        </p:grpSpPr>
+        <p:sp>
+          <p:nvSpPr>
+            <p:cNvPr id="10" name="Oval 9">
+              <a:extLst>
+                <a:ext uri="{FF2B5EF4-FFF2-40B4-BE49-F238E27FC236}">
+                  <a16:creationId xmlns:a16="http://schemas.microsoft.com/office/drawing/2014/main" id="{EA7F91B1-5FC7-CAF4-B8F3-BD1DA9674558}"/>
+                </a:ext>
+              </a:extLst>
+            </p:cNvPr>
+            <p:cNvSpPr/>
+            <p:nvPr/>
+          </p:nvSpPr>
+          <p:spPr>
+            <a:xfrm rot="16690148">
+              <a:off x="6122787" y="2845236"/>
+              <a:ext cx="533400" cy="1492034"/>
+            </a:xfrm>
+            <a:prstGeom prst="ellipse">
+              <a:avLst/>
+            </a:prstGeom>
+            <a:ln w="76200">
+              <a:solidFill>
+                <a:schemeClr val="tx1"/>
+              </a:solidFill>
+            </a:ln>
+          </p:spPr>
+          <p:style>
+            <a:lnRef idx="2">
+              <a:schemeClr val="accent1">
+                <a:shade val="15000"/>
+              </a:schemeClr>
+            </a:lnRef>
+            <a:fillRef idx="1">
+              <a:schemeClr val="accent1"/>
+            </a:fillRef>
+            <a:effectRef idx="0">
+              <a:schemeClr val="accent1"/>
+            </a:effectRef>
+            <a:fontRef idx="minor">
+              <a:schemeClr val="lt1"/>
+            </a:fontRef>
+          </p:style>
+          <p:txBody>
+            <a:bodyPr rtlCol="0" anchor="ctr"/>
+            <a:lstStyle/>
+            <a:p>
+              <a:pPr algn="ctr"/>
+              <a:endParaRPr lang="en-CA"/>
+            </a:p>
+          </p:txBody>
+        </p:sp>
+        <p:sp>
+          <p:nvSpPr>
+            <p:cNvPr id="13" name="Rectangle: Rounded Corners 12">
+              <a:extLst>
+                <a:ext uri="{FF2B5EF4-FFF2-40B4-BE49-F238E27FC236}">
+                  <a16:creationId xmlns:a16="http://schemas.microsoft.com/office/drawing/2014/main" id="{2B3CB4BC-2835-3383-82A2-BA28CCC4035B}"/>
+                </a:ext>
+              </a:extLst>
+            </p:cNvPr>
+            <p:cNvSpPr/>
+            <p:nvPr/>
+          </p:nvSpPr>
+          <p:spPr>
+            <a:xfrm rot="503577">
+              <a:off x="6145079" y="3223613"/>
+              <a:ext cx="627912" cy="738800"/>
+            </a:xfrm>
+            <a:prstGeom prst="roundRect">
+              <a:avLst/>
+            </a:prstGeom>
+            <a:solidFill>
+              <a:srgbClr val="FFFF00"/>
+            </a:solidFill>
+            <a:ln w="76200">
+              <a:solidFill>
+                <a:schemeClr val="tx1"/>
+              </a:solidFill>
+            </a:ln>
+          </p:spPr>
+          <p:style>
+            <a:lnRef idx="2">
+              <a:schemeClr val="accent1">
+                <a:shade val="15000"/>
+              </a:schemeClr>
+            </a:lnRef>
+            <a:fillRef idx="1">
+              <a:schemeClr val="accent1"/>
+            </a:fillRef>
+            <a:effectRef idx="0">
+              <a:schemeClr val="accent1"/>
+            </a:effectRef>
+            <a:fontRef idx="minor">
+              <a:schemeClr val="lt1"/>
+            </a:fontRef>
+          </p:style>
+          <p:txBody>
+            <a:bodyPr rtlCol="0" anchor="ctr"/>
+            <a:lstStyle/>
+            <a:p>
+              <a:pPr algn="ctr"/>
+              <a:endParaRPr lang="en-CA"/>
+            </a:p>
+          </p:txBody>
+        </p:sp>
+        <p:sp>
+          <p:nvSpPr>
+            <p:cNvPr id="2" name="Oval 1">
+              <a:extLst>
+                <a:ext uri="{FF2B5EF4-FFF2-40B4-BE49-F238E27FC236}">
+                  <a16:creationId xmlns:a16="http://schemas.microsoft.com/office/drawing/2014/main" id="{6D54FA99-0189-B68C-709D-BBF36EA09098}"/>
+                </a:ext>
+              </a:extLst>
+            </p:cNvPr>
+            <p:cNvSpPr/>
+            <p:nvPr/>
+          </p:nvSpPr>
+          <p:spPr>
+            <a:xfrm rot="9112926">
+              <a:off x="5596144" y="3939120"/>
+              <a:ext cx="606217" cy="1346174"/>
+            </a:xfrm>
+            <a:prstGeom prst="ellipse">
+              <a:avLst/>
+            </a:prstGeom>
+            <a:solidFill>
+              <a:schemeClr val="accent2"/>
+            </a:solidFill>
+            <a:ln w="76200">
+              <a:solidFill>
+                <a:schemeClr val="tx1"/>
+              </a:solidFill>
+            </a:ln>
+          </p:spPr>
+          <p:style>
+            <a:lnRef idx="2">
+              <a:schemeClr val="accent1">
+                <a:shade val="15000"/>
+              </a:schemeClr>
+            </a:lnRef>
+            <a:fillRef idx="1">
+              <a:schemeClr val="accent1"/>
+            </a:fillRef>
+            <a:effectRef idx="0">
+              <a:schemeClr val="accent1"/>
+            </a:effectRef>
+            <a:fontRef idx="minor">
+              <a:schemeClr val="lt1"/>
+            </a:fontRef>
+          </p:style>
+          <p:txBody>
+            <a:bodyPr rtlCol="0" anchor="ctr"/>
+            <a:lstStyle/>
+            <a:p>
+              <a:pPr algn="ctr"/>
+              <a:endParaRPr lang="en-CA"/>
+            </a:p>
+          </p:txBody>
+        </p:sp>
+        <p:sp>
+          <p:nvSpPr>
+            <p:cNvPr id="4" name="Oval 3">
+              <a:extLst>
+                <a:ext uri="{FF2B5EF4-FFF2-40B4-BE49-F238E27FC236}">
+                  <a16:creationId xmlns:a16="http://schemas.microsoft.com/office/drawing/2014/main" id="{98670BA5-4562-C2BE-6301-9F28EFD222D9}"/>
+                </a:ext>
+              </a:extLst>
+            </p:cNvPr>
+            <p:cNvSpPr/>
+            <p:nvPr/>
+          </p:nvSpPr>
+          <p:spPr>
+            <a:xfrm>
+              <a:off x="4865254" y="2947599"/>
+              <a:ext cx="1322877" cy="1492513"/>
+            </a:xfrm>
+            <a:prstGeom prst="ellipse">
+              <a:avLst/>
+            </a:prstGeom>
+            <a:solidFill>
+              <a:schemeClr val="accent2"/>
+            </a:solidFill>
+            <a:ln w="76200">
+              <a:solidFill>
+                <a:schemeClr val="tx1"/>
+              </a:solidFill>
+            </a:ln>
+          </p:spPr>
+          <p:style>
+            <a:lnRef idx="2">
+              <a:schemeClr val="accent1">
+                <a:shade val="15000"/>
+              </a:schemeClr>
+            </a:lnRef>
+            <a:fillRef idx="1">
+              <a:schemeClr val="accent1"/>
+            </a:fillRef>
+            <a:effectRef idx="0">
+              <a:schemeClr val="accent1"/>
+            </a:effectRef>
+            <a:fontRef idx="minor">
+              <a:schemeClr val="lt1"/>
+            </a:fontRef>
+          </p:style>
+          <p:txBody>
+            <a:bodyPr rtlCol="0" anchor="ctr"/>
+            <a:lstStyle/>
+            <a:p>
+              <a:pPr algn="ctr"/>
+              <a:endParaRPr lang="en-CA"/>
+            </a:p>
+          </p:txBody>
+        </p:sp>
+        <p:sp>
+          <p:nvSpPr>
+            <p:cNvPr id="11" name="Oval 10">
+              <a:extLst>
+                <a:ext uri="{FF2B5EF4-FFF2-40B4-BE49-F238E27FC236}">
+                  <a16:creationId xmlns:a16="http://schemas.microsoft.com/office/drawing/2014/main" id="{C16F9410-133E-8D84-1407-AD956AB6BEA4}"/>
+                </a:ext>
+              </a:extLst>
+            </p:cNvPr>
+            <p:cNvSpPr/>
+            <p:nvPr/>
+          </p:nvSpPr>
+          <p:spPr>
+            <a:xfrm>
+              <a:off x="4458038" y="1199729"/>
+              <a:ext cx="2185416" cy="2048256"/>
+            </a:xfrm>
+            <a:prstGeom prst="ellipse">
+              <a:avLst/>
+            </a:prstGeom>
+            <a:solidFill>
+              <a:srgbClr val="F5F5D5"/>
+            </a:solidFill>
+            <a:ln w="76200">
+              <a:solidFill>
+                <a:schemeClr val="tx1"/>
+              </a:solidFill>
+            </a:ln>
+          </p:spPr>
+          <p:style>
+            <a:lnRef idx="2">
+              <a:schemeClr val="accent1">
+                <a:shade val="15000"/>
+              </a:schemeClr>
+            </a:lnRef>
+            <a:fillRef idx="1">
+              <a:schemeClr val="accent1"/>
+            </a:fillRef>
+            <a:effectRef idx="0">
+              <a:schemeClr val="accent1"/>
+            </a:effectRef>
+            <a:fontRef idx="minor">
+              <a:schemeClr val="lt1"/>
+            </a:fontRef>
+          </p:style>
+          <p:txBody>
+            <a:bodyPr rtlCol="0" anchor="ctr"/>
+            <a:lstStyle/>
+            <a:p>
+              <a:pPr algn="ctr"/>
+              <a:endParaRPr lang="en-CA"/>
+            </a:p>
+          </p:txBody>
+        </p:sp>
+        <p:sp>
+          <p:nvSpPr>
+            <p:cNvPr id="6" name="Oval 5">
+              <a:extLst>
+                <a:ext uri="{FF2B5EF4-FFF2-40B4-BE49-F238E27FC236}">
+                  <a16:creationId xmlns:a16="http://schemas.microsoft.com/office/drawing/2014/main" id="{03DF45A8-B8F9-58FB-2122-C8304252F265}"/>
+                </a:ext>
+              </a:extLst>
+            </p:cNvPr>
+            <p:cNvSpPr/>
+            <p:nvPr/>
+          </p:nvSpPr>
+          <p:spPr>
+            <a:xfrm rot="12328088">
+              <a:off x="4906686" y="3988065"/>
+              <a:ext cx="606217" cy="1346174"/>
+            </a:xfrm>
+            <a:prstGeom prst="ellipse">
+              <a:avLst/>
+            </a:prstGeom>
+            <a:solidFill>
+              <a:schemeClr val="accent2"/>
+            </a:solidFill>
+            <a:ln w="76200">
+              <a:solidFill>
+                <a:schemeClr val="tx1"/>
+              </a:solidFill>
+            </a:ln>
+          </p:spPr>
+          <p:style>
+            <a:lnRef idx="2">
+              <a:schemeClr val="accent1">
+                <a:shade val="15000"/>
+              </a:schemeClr>
+            </a:lnRef>
+            <a:fillRef idx="1">
+              <a:schemeClr val="accent1"/>
+            </a:fillRef>
+            <a:effectRef idx="0">
+              <a:schemeClr val="accent1"/>
+            </a:effectRef>
+            <a:fontRef idx="minor">
+              <a:schemeClr val="lt1"/>
+            </a:fontRef>
+          </p:style>
+          <p:txBody>
+            <a:bodyPr rtlCol="0" anchor="ctr"/>
+            <a:lstStyle/>
+            <a:p>
+              <a:pPr algn="ctr"/>
+              <a:endParaRPr lang="en-CA"/>
+            </a:p>
+          </p:txBody>
+        </p:sp>
+        <p:sp>
+          <p:nvSpPr>
+            <p:cNvPr id="8" name="Oval 7">
+              <a:extLst>
+                <a:ext uri="{FF2B5EF4-FFF2-40B4-BE49-F238E27FC236}">
+                  <a16:creationId xmlns:a16="http://schemas.microsoft.com/office/drawing/2014/main" id="{993538E6-7D1C-D749-C4D6-D66A4EE6ED22}"/>
+                </a:ext>
+              </a:extLst>
+            </p:cNvPr>
+            <p:cNvSpPr/>
+            <p:nvPr/>
+          </p:nvSpPr>
+          <p:spPr>
+            <a:xfrm rot="4957278">
+              <a:off x="4394945" y="2785636"/>
+              <a:ext cx="533400" cy="1492034"/>
+            </a:xfrm>
+            <a:prstGeom prst="ellipse">
+              <a:avLst/>
+            </a:prstGeom>
+            <a:solidFill>
+              <a:schemeClr val="accent2"/>
+            </a:solidFill>
+            <a:ln w="76200">
+              <a:solidFill>
+                <a:schemeClr val="tx1"/>
+              </a:solidFill>
+            </a:ln>
+          </p:spPr>
+          <p:style>
+            <a:lnRef idx="2">
+              <a:schemeClr val="accent1">
+                <a:shade val="15000"/>
+              </a:schemeClr>
+            </a:lnRef>
+            <a:fillRef idx="1">
+              <a:schemeClr val="accent1"/>
+            </a:fillRef>
+            <a:effectRef idx="0">
+              <a:schemeClr val="accent1"/>
+            </a:effectRef>
+            <a:fontRef idx="minor">
+              <a:schemeClr val="lt1"/>
+            </a:fontRef>
+          </p:style>
+          <p:txBody>
+            <a:bodyPr rtlCol="0" anchor="ctr"/>
+            <a:lstStyle/>
+            <a:p>
+              <a:pPr algn="ctr"/>
+              <a:endParaRPr lang="en-CA"/>
+            </a:p>
+          </p:txBody>
+        </p:sp>
+        <p:sp>
+          <p:nvSpPr>
+            <p:cNvPr id="5" name="Rectangle: Rounded Corners 4">
+              <a:extLst>
+                <a:ext uri="{FF2B5EF4-FFF2-40B4-BE49-F238E27FC236}">
+                  <a16:creationId xmlns:a16="http://schemas.microsoft.com/office/drawing/2014/main" id="{45C027C4-F9D3-58BE-55DD-F55622AF1E79}"/>
+                </a:ext>
+              </a:extLst>
+            </p:cNvPr>
+            <p:cNvSpPr/>
+            <p:nvPr/>
+          </p:nvSpPr>
+          <p:spPr>
+            <a:xfrm rot="21092445">
+              <a:off x="4355038" y="3142168"/>
+              <a:ext cx="627912" cy="738800"/>
+            </a:xfrm>
+            <a:prstGeom prst="roundRect">
+              <a:avLst/>
+            </a:prstGeom>
+            <a:solidFill>
+              <a:srgbClr val="FFFF00"/>
+            </a:solidFill>
+            <a:ln w="76200">
+              <a:solidFill>
+                <a:schemeClr val="tx1"/>
+              </a:solidFill>
+            </a:ln>
+          </p:spPr>
+          <p:style>
+            <a:lnRef idx="2">
+              <a:schemeClr val="accent1">
+                <a:shade val="15000"/>
+              </a:schemeClr>
+            </a:lnRef>
+            <a:fillRef idx="1">
+              <a:schemeClr val="accent1"/>
+            </a:fillRef>
+            <a:effectRef idx="0">
+              <a:schemeClr val="accent1"/>
+            </a:effectRef>
+            <a:fontRef idx="minor">
+              <a:schemeClr val="lt1"/>
+            </a:fontRef>
+          </p:style>
+          <p:txBody>
+            <a:bodyPr rtlCol="0" anchor="ctr"/>
+            <a:lstStyle/>
+            <a:p>
+              <a:pPr algn="ctr"/>
+              <a:endParaRPr lang="en-CA"/>
+            </a:p>
+          </p:txBody>
+        </p:sp>
+        <p:cxnSp>
+          <p:nvCxnSpPr>
+            <p:cNvPr id="7" name="Straight Connector 6">
+              <a:extLst>
+                <a:ext uri="{FF2B5EF4-FFF2-40B4-BE49-F238E27FC236}">
+                  <a16:creationId xmlns:a16="http://schemas.microsoft.com/office/drawing/2014/main" id="{9F998583-6D88-C056-650E-F473CC93D5C6}"/>
+                </a:ext>
+              </a:extLst>
+            </p:cNvPr>
+            <p:cNvCxnSpPr/>
+            <p:nvPr/>
+          </p:nvCxnSpPr>
+          <p:spPr>
+            <a:xfrm>
+              <a:off x="4865254" y="4737652"/>
+              <a:ext cx="501876" cy="251791"/>
+            </a:xfrm>
+            <a:prstGeom prst="line">
+              <a:avLst/>
+            </a:prstGeom>
+            <a:ln w="76200">
+              <a:solidFill>
+                <a:schemeClr val="tx1"/>
+              </a:solidFill>
+            </a:ln>
+          </p:spPr>
+          <p:style>
+            <a:lnRef idx="2">
+              <a:schemeClr val="accent1"/>
+            </a:lnRef>
+            <a:fillRef idx="0">
+              <a:schemeClr val="accent1"/>
+            </a:fillRef>
+            <a:effectRef idx="1">
+              <a:schemeClr val="accent1"/>
+            </a:effectRef>
+            <a:fontRef idx="minor">
+              <a:schemeClr val="tx1"/>
+            </a:fontRef>
+          </p:style>
+        </p:cxnSp>
+        <p:cxnSp>
+          <p:nvCxnSpPr>
+            <p:cNvPr id="14" name="Straight Connector 13">
+              <a:extLst>
+                <a:ext uri="{FF2B5EF4-FFF2-40B4-BE49-F238E27FC236}">
+                  <a16:creationId xmlns:a16="http://schemas.microsoft.com/office/drawing/2014/main" id="{C3F25BB3-2F7A-7994-F9BD-1CEFE8E494D2}"/>
+                </a:ext>
+              </a:extLst>
+            </p:cNvPr>
+            <p:cNvCxnSpPr>
+              <a:cxnSpLocks/>
+            </p:cNvCxnSpPr>
+            <p:nvPr/>
+          </p:nvCxnSpPr>
+          <p:spPr>
+            <a:xfrm flipV="1">
+              <a:off x="5724820" y="4661152"/>
+              <a:ext cx="550084" cy="280785"/>
+            </a:xfrm>
+            <a:prstGeom prst="line">
+              <a:avLst/>
+            </a:prstGeom>
+            <a:ln w="76200">
+              <a:solidFill>
+                <a:schemeClr val="tx1"/>
+              </a:solidFill>
+            </a:ln>
+          </p:spPr>
+          <p:style>
+            <a:lnRef idx="2">
+              <a:schemeClr val="accent1"/>
+            </a:lnRef>
+            <a:fillRef idx="0">
+              <a:schemeClr val="accent1"/>
+            </a:fillRef>
+            <a:effectRef idx="1">
+              <a:schemeClr val="accent1"/>
+            </a:effectRef>
+            <a:fontRef idx="minor">
+              <a:schemeClr val="tx1"/>
+            </a:fontRef>
+          </p:style>
+        </p:cxnSp>
+      </p:grpSp>
     </p:spTree>
     <p:extLst>
       <p:ext uri="{BB962C8B-B14F-4D97-AF65-F5344CB8AC3E}">

</xml_diff>